<commit_message>
ppt updated with team photos
</commit_message>
<xml_diff>
--- a/docs/groupProject.pptx
+++ b/docs/groupProject.pptx
@@ -198,7 +198,7 @@
           <a:p>
             <a:fld id="{5EE39229-6641-4520-99DB-0FFD4D3BF858}" type="datetimeFigureOut">
               <a:rPr lang="en-US" smtClean="0"/>
-              <a:t>7/20/2014</a:t>
+              <a:t>7/21/2014</a:t>
             </a:fld>
             <a:endParaRPr lang="en-US"/>
           </a:p>
@@ -647,7 +647,7 @@
           <a:p>
             <a:fld id="{C16D46D2-A5CF-4EF4-A6E9-A8A0D2AF825B}" type="datetimeFigureOut">
               <a:rPr lang="en-US" smtClean="0"/>
-              <a:t>7/20/2014</a:t>
+              <a:t>7/21/2014</a:t>
             </a:fld>
             <a:endParaRPr lang="en-US"/>
           </a:p>
@@ -817,7 +817,7 @@
           <a:p>
             <a:fld id="{C16D46D2-A5CF-4EF4-A6E9-A8A0D2AF825B}" type="datetimeFigureOut">
               <a:rPr lang="en-US" smtClean="0"/>
-              <a:t>7/20/2014</a:t>
+              <a:t>7/21/2014</a:t>
             </a:fld>
             <a:endParaRPr lang="en-US"/>
           </a:p>
@@ -997,7 +997,7 @@
           <a:p>
             <a:fld id="{C16D46D2-A5CF-4EF4-A6E9-A8A0D2AF825B}" type="datetimeFigureOut">
               <a:rPr lang="en-US" smtClean="0"/>
-              <a:t>7/20/2014</a:t>
+              <a:t>7/21/2014</a:t>
             </a:fld>
             <a:endParaRPr lang="en-US"/>
           </a:p>
@@ -1167,7 +1167,7 @@
           <a:p>
             <a:fld id="{C16D46D2-A5CF-4EF4-A6E9-A8A0D2AF825B}" type="datetimeFigureOut">
               <a:rPr lang="en-US" smtClean="0"/>
-              <a:t>7/20/2014</a:t>
+              <a:t>7/21/2014</a:t>
             </a:fld>
             <a:endParaRPr lang="en-US"/>
           </a:p>
@@ -1413,7 +1413,7 @@
           <a:p>
             <a:fld id="{C16D46D2-A5CF-4EF4-A6E9-A8A0D2AF825B}" type="datetimeFigureOut">
               <a:rPr lang="en-US" smtClean="0"/>
-              <a:t>7/20/2014</a:t>
+              <a:t>7/21/2014</a:t>
             </a:fld>
             <a:endParaRPr lang="en-US"/>
           </a:p>
@@ -1701,7 +1701,7 @@
           <a:p>
             <a:fld id="{C16D46D2-A5CF-4EF4-A6E9-A8A0D2AF825B}" type="datetimeFigureOut">
               <a:rPr lang="en-US" smtClean="0"/>
-              <a:t>7/20/2014</a:t>
+              <a:t>7/21/2014</a:t>
             </a:fld>
             <a:endParaRPr lang="en-US"/>
           </a:p>
@@ -2123,7 +2123,7 @@
           <a:p>
             <a:fld id="{C16D46D2-A5CF-4EF4-A6E9-A8A0D2AF825B}" type="datetimeFigureOut">
               <a:rPr lang="en-US" smtClean="0"/>
-              <a:t>7/20/2014</a:t>
+              <a:t>7/21/2014</a:t>
             </a:fld>
             <a:endParaRPr lang="en-US"/>
           </a:p>
@@ -2241,7 +2241,7 @@
           <a:p>
             <a:fld id="{C16D46D2-A5CF-4EF4-A6E9-A8A0D2AF825B}" type="datetimeFigureOut">
               <a:rPr lang="en-US" smtClean="0"/>
-              <a:t>7/20/2014</a:t>
+              <a:t>7/21/2014</a:t>
             </a:fld>
             <a:endParaRPr lang="en-US"/>
           </a:p>
@@ -2336,7 +2336,7 @@
           <a:p>
             <a:fld id="{C16D46D2-A5CF-4EF4-A6E9-A8A0D2AF825B}" type="datetimeFigureOut">
               <a:rPr lang="en-US" smtClean="0"/>
-              <a:t>7/20/2014</a:t>
+              <a:t>7/21/2014</a:t>
             </a:fld>
             <a:endParaRPr lang="en-US"/>
           </a:p>
@@ -2613,7 +2613,7 @@
           <a:p>
             <a:fld id="{C16D46D2-A5CF-4EF4-A6E9-A8A0D2AF825B}" type="datetimeFigureOut">
               <a:rPr lang="en-US" smtClean="0"/>
-              <a:t>7/20/2014</a:t>
+              <a:t>7/21/2014</a:t>
             </a:fld>
             <a:endParaRPr lang="en-US"/>
           </a:p>
@@ -2866,7 +2866,7 @@
           <a:p>
             <a:fld id="{C16D46D2-A5CF-4EF4-A6E9-A8A0D2AF825B}" type="datetimeFigureOut">
               <a:rPr lang="en-US" smtClean="0"/>
-              <a:t>7/20/2014</a:t>
+              <a:t>7/21/2014</a:t>
             </a:fld>
             <a:endParaRPr lang="en-US"/>
           </a:p>
@@ -3082,7 +3082,7 @@
           <a:p>
             <a:fld id="{C16D46D2-A5CF-4EF4-A6E9-A8A0D2AF825B}" type="datetimeFigureOut">
               <a:rPr lang="en-US" smtClean="0"/>
-              <a:t>7/20/2014</a:t>
+              <a:t>7/21/2014</a:t>
             </a:fld>
             <a:endParaRPr lang="en-US"/>
           </a:p>
@@ -3615,7 +3615,7 @@
         </p:nvSpPr>
         <p:spPr>
           <a:xfrm>
-            <a:off x="1761067" y="3508863"/>
+            <a:off x="1638628" y="4343400"/>
             <a:ext cx="947695" cy="523220"/>
           </a:xfrm>
           <a:prstGeom prst="rect">
@@ -3653,7 +3653,7 @@
         </p:nvSpPr>
         <p:spPr>
           <a:xfrm>
-            <a:off x="4191000" y="5410200"/>
+            <a:off x="4462424" y="6096000"/>
             <a:ext cx="1124026" cy="461665"/>
           </a:xfrm>
           <a:prstGeom prst="rect">
@@ -3691,7 +3691,7 @@
         </p:nvSpPr>
         <p:spPr>
           <a:xfrm>
-            <a:off x="6934200" y="3535865"/>
+            <a:off x="7501467" y="4184765"/>
             <a:ext cx="899605" cy="461665"/>
           </a:xfrm>
           <a:prstGeom prst="rect">
@@ -3718,6 +3718,172 @@
                 <a:schemeClr val="bg1"/>
               </a:solidFill>
             </a:endParaRPr>
+          </a:p>
+        </p:txBody>
+      </p:sp>
+      <p:sp>
+        <p:nvSpPr>
+          <p:cNvPr id="9" name="Oval 8"/>
+          <p:cNvSpPr/>
+          <p:nvPr/>
+        </p:nvSpPr>
+        <p:spPr>
+          <a:xfrm>
+            <a:off x="821839" y="1828800"/>
+            <a:ext cx="2581275" cy="2438400"/>
+          </a:xfrm>
+          <a:prstGeom prst="ellipse">
+            <a:avLst/>
+          </a:prstGeom>
+          <a:blipFill>
+            <a:blip r:embed="rId2"/>
+            <a:stretch>
+              <a:fillRect/>
+            </a:stretch>
+          </a:blipFill>
+          <a:ln w="63500" cmpd="sng">
+            <a:solidFill>
+              <a:schemeClr val="bg1"/>
+            </a:solidFill>
+          </a:ln>
+        </p:spPr>
+        <p:style>
+          <a:lnRef idx="2">
+            <a:schemeClr val="accent1">
+              <a:shade val="50000"/>
+            </a:schemeClr>
+          </a:lnRef>
+          <a:fillRef idx="1">
+            <a:schemeClr val="accent1"/>
+          </a:fillRef>
+          <a:effectRef idx="0">
+            <a:schemeClr val="accent1"/>
+          </a:effectRef>
+          <a:fontRef idx="minor">
+            <a:schemeClr val="lt1"/>
+          </a:fontRef>
+        </p:style>
+        <p:txBody>
+          <a:bodyPr rot="0" spcFirstLastPara="0" vert="horz" wrap="square" lIns="91440" tIns="45720" rIns="91440" bIns="45720" numCol="1" spcCol="0" rtlCol="0" fromWordArt="0" anchor="ctr" anchorCtr="0" forceAA="0" compatLnSpc="1">
+            <a:prstTxWarp prst="textNoShape">
+              <a:avLst/>
+            </a:prstTxWarp>
+            <a:noAutofit/>
+          </a:bodyPr>
+          <a:lstStyle/>
+          <a:p>
+            <a:endParaRPr lang="en-US"/>
+          </a:p>
+        </p:txBody>
+      </p:sp>
+      <p:sp>
+        <p:nvSpPr>
+          <p:cNvPr id="10" name="Oval 9"/>
+          <p:cNvSpPr/>
+          <p:nvPr/>
+        </p:nvSpPr>
+        <p:spPr>
+          <a:xfrm>
+            <a:off x="3714044" y="3671711"/>
+            <a:ext cx="2581275" cy="2438400"/>
+          </a:xfrm>
+          <a:prstGeom prst="ellipse">
+            <a:avLst/>
+          </a:prstGeom>
+          <a:blipFill>
+            <a:blip r:embed="rId3"/>
+            <a:stretch>
+              <a:fillRect/>
+            </a:stretch>
+          </a:blipFill>
+          <a:ln w="63500" cmpd="sng">
+            <a:solidFill>
+              <a:schemeClr val="bg1"/>
+            </a:solidFill>
+          </a:ln>
+        </p:spPr>
+        <p:style>
+          <a:lnRef idx="2">
+            <a:schemeClr val="accent1">
+              <a:shade val="50000"/>
+            </a:schemeClr>
+          </a:lnRef>
+          <a:fillRef idx="1">
+            <a:schemeClr val="accent1"/>
+          </a:fillRef>
+          <a:effectRef idx="0">
+            <a:schemeClr val="accent1"/>
+          </a:effectRef>
+          <a:fontRef idx="minor">
+            <a:schemeClr val="lt1"/>
+          </a:fontRef>
+        </p:style>
+        <p:txBody>
+          <a:bodyPr rot="0" spcFirstLastPara="0" vert="horz" wrap="square" lIns="91440" tIns="45720" rIns="91440" bIns="45720" numCol="1" spcCol="0" rtlCol="0" fromWordArt="0" anchor="ctr" anchorCtr="0" forceAA="0" compatLnSpc="1">
+            <a:prstTxWarp prst="textNoShape">
+              <a:avLst/>
+            </a:prstTxWarp>
+            <a:noAutofit/>
+          </a:bodyPr>
+          <a:lstStyle/>
+          <a:p>
+            <a:endParaRPr lang="en-US"/>
+          </a:p>
+        </p:txBody>
+      </p:sp>
+      <p:sp>
+        <p:nvSpPr>
+          <p:cNvPr id="11" name="Oval 10"/>
+          <p:cNvSpPr/>
+          <p:nvPr/>
+        </p:nvSpPr>
+        <p:spPr>
+          <a:xfrm>
+            <a:off x="6421436" y="1600200"/>
+            <a:ext cx="2581275" cy="2438400"/>
+          </a:xfrm>
+          <a:prstGeom prst="ellipse">
+            <a:avLst/>
+          </a:prstGeom>
+          <a:blipFill dpi="0" rotWithShape="1">
+            <a:blip r:embed="rId4"/>
+            <a:srcRect/>
+            <a:stretch>
+              <a:fillRect/>
+            </a:stretch>
+          </a:blipFill>
+          <a:ln w="63500" cmpd="sng">
+            <a:solidFill>
+              <a:schemeClr val="bg1"/>
+            </a:solidFill>
+          </a:ln>
+        </p:spPr>
+        <p:style>
+          <a:lnRef idx="2">
+            <a:schemeClr val="accent1">
+              <a:shade val="50000"/>
+            </a:schemeClr>
+          </a:lnRef>
+          <a:fillRef idx="1">
+            <a:schemeClr val="accent1"/>
+          </a:fillRef>
+          <a:effectRef idx="0">
+            <a:schemeClr val="accent1"/>
+          </a:effectRef>
+          <a:fontRef idx="minor">
+            <a:schemeClr val="lt1"/>
+          </a:fontRef>
+        </p:style>
+        <p:txBody>
+          <a:bodyPr rot="0" spcFirstLastPara="0" vert="horz" wrap="square" lIns="91440" tIns="45720" rIns="91440" bIns="45720" numCol="1" spcCol="0" rtlCol="0" fromWordArt="0" anchor="ctr" anchorCtr="0" forceAA="0" compatLnSpc="1">
+            <a:prstTxWarp prst="textNoShape">
+              <a:avLst/>
+            </a:prstTxWarp>
+            <a:noAutofit/>
+          </a:bodyPr>
+          <a:lstStyle/>
+          <a:p>
+            <a:endParaRPr lang="en-US"/>
           </a:p>
         </p:txBody>
       </p:sp>

</xml_diff>

<commit_message>
Updated splash screen with big logo
</commit_message>
<xml_diff>
--- a/docs/groupProject.pptx
+++ b/docs/groupProject.pptx
@@ -198,7 +198,7 @@
           <a:p>
             <a:fld id="{5EE39229-6641-4520-99DB-0FFD4D3BF858}" type="datetimeFigureOut">
               <a:rPr lang="en-US" smtClean="0"/>
-              <a:t>7/21/2014</a:t>
+              <a:t>7/22/2014</a:t>
             </a:fld>
             <a:endParaRPr lang="en-US"/>
           </a:p>
@@ -647,7 +647,7 @@
           <a:p>
             <a:fld id="{C16D46D2-A5CF-4EF4-A6E9-A8A0D2AF825B}" type="datetimeFigureOut">
               <a:rPr lang="en-US" smtClean="0"/>
-              <a:t>7/21/2014</a:t>
+              <a:t>7/22/2014</a:t>
             </a:fld>
             <a:endParaRPr lang="en-US"/>
           </a:p>
@@ -817,7 +817,7 @@
           <a:p>
             <a:fld id="{C16D46D2-A5CF-4EF4-A6E9-A8A0D2AF825B}" type="datetimeFigureOut">
               <a:rPr lang="en-US" smtClean="0"/>
-              <a:t>7/21/2014</a:t>
+              <a:t>7/22/2014</a:t>
             </a:fld>
             <a:endParaRPr lang="en-US"/>
           </a:p>
@@ -997,7 +997,7 @@
           <a:p>
             <a:fld id="{C16D46D2-A5CF-4EF4-A6E9-A8A0D2AF825B}" type="datetimeFigureOut">
               <a:rPr lang="en-US" smtClean="0"/>
-              <a:t>7/21/2014</a:t>
+              <a:t>7/22/2014</a:t>
             </a:fld>
             <a:endParaRPr lang="en-US"/>
           </a:p>
@@ -1167,7 +1167,7 @@
           <a:p>
             <a:fld id="{C16D46D2-A5CF-4EF4-A6E9-A8A0D2AF825B}" type="datetimeFigureOut">
               <a:rPr lang="en-US" smtClean="0"/>
-              <a:t>7/21/2014</a:t>
+              <a:t>7/22/2014</a:t>
             </a:fld>
             <a:endParaRPr lang="en-US"/>
           </a:p>
@@ -1413,7 +1413,7 @@
           <a:p>
             <a:fld id="{C16D46D2-A5CF-4EF4-A6E9-A8A0D2AF825B}" type="datetimeFigureOut">
               <a:rPr lang="en-US" smtClean="0"/>
-              <a:t>7/21/2014</a:t>
+              <a:t>7/22/2014</a:t>
             </a:fld>
             <a:endParaRPr lang="en-US"/>
           </a:p>
@@ -1701,7 +1701,7 @@
           <a:p>
             <a:fld id="{C16D46D2-A5CF-4EF4-A6E9-A8A0D2AF825B}" type="datetimeFigureOut">
               <a:rPr lang="en-US" smtClean="0"/>
-              <a:t>7/21/2014</a:t>
+              <a:t>7/22/2014</a:t>
             </a:fld>
             <a:endParaRPr lang="en-US"/>
           </a:p>
@@ -2123,7 +2123,7 @@
           <a:p>
             <a:fld id="{C16D46D2-A5CF-4EF4-A6E9-A8A0D2AF825B}" type="datetimeFigureOut">
               <a:rPr lang="en-US" smtClean="0"/>
-              <a:t>7/21/2014</a:t>
+              <a:t>7/22/2014</a:t>
             </a:fld>
             <a:endParaRPr lang="en-US"/>
           </a:p>
@@ -2241,7 +2241,7 @@
           <a:p>
             <a:fld id="{C16D46D2-A5CF-4EF4-A6E9-A8A0D2AF825B}" type="datetimeFigureOut">
               <a:rPr lang="en-US" smtClean="0"/>
-              <a:t>7/21/2014</a:t>
+              <a:t>7/22/2014</a:t>
             </a:fld>
             <a:endParaRPr lang="en-US"/>
           </a:p>
@@ -2336,7 +2336,7 @@
           <a:p>
             <a:fld id="{C16D46D2-A5CF-4EF4-A6E9-A8A0D2AF825B}" type="datetimeFigureOut">
               <a:rPr lang="en-US" smtClean="0"/>
-              <a:t>7/21/2014</a:t>
+              <a:t>7/22/2014</a:t>
             </a:fld>
             <a:endParaRPr lang="en-US"/>
           </a:p>
@@ -2613,7 +2613,7 @@
           <a:p>
             <a:fld id="{C16D46D2-A5CF-4EF4-A6E9-A8A0D2AF825B}" type="datetimeFigureOut">
               <a:rPr lang="en-US" smtClean="0"/>
-              <a:t>7/21/2014</a:t>
+              <a:t>7/22/2014</a:t>
             </a:fld>
             <a:endParaRPr lang="en-US"/>
           </a:p>
@@ -2866,7 +2866,7 @@
           <a:p>
             <a:fld id="{C16D46D2-A5CF-4EF4-A6E9-A8A0D2AF825B}" type="datetimeFigureOut">
               <a:rPr lang="en-US" smtClean="0"/>
-              <a:t>7/21/2014</a:t>
+              <a:t>7/22/2014</a:t>
             </a:fld>
             <a:endParaRPr lang="en-US"/>
           </a:p>
@@ -3082,7 +3082,7 @@
           <a:p>
             <a:fld id="{C16D46D2-A5CF-4EF4-A6E9-A8A0D2AF825B}" type="datetimeFigureOut">
               <a:rPr lang="en-US" smtClean="0"/>
-              <a:t>7/21/2014</a:t>
+              <a:t>7/22/2014</a:t>
             </a:fld>
             <a:endParaRPr lang="en-US"/>
           </a:p>
@@ -3480,20 +3480,12 @@
           <a:lstStyle/>
           <a:p>
             <a:r>
-              <a:rPr lang="en-US" sz="7200" b="1" dirty="0" err="1" smtClean="0">
+              <a:rPr lang="en-US" sz="7200" b="1" dirty="0" smtClean="0">
                 <a:solidFill>
                   <a:schemeClr val="bg1"/>
                 </a:solidFill>
               </a:rPr>
-              <a:t>Watsi</a:t>
-            </a:r>
-            <a:r>
-              <a:rPr lang="en-US" sz="7200" b="1" dirty="0" smtClean="0">
-                <a:solidFill>
-                  <a:schemeClr val="bg1"/>
-                </a:solidFill>
-              </a:rPr>
-              <a:t> App</a:t>
+              <a:t>Watsi App</a:t>
             </a:r>
             <a:endParaRPr lang="en-US" sz="7200" b="1" dirty="0">
               <a:solidFill>
@@ -3615,8 +3607,8 @@
         </p:nvSpPr>
         <p:spPr>
           <a:xfrm>
-            <a:off x="1638628" y="4343400"/>
-            <a:ext cx="947695" cy="523220"/>
+            <a:off x="1026339" y="4267200"/>
+            <a:ext cx="981359" cy="523220"/>
           </a:xfrm>
           <a:prstGeom prst="rect">
             <a:avLst/>
@@ -3653,8 +3645,8 @@
         </p:nvSpPr>
         <p:spPr>
           <a:xfrm>
-            <a:off x="4462424" y="6096000"/>
-            <a:ext cx="1124026" cy="461665"/>
+            <a:off x="4343400" y="6072553"/>
+            <a:ext cx="1300356" cy="523220"/>
           </a:xfrm>
           <a:prstGeom prst="rect">
             <a:avLst/>
@@ -3668,14 +3660,14 @@
           <a:lstStyle/>
           <a:p>
             <a:r>
-              <a:rPr lang="en-US" sz="2400" dirty="0" smtClean="0">
+              <a:rPr lang="en-US" sz="2800" dirty="0" smtClean="0">
                 <a:solidFill>
                   <a:schemeClr val="bg1"/>
                 </a:solidFill>
               </a:rPr>
               <a:t>Ganesh</a:t>
             </a:r>
-            <a:endParaRPr lang="en-US" sz="2400" dirty="0">
+            <a:endParaRPr lang="en-US" sz="2800" dirty="0">
               <a:solidFill>
                 <a:schemeClr val="bg1"/>
               </a:solidFill>
@@ -3691,8 +3683,8 @@
         </p:nvSpPr>
         <p:spPr>
           <a:xfrm>
-            <a:off x="7501467" y="4184765"/>
-            <a:ext cx="899605" cy="461665"/>
+            <a:off x="7513190" y="4112567"/>
+            <a:ext cx="1053494" cy="523220"/>
           </a:xfrm>
           <a:prstGeom prst="rect">
             <a:avLst/>
@@ -3706,14 +3698,14 @@
           <a:lstStyle/>
           <a:p>
             <a:r>
-              <a:rPr lang="en-US" sz="2400" dirty="0" err="1" smtClean="0">
+              <a:rPr lang="en-US" sz="2800" dirty="0" err="1" smtClean="0">
                 <a:solidFill>
                   <a:schemeClr val="bg1"/>
                 </a:solidFill>
               </a:rPr>
               <a:t>Rutvij</a:t>
             </a:r>
-            <a:endParaRPr lang="en-US" sz="2400" dirty="0">
+            <a:endParaRPr lang="en-US" sz="2800" dirty="0">
               <a:solidFill>
                 <a:schemeClr val="bg1"/>
               </a:solidFill>
@@ -3723,14 +3715,14 @@
       </p:sp>
       <p:sp>
         <p:nvSpPr>
-          <p:cNvPr id="9" name="Oval 8"/>
+          <p:cNvPr id="12" name="Oval 11"/>
           <p:cNvSpPr/>
           <p:nvPr/>
         </p:nvSpPr>
         <p:spPr>
           <a:xfrm>
-            <a:off x="821839" y="1828800"/>
-            <a:ext cx="2581275" cy="2438400"/>
+            <a:off x="7025054" y="2426641"/>
+            <a:ext cx="1781175" cy="1685925"/>
           </a:xfrm>
           <a:prstGeom prst="ellipse">
             <a:avLst/>
@@ -3778,14 +3770,14 @@
       </p:sp>
       <p:sp>
         <p:nvSpPr>
-          <p:cNvPr id="10" name="Oval 9"/>
+          <p:cNvPr id="13" name="Oval 12"/>
           <p:cNvSpPr/>
           <p:nvPr/>
         </p:nvSpPr>
         <p:spPr>
           <a:xfrm>
-            <a:off x="3714044" y="3671711"/>
-            <a:ext cx="2581275" cy="2438400"/>
+            <a:off x="609600" y="2426642"/>
+            <a:ext cx="1781175" cy="1685925"/>
           </a:xfrm>
           <a:prstGeom prst="ellipse">
             <a:avLst/>
@@ -3833,21 +3825,20 @@
       </p:sp>
       <p:sp>
         <p:nvSpPr>
-          <p:cNvPr id="11" name="Oval 10"/>
+          <p:cNvPr id="14" name="Oval 13"/>
           <p:cNvSpPr/>
           <p:nvPr/>
         </p:nvSpPr>
         <p:spPr>
           <a:xfrm>
-            <a:off x="6421436" y="1600200"/>
-            <a:ext cx="2581275" cy="2438400"/>
+            <a:off x="3962400" y="4175972"/>
+            <a:ext cx="1781175" cy="1685925"/>
           </a:xfrm>
           <a:prstGeom prst="ellipse">
             <a:avLst/>
           </a:prstGeom>
-          <a:blipFill dpi="0" rotWithShape="1">
+          <a:blipFill>
             <a:blip r:embed="rId4"/>
-            <a:srcRect/>
             <a:stretch>
               <a:fillRect/>
             </a:stretch>
@@ -4055,20 +4046,12 @@
               <a:buChar char="•"/>
             </a:pPr>
             <a:r>
-              <a:rPr lang="en-US" sz="3200" dirty="0" err="1" smtClean="0">
+              <a:rPr lang="en-US" sz="3200" dirty="0" smtClean="0">
                 <a:solidFill>
                   <a:schemeClr val="bg1"/>
                 </a:solidFill>
               </a:rPr>
-              <a:t>Watsi</a:t>
-            </a:r>
-            <a:r>
-              <a:rPr lang="en-US" sz="3200" dirty="0" smtClean="0">
-                <a:solidFill>
-                  <a:schemeClr val="bg1"/>
-                </a:solidFill>
-              </a:rPr>
-              <a:t> </a:t>
+              <a:t>Watsi </a:t>
             </a:r>
             <a:r>
               <a:rPr lang="en-US" sz="3200" dirty="0">
@@ -4141,23 +4124,7 @@
                   <a:schemeClr val="bg1"/>
                 </a:solidFill>
               </a:rPr>
-              <a:t>Why </a:t>
-            </a:r>
-            <a:r>
-              <a:rPr lang="en-US" sz="4800" b="1" dirty="0" err="1" smtClean="0">
-                <a:solidFill>
-                  <a:schemeClr val="bg1"/>
-                </a:solidFill>
-              </a:rPr>
-              <a:t>Watsi</a:t>
-            </a:r>
-            <a:r>
-              <a:rPr lang="en-US" sz="4800" b="1" dirty="0" smtClean="0">
-                <a:solidFill>
-                  <a:schemeClr val="bg1"/>
-                </a:solidFill>
-              </a:rPr>
-              <a:t> App</a:t>
+              <a:t>Why Watsi App</a:t>
             </a:r>
             <a:endParaRPr lang="en-US" sz="4800" b="1" dirty="0">
               <a:solidFill>
@@ -4176,7 +4143,7 @@
         <p:spPr>
           <a:xfrm>
             <a:off x="228600" y="2438400"/>
-            <a:ext cx="8839200" cy="2062103"/>
+            <a:ext cx="8839200" cy="2554545"/>
           </a:xfrm>
           <a:prstGeom prst="rect">
             <a:avLst/>
@@ -4199,7 +4166,39 @@
                   <a:schemeClr val="bg1"/>
                 </a:solidFill>
               </a:rPr>
-              <a:t>100% of donation funds life-changing healthcare.</a:t>
+              <a:t>Spread </a:t>
+            </a:r>
+            <a:r>
+              <a:rPr lang="en-US" sz="3200" dirty="0" smtClean="0">
+                <a:solidFill>
+                  <a:schemeClr val="bg1"/>
+                </a:solidFill>
+              </a:rPr>
+              <a:t>awareness about </a:t>
+            </a:r>
+            <a:r>
+              <a:rPr lang="en-US" sz="3200" dirty="0">
+                <a:solidFill>
+                  <a:schemeClr val="bg1"/>
+                </a:solidFill>
+              </a:rPr>
+              <a:t>W</a:t>
+            </a:r>
+            <a:r>
+              <a:rPr lang="en-US" sz="3200" dirty="0" smtClean="0">
+                <a:solidFill>
+                  <a:schemeClr val="bg1"/>
+                </a:solidFill>
+              </a:rPr>
+              <a:t>atsi </a:t>
+            </a:r>
+            <a:r>
+              <a:rPr lang="en-US" sz="3200" dirty="0" smtClean="0">
+                <a:solidFill>
+                  <a:schemeClr val="bg1"/>
+                </a:solidFill>
+              </a:rPr>
+              <a:t>patients.</a:t>
             </a:r>
           </a:p>
           <a:p>
@@ -4208,28 +4207,20 @@
               <a:buChar char="•"/>
             </a:pPr>
             <a:r>
+              <a:rPr lang="en-US" sz="3200" dirty="0">
+                <a:solidFill>
+                  <a:schemeClr val="bg1"/>
+                </a:solidFill>
+              </a:rPr>
+              <a:t>S</a:t>
+            </a:r>
+            <a:r>
               <a:rPr lang="en-US" sz="3200" dirty="0" smtClean="0">
                 <a:solidFill>
                   <a:schemeClr val="bg1"/>
                 </a:solidFill>
               </a:rPr>
-              <a:t>Spread awareness about </a:t>
-            </a:r>
-            <a:r>
-              <a:rPr lang="en-US" sz="3200" dirty="0" err="1" smtClean="0">
-                <a:solidFill>
-                  <a:schemeClr val="bg1"/>
-                </a:solidFill>
-              </a:rPr>
-              <a:t>watis</a:t>
-            </a:r>
-            <a:r>
-              <a:rPr lang="en-US" sz="3200" dirty="0" smtClean="0">
-                <a:solidFill>
-                  <a:schemeClr val="bg1"/>
-                </a:solidFill>
-              </a:rPr>
-              <a:t> patients.</a:t>
+              <a:t>ocial network engagement. </a:t>
             </a:r>
           </a:p>
           <a:p>
@@ -4238,12 +4229,20 @@
               <a:buChar char="•"/>
             </a:pPr>
             <a:r>
+              <a:rPr lang="en-US" sz="3200" dirty="0" smtClean="0">
+                <a:solidFill>
+                  <a:schemeClr val="bg1"/>
+                </a:solidFill>
+              </a:rPr>
+              <a:t>Helps </a:t>
+            </a:r>
+            <a:r>
               <a:rPr lang="en-US" sz="3200" dirty="0">
                 <a:solidFill>
                   <a:schemeClr val="bg1"/>
                 </a:solidFill>
               </a:rPr>
-              <a:t>S</a:t>
+              <a:t>running donation </a:t>
             </a:r>
             <a:r>
               <a:rPr lang="en-US" sz="3200" dirty="0" smtClean="0">
@@ -4251,7 +4250,15 @@
                   <a:schemeClr val="bg1"/>
                 </a:solidFill>
               </a:rPr>
-              <a:t>ocial network engagement. </a:t>
+              <a:t>campaigns</a:t>
+            </a:r>
+            <a:r>
+              <a:rPr lang="en-US" sz="3200" dirty="0" smtClean="0">
+                <a:solidFill>
+                  <a:schemeClr val="bg1"/>
+                </a:solidFill>
+              </a:rPr>
+              <a:t>.</a:t>
             </a:r>
           </a:p>
           <a:p>
@@ -4260,29 +4267,15 @@
               <a:buChar char="•"/>
             </a:pPr>
             <a:r>
-              <a:rPr lang="en-US" sz="3200" dirty="0" smtClean="0">
+              <a:rPr lang="en-US" sz="3200" dirty="0">
                 <a:solidFill>
                   <a:schemeClr val="bg1"/>
                 </a:solidFill>
               </a:rPr>
-              <a:t>Help </a:t>
-            </a:r>
-            <a:r>
-              <a:rPr lang="en-US" sz="3200" dirty="0">
-                <a:solidFill>
-                  <a:schemeClr val="bg1"/>
-                </a:solidFill>
-              </a:rPr>
-              <a:t>running donation </a:t>
-            </a:r>
-            <a:r>
-              <a:rPr lang="en-US" sz="3200" dirty="0" smtClean="0">
-                <a:solidFill>
-                  <a:schemeClr val="bg1"/>
-                </a:solidFill>
-              </a:rPr>
-              <a:t>campaigns.</a:t>
-            </a:r>
+              <a:t>100% of donation funds life-changing healthcare.</a:t>
+            </a:r>
+          </a:p>
+          <a:p>
             <a:endParaRPr lang="en-US" sz="3200" dirty="0">
               <a:solidFill>
                 <a:schemeClr val="bg1"/>
@@ -4459,8 +4452,21 @@
                   <a:schemeClr val="bg1"/>
                 </a:solidFill>
               </a:rPr>
-              <a:t>No API from watis.org</a:t>
-            </a:r>
+              <a:t>No API from </a:t>
+            </a:r>
+            <a:r>
+              <a:rPr lang="en-US" sz="3200" dirty="0" smtClean="0">
+                <a:solidFill>
+                  <a:schemeClr val="bg1"/>
+                </a:solidFill>
+              </a:rPr>
+              <a:t>watsi.org</a:t>
+            </a:r>
+            <a:endParaRPr lang="en-US" sz="3200" dirty="0" smtClean="0">
+              <a:solidFill>
+                <a:schemeClr val="bg1"/>
+              </a:solidFill>
+            </a:endParaRPr>
           </a:p>
           <a:p>
             <a:pPr marL="285750" indent="-285750">

</xml_diff>

<commit_message>
Changes in future work to be done.
</commit_message>
<xml_diff>
--- a/docs/groupProject.pptx
+++ b/docs/groupProject.pptx
@@ -198,7 +198,7 @@
           <a:p>
             <a:fld id="{5EE39229-6641-4520-99DB-0FFD4D3BF858}" type="datetimeFigureOut">
               <a:rPr lang="en-US" smtClean="0"/>
-              <a:t>7/22/2014</a:t>
+              <a:t>7/23/14</a:t>
             </a:fld>
             <a:endParaRPr lang="en-US"/>
           </a:p>
@@ -647,7 +647,7 @@
           <a:p>
             <a:fld id="{C16D46D2-A5CF-4EF4-A6E9-A8A0D2AF825B}" type="datetimeFigureOut">
               <a:rPr lang="en-US" smtClean="0"/>
-              <a:t>7/22/2014</a:t>
+              <a:t>7/23/14</a:t>
             </a:fld>
             <a:endParaRPr lang="en-US"/>
           </a:p>
@@ -817,7 +817,7 @@
           <a:p>
             <a:fld id="{C16D46D2-A5CF-4EF4-A6E9-A8A0D2AF825B}" type="datetimeFigureOut">
               <a:rPr lang="en-US" smtClean="0"/>
-              <a:t>7/22/2014</a:t>
+              <a:t>7/23/14</a:t>
             </a:fld>
             <a:endParaRPr lang="en-US"/>
           </a:p>
@@ -997,7 +997,7 @@
           <a:p>
             <a:fld id="{C16D46D2-A5CF-4EF4-A6E9-A8A0D2AF825B}" type="datetimeFigureOut">
               <a:rPr lang="en-US" smtClean="0"/>
-              <a:t>7/22/2014</a:t>
+              <a:t>7/23/14</a:t>
             </a:fld>
             <a:endParaRPr lang="en-US"/>
           </a:p>
@@ -1167,7 +1167,7 @@
           <a:p>
             <a:fld id="{C16D46D2-A5CF-4EF4-A6E9-A8A0D2AF825B}" type="datetimeFigureOut">
               <a:rPr lang="en-US" smtClean="0"/>
-              <a:t>7/22/2014</a:t>
+              <a:t>7/23/14</a:t>
             </a:fld>
             <a:endParaRPr lang="en-US"/>
           </a:p>
@@ -1413,7 +1413,7 @@
           <a:p>
             <a:fld id="{C16D46D2-A5CF-4EF4-A6E9-A8A0D2AF825B}" type="datetimeFigureOut">
               <a:rPr lang="en-US" smtClean="0"/>
-              <a:t>7/22/2014</a:t>
+              <a:t>7/23/14</a:t>
             </a:fld>
             <a:endParaRPr lang="en-US"/>
           </a:p>
@@ -1701,7 +1701,7 @@
           <a:p>
             <a:fld id="{C16D46D2-A5CF-4EF4-A6E9-A8A0D2AF825B}" type="datetimeFigureOut">
               <a:rPr lang="en-US" smtClean="0"/>
-              <a:t>7/22/2014</a:t>
+              <a:t>7/23/14</a:t>
             </a:fld>
             <a:endParaRPr lang="en-US"/>
           </a:p>
@@ -2123,7 +2123,7 @@
           <a:p>
             <a:fld id="{C16D46D2-A5CF-4EF4-A6E9-A8A0D2AF825B}" type="datetimeFigureOut">
               <a:rPr lang="en-US" smtClean="0"/>
-              <a:t>7/22/2014</a:t>
+              <a:t>7/23/14</a:t>
             </a:fld>
             <a:endParaRPr lang="en-US"/>
           </a:p>
@@ -2241,7 +2241,7 @@
           <a:p>
             <a:fld id="{C16D46D2-A5CF-4EF4-A6E9-A8A0D2AF825B}" type="datetimeFigureOut">
               <a:rPr lang="en-US" smtClean="0"/>
-              <a:t>7/22/2014</a:t>
+              <a:t>7/23/14</a:t>
             </a:fld>
             <a:endParaRPr lang="en-US"/>
           </a:p>
@@ -2336,7 +2336,7 @@
           <a:p>
             <a:fld id="{C16D46D2-A5CF-4EF4-A6E9-A8A0D2AF825B}" type="datetimeFigureOut">
               <a:rPr lang="en-US" smtClean="0"/>
-              <a:t>7/22/2014</a:t>
+              <a:t>7/23/14</a:t>
             </a:fld>
             <a:endParaRPr lang="en-US"/>
           </a:p>
@@ -2613,7 +2613,7 @@
           <a:p>
             <a:fld id="{C16D46D2-A5CF-4EF4-A6E9-A8A0D2AF825B}" type="datetimeFigureOut">
               <a:rPr lang="en-US" smtClean="0"/>
-              <a:t>7/22/2014</a:t>
+              <a:t>7/23/14</a:t>
             </a:fld>
             <a:endParaRPr lang="en-US"/>
           </a:p>
@@ -2866,7 +2866,7 @@
           <a:p>
             <a:fld id="{C16D46D2-A5CF-4EF4-A6E9-A8A0D2AF825B}" type="datetimeFigureOut">
               <a:rPr lang="en-US" smtClean="0"/>
-              <a:t>7/22/2014</a:t>
+              <a:t>7/23/14</a:t>
             </a:fld>
             <a:endParaRPr lang="en-US"/>
           </a:p>
@@ -3082,7 +3082,7 @@
           <a:p>
             <a:fld id="{C16D46D2-A5CF-4EF4-A6E9-A8A0D2AF825B}" type="datetimeFigureOut">
               <a:rPr lang="en-US" smtClean="0"/>
-              <a:t>7/22/2014</a:t>
+              <a:t>7/23/14</a:t>
             </a:fld>
             <a:endParaRPr lang="en-US"/>
           </a:p>
@@ -3480,12 +3480,12 @@
           <a:lstStyle/>
           <a:p>
             <a:r>
-              <a:rPr lang="en-US" sz="7200" b="1" dirty="0" smtClean="0">
+              <a:rPr lang="en-US" sz="7200" b="1" dirty="0" err="1" smtClean="0">
                 <a:solidFill>
                   <a:schemeClr val="bg1"/>
                 </a:solidFill>
               </a:rPr>
-              <a:t>Watsi App</a:t>
+              <a:t>Watsi</a:t>
             </a:r>
             <a:endParaRPr lang="en-US" sz="7200" b="1" dirty="0">
               <a:solidFill>
@@ -3513,14 +3513,14 @@
             <a:r>
               <a:rPr lang="en-US" dirty="0" smtClean="0">
                 <a:solidFill>
-                  <a:srgbClr val="002060"/>
+                  <a:schemeClr val="bg1"/>
                 </a:solidFill>
               </a:rPr>
               <a:t>Fund healthcare for people around the world.</a:t>
             </a:r>
             <a:endParaRPr lang="en-US" dirty="0">
               <a:solidFill>
-                <a:srgbClr val="002060"/>
+                <a:schemeClr val="bg1"/>
               </a:solidFill>
             </a:endParaRPr>
           </a:p>
@@ -3539,7 +3539,7 @@
   <p:timing>
     <p:tnLst>
       <p:par>
-        <p:cTn id="1" dur="indefinite" restart="never" nodeType="tmRoot"/>
+        <p:cTn xmlns:p14="http://schemas.microsoft.com/office/powerpoint/2010/main" id="1" dur="indefinite" restart="never" nodeType="tmRoot"/>
       </p:par>
     </p:tnLst>
   </p:timing>
@@ -3891,7 +3891,7 @@
   <p:timing>
     <p:tnLst>
       <p:par>
-        <p:cTn id="1" dur="indefinite" restart="never" nodeType="tmRoot"/>
+        <p:cTn xmlns:p14="http://schemas.microsoft.com/office/powerpoint/2010/main" id="1" dur="indefinite" restart="never" nodeType="tmRoot"/>
       </p:par>
     </p:tnLst>
   </p:timing>
@@ -4077,7 +4077,7 @@
   <p:timing>
     <p:tnLst>
       <p:par>
-        <p:cTn id="1" dur="indefinite" restart="never" nodeType="tmRoot"/>
+        <p:cTn xmlns:p14="http://schemas.microsoft.com/office/powerpoint/2010/main" id="1" dur="indefinite" restart="never" nodeType="tmRoot"/>
       </p:par>
     </p:tnLst>
   </p:timing>
@@ -4166,15 +4166,7 @@
                   <a:schemeClr val="bg1"/>
                 </a:solidFill>
               </a:rPr>
-              <a:t>Spread </a:t>
-            </a:r>
-            <a:r>
-              <a:rPr lang="en-US" sz="3200" dirty="0" smtClean="0">
-                <a:solidFill>
-                  <a:schemeClr val="bg1"/>
-                </a:solidFill>
-              </a:rPr>
-              <a:t>awareness about </a:t>
+              <a:t>Spread awareness about </a:t>
             </a:r>
             <a:r>
               <a:rPr lang="en-US" sz="3200" dirty="0">
@@ -4190,15 +4182,7 @@
                   <a:schemeClr val="bg1"/>
                 </a:solidFill>
               </a:rPr>
-              <a:t>atsi </a:t>
-            </a:r>
-            <a:r>
-              <a:rPr lang="en-US" sz="3200" dirty="0" smtClean="0">
-                <a:solidFill>
-                  <a:schemeClr val="bg1"/>
-                </a:solidFill>
-              </a:rPr>
-              <a:t>patients.</a:t>
+              <a:t>atsi patients.</a:t>
             </a:r>
           </a:p>
           <a:p>
@@ -4250,15 +4234,7 @@
                   <a:schemeClr val="bg1"/>
                 </a:solidFill>
               </a:rPr>
-              <a:t>campaigns</a:t>
-            </a:r>
-            <a:r>
-              <a:rPr lang="en-US" sz="3200" dirty="0" smtClean="0">
-                <a:solidFill>
-                  <a:schemeClr val="bg1"/>
-                </a:solidFill>
-              </a:rPr>
-              <a:t>.</a:t>
+              <a:t>campaigns.</a:t>
             </a:r>
           </a:p>
           <a:p>
@@ -4297,7 +4273,7 @@
   <p:timing>
     <p:tnLst>
       <p:par>
-        <p:cTn id="1" dur="indefinite" restart="never" nodeType="tmRoot"/>
+        <p:cTn xmlns:p14="http://schemas.microsoft.com/office/powerpoint/2010/main" id="1" dur="indefinite" restart="never" nodeType="tmRoot"/>
       </p:par>
     </p:tnLst>
   </p:timing>
@@ -4365,7 +4341,7 @@
   <p:timing>
     <p:tnLst>
       <p:par>
-        <p:cTn id="1" dur="indefinite" restart="never" nodeType="tmRoot"/>
+        <p:cTn xmlns:p14="http://schemas.microsoft.com/office/powerpoint/2010/main" id="1" dur="indefinite" restart="never" nodeType="tmRoot"/>
       </p:par>
     </p:tnLst>
   </p:timing>
@@ -4452,21 +4428,8 @@
                   <a:schemeClr val="bg1"/>
                 </a:solidFill>
               </a:rPr>
-              <a:t>No API from </a:t>
-            </a:r>
-            <a:r>
-              <a:rPr lang="en-US" sz="3200" dirty="0" smtClean="0">
-                <a:solidFill>
-                  <a:schemeClr val="bg1"/>
-                </a:solidFill>
-              </a:rPr>
-              <a:t>watsi.org</a:t>
-            </a:r>
-            <a:endParaRPr lang="en-US" sz="3200" dirty="0" smtClean="0">
-              <a:solidFill>
-                <a:schemeClr val="bg1"/>
-              </a:solidFill>
-            </a:endParaRPr>
+              <a:t>No API from watsi.org</a:t>
+            </a:r>
           </a:p>
           <a:p>
             <a:pPr marL="285750" indent="-285750">
@@ -4497,7 +4460,7 @@
   <p:timing>
     <p:tnLst>
       <p:par>
-        <p:cTn id="1" dur="indefinite" restart="never" nodeType="tmRoot"/>
+        <p:cTn xmlns:p14="http://schemas.microsoft.com/office/powerpoint/2010/main" id="1" dur="indefinite" restart="never" nodeType="tmRoot"/>
       </p:par>
     </p:tnLst>
   </p:timing>
@@ -4561,7 +4524,7 @@
         <p:spPr>
           <a:xfrm>
             <a:off x="228600" y="2438400"/>
-            <a:ext cx="8839200" cy="1569660"/>
+            <a:ext cx="8839200" cy="3539430"/>
           </a:xfrm>
           <a:prstGeom prst="rect">
             <a:avLst/>
@@ -4598,8 +4561,106 @@
                   <a:schemeClr val="bg1"/>
                 </a:solidFill>
               </a:rPr>
-              <a:t>Location aware notifications.</a:t>
-            </a:r>
+              <a:t>Location aware notifications</a:t>
+            </a:r>
+            <a:r>
+              <a:rPr lang="en-US" sz="3200" dirty="0" smtClean="0">
+                <a:solidFill>
+                  <a:schemeClr val="bg1"/>
+                </a:solidFill>
+              </a:rPr>
+              <a:t>.</a:t>
+            </a:r>
+          </a:p>
+          <a:p>
+            <a:pPr marL="285750" indent="-285750">
+              <a:buFont typeface="Arial" panose="020B0604020202020204" pitchFamily="34" charset="0"/>
+              <a:buChar char="•"/>
+            </a:pPr>
+            <a:r>
+              <a:rPr lang="en-US" sz="3200" dirty="0" smtClean="0">
+                <a:solidFill>
+                  <a:schemeClr val="bg1"/>
+                </a:solidFill>
+              </a:rPr>
+              <a:t>Payment Module</a:t>
+            </a:r>
+          </a:p>
+          <a:p>
+            <a:pPr marL="285750" indent="-285750">
+              <a:buFont typeface="Arial" panose="020B0604020202020204" pitchFamily="34" charset="0"/>
+              <a:buChar char="•"/>
+            </a:pPr>
+            <a:r>
+              <a:rPr lang="en-US" sz="3200" dirty="0" smtClean="0">
+                <a:solidFill>
+                  <a:schemeClr val="bg1"/>
+                </a:solidFill>
+              </a:rPr>
+              <a:t>Auto pay start of every month</a:t>
+            </a:r>
+          </a:p>
+          <a:p>
+            <a:pPr marL="285750" indent="-285750">
+              <a:buFont typeface="Arial" panose="020B0604020202020204" pitchFamily="34" charset="0"/>
+              <a:buChar char="•"/>
+            </a:pPr>
+            <a:r>
+              <a:rPr lang="en-US" sz="3200" dirty="0" smtClean="0">
+                <a:solidFill>
+                  <a:schemeClr val="bg1"/>
+                </a:solidFill>
+              </a:rPr>
+              <a:t>Integration with </a:t>
+            </a:r>
+            <a:r>
+              <a:rPr lang="en-US" sz="3200" dirty="0" err="1" smtClean="0">
+                <a:solidFill>
+                  <a:schemeClr val="bg1"/>
+                </a:solidFill>
+              </a:rPr>
+              <a:t>Watsi</a:t>
+            </a:r>
+            <a:r>
+              <a:rPr lang="en-US" sz="3200" dirty="0" smtClean="0">
+                <a:solidFill>
+                  <a:schemeClr val="bg1"/>
+                </a:solidFill>
+              </a:rPr>
+              <a:t> </a:t>
+            </a:r>
+            <a:r>
+              <a:rPr lang="en-US" sz="3200" dirty="0" err="1" smtClean="0">
+                <a:solidFill>
+                  <a:schemeClr val="bg1"/>
+                </a:solidFill>
+              </a:rPr>
+              <a:t>Api</a:t>
+            </a:r>
+            <a:endParaRPr lang="en-US" sz="3200" dirty="0">
+              <a:solidFill>
+                <a:schemeClr val="bg1"/>
+              </a:solidFill>
+            </a:endParaRPr>
+          </a:p>
+          <a:p>
+            <a:pPr marL="285750" indent="-285750">
+              <a:buFont typeface="Arial" panose="020B0604020202020204" pitchFamily="34" charset="0"/>
+              <a:buChar char="•"/>
+            </a:pPr>
+            <a:r>
+              <a:rPr lang="en-US" sz="3200" dirty="0" smtClean="0">
+                <a:solidFill>
+                  <a:schemeClr val="bg1"/>
+                </a:solidFill>
+              </a:rPr>
+              <a:t>Generate graph on map base on donation data.</a:t>
+            </a:r>
+            <a:endParaRPr lang="en-US" sz="3200" dirty="0" smtClean="0">
+              <a:solidFill>
+                <a:schemeClr val="bg1"/>
+              </a:solidFill>
+            </a:endParaRPr>
           </a:p>
           <a:p>
             <a:pPr marL="285750" indent="-285750">
@@ -4630,7 +4691,7 @@
   <p:timing>
     <p:tnLst>
       <p:par>
-        <p:cTn id="1" dur="indefinite" restart="never" nodeType="tmRoot"/>
+        <p:cTn xmlns:p14="http://schemas.microsoft.com/office/powerpoint/2010/main" id="1" dur="indefinite" restart="never" nodeType="tmRoot"/>
       </p:par>
     </p:tnLst>
   </p:timing>

</xml_diff>

<commit_message>
Notes added to why watsi application and team slide.
</commit_message>
<xml_diff>
--- a/docs/groupProject.pptx
+++ b/docs/groupProject.pptx
@@ -464,6 +464,309 @@
     </a:lvl9pPr>
   </p:notesStyle>
 </p:notesMaster>
+</file>
+
+<file path=ppt/notesSlides/notesSlide1.xml><?xml version="1.0" encoding="utf-8"?>
+<p:notes xmlns:a="http://schemas.openxmlformats.org/drawingml/2006/main" xmlns:r="http://schemas.openxmlformats.org/officeDocument/2006/relationships" xmlns:p="http://schemas.openxmlformats.org/presentationml/2006/main">
+  <p:cSld>
+    <p:spTree>
+      <p:nvGrpSpPr>
+        <p:cNvPr id="1" name=""/>
+        <p:cNvGrpSpPr/>
+        <p:nvPr/>
+      </p:nvGrpSpPr>
+      <p:grpSpPr>
+        <a:xfrm>
+          <a:off x="0" y="0"/>
+          <a:ext cx="0" cy="0"/>
+          <a:chOff x="0" y="0"/>
+          <a:chExt cx="0" cy="0"/>
+        </a:xfrm>
+      </p:grpSpPr>
+      <p:sp>
+        <p:nvSpPr>
+          <p:cNvPr id="2" name="Slide Image Placeholder 1"/>
+          <p:cNvSpPr>
+            <a:spLocks noGrp="1" noRot="1" noChangeAspect="1"/>
+          </p:cNvSpPr>
+          <p:nvPr>
+            <p:ph type="sldImg"/>
+          </p:nvPr>
+        </p:nvSpPr>
+        <p:spPr/>
+      </p:sp>
+      <p:sp>
+        <p:nvSpPr>
+          <p:cNvPr id="3" name="Notes Placeholder 2"/>
+          <p:cNvSpPr>
+            <a:spLocks noGrp="1"/>
+          </p:cNvSpPr>
+          <p:nvPr>
+            <p:ph type="body" idx="1"/>
+          </p:nvPr>
+        </p:nvSpPr>
+        <p:spPr/>
+        <p:txBody>
+          <a:bodyPr/>
+          <a:lstStyle/>
+          <a:p>
+            <a:endParaRPr lang="en-US" baseline="0" dirty="0" smtClean="0"/>
+          </a:p>
+        </p:txBody>
+      </p:sp>
+      <p:sp>
+        <p:nvSpPr>
+          <p:cNvPr id="4" name="Slide Number Placeholder 3"/>
+          <p:cNvSpPr>
+            <a:spLocks noGrp="1"/>
+          </p:cNvSpPr>
+          <p:nvPr>
+            <p:ph type="sldNum" sz="quarter" idx="10"/>
+          </p:nvPr>
+        </p:nvSpPr>
+        <p:spPr/>
+        <p:txBody>
+          <a:bodyPr/>
+          <a:lstStyle/>
+          <a:p>
+            <a:fld id="{8738D58C-D4A8-410D-9205-74F086C3C47E}" type="slidenum">
+              <a:rPr lang="en-US" smtClean="0"/>
+              <a:t>1</a:t>
+            </a:fld>
+            <a:endParaRPr lang="en-US"/>
+          </a:p>
+        </p:txBody>
+      </p:sp>
+    </p:spTree>
+    <p:extLst>
+      <p:ext uri="{BB962C8B-B14F-4D97-AF65-F5344CB8AC3E}">
+        <p14:creationId xmlns:p14="http://schemas.microsoft.com/office/powerpoint/2010/main" val="2402665071"/>
+      </p:ext>
+    </p:extLst>
+  </p:cSld>
+  <p:clrMapOvr>
+    <a:masterClrMapping/>
+  </p:clrMapOvr>
+</p:notes>
+</file>
+
+<file path=ppt/notesSlides/notesSlide2.xml><?xml version="1.0" encoding="utf-8"?>
+<p:notes xmlns:a="http://schemas.openxmlformats.org/drawingml/2006/main" xmlns:r="http://schemas.openxmlformats.org/officeDocument/2006/relationships" xmlns:p="http://schemas.openxmlformats.org/presentationml/2006/main">
+  <p:cSld>
+    <p:spTree>
+      <p:nvGrpSpPr>
+        <p:cNvPr id="1" name=""/>
+        <p:cNvGrpSpPr/>
+        <p:nvPr/>
+      </p:nvGrpSpPr>
+      <p:grpSpPr>
+        <a:xfrm>
+          <a:off x="0" y="0"/>
+          <a:ext cx="0" cy="0"/>
+          <a:chOff x="0" y="0"/>
+          <a:chExt cx="0" cy="0"/>
+        </a:xfrm>
+      </p:grpSpPr>
+      <p:sp>
+        <p:nvSpPr>
+          <p:cNvPr id="2" name="Slide Image Placeholder 1"/>
+          <p:cNvSpPr>
+            <a:spLocks noGrp="1" noRot="1" noChangeAspect="1"/>
+          </p:cNvSpPr>
+          <p:nvPr>
+            <p:ph type="sldImg"/>
+          </p:nvPr>
+        </p:nvSpPr>
+        <p:spPr/>
+      </p:sp>
+      <p:sp>
+        <p:nvSpPr>
+          <p:cNvPr id="3" name="Notes Placeholder 2"/>
+          <p:cNvSpPr>
+            <a:spLocks noGrp="1"/>
+          </p:cNvSpPr>
+          <p:nvPr>
+            <p:ph type="body" idx="1"/>
+          </p:nvPr>
+        </p:nvSpPr>
+        <p:spPr/>
+        <p:txBody>
+          <a:bodyPr/>
+          <a:lstStyle/>
+          <a:p>
+            <a:r>
+              <a:rPr lang="en-US" dirty="0" smtClean="0"/>
+              <a:t>Our</a:t>
+            </a:r>
+            <a:r>
+              <a:rPr lang="en-US" baseline="0" dirty="0" smtClean="0"/>
+              <a:t> team was a perfect blend of Front end, backend and work experience.</a:t>
+            </a:r>
+          </a:p>
+          <a:p>
+            <a:r>
+              <a:rPr lang="en-US" baseline="0" dirty="0" smtClean="0"/>
+              <a:t>Sprint planning was done in such a manner to pick up stories that were feasible in time limit and we made sure that we are planning to keep time to think about design and polish.</a:t>
+            </a:r>
+          </a:p>
+          <a:p>
+            <a:endParaRPr lang="en-US" baseline="0" dirty="0" smtClean="0"/>
+          </a:p>
+          <a:p>
+            <a:r>
+              <a:rPr lang="en-US" baseline="0" dirty="0" smtClean="0"/>
+              <a:t>Our application focused on simple usable design. Application is made keeping UX in mind. </a:t>
+            </a:r>
+            <a:endParaRPr lang="en-US" dirty="0"/>
+          </a:p>
+        </p:txBody>
+      </p:sp>
+      <p:sp>
+        <p:nvSpPr>
+          <p:cNvPr id="4" name="Slide Number Placeholder 3"/>
+          <p:cNvSpPr>
+            <a:spLocks noGrp="1"/>
+          </p:cNvSpPr>
+          <p:nvPr>
+            <p:ph type="sldNum" sz="quarter" idx="10"/>
+          </p:nvPr>
+        </p:nvSpPr>
+        <p:spPr/>
+        <p:txBody>
+          <a:bodyPr/>
+          <a:lstStyle/>
+          <a:p>
+            <a:fld id="{8738D58C-D4A8-410D-9205-74F086C3C47E}" type="slidenum">
+              <a:rPr lang="en-US" smtClean="0"/>
+              <a:t>2</a:t>
+            </a:fld>
+            <a:endParaRPr lang="en-US"/>
+          </a:p>
+        </p:txBody>
+      </p:sp>
+    </p:spTree>
+    <p:extLst>
+      <p:ext uri="{BB962C8B-B14F-4D97-AF65-F5344CB8AC3E}">
+        <p14:creationId xmlns:p14="http://schemas.microsoft.com/office/powerpoint/2010/main" val="3431739888"/>
+      </p:ext>
+    </p:extLst>
+  </p:cSld>
+  <p:clrMapOvr>
+    <a:masterClrMapping/>
+  </p:clrMapOvr>
+</p:notes>
+</file>
+
+<file path=ppt/notesSlides/notesSlide3.xml><?xml version="1.0" encoding="utf-8"?>
+<p:notes xmlns:a="http://schemas.openxmlformats.org/drawingml/2006/main" xmlns:r="http://schemas.openxmlformats.org/officeDocument/2006/relationships" xmlns:p="http://schemas.openxmlformats.org/presentationml/2006/main">
+  <p:cSld>
+    <p:spTree>
+      <p:nvGrpSpPr>
+        <p:cNvPr id="1" name=""/>
+        <p:cNvGrpSpPr/>
+        <p:nvPr/>
+      </p:nvGrpSpPr>
+      <p:grpSpPr>
+        <a:xfrm>
+          <a:off x="0" y="0"/>
+          <a:ext cx="0" cy="0"/>
+          <a:chOff x="0" y="0"/>
+          <a:chExt cx="0" cy="0"/>
+        </a:xfrm>
+      </p:grpSpPr>
+      <p:sp>
+        <p:nvSpPr>
+          <p:cNvPr id="2" name="Slide Image Placeholder 1"/>
+          <p:cNvSpPr>
+            <a:spLocks noGrp="1" noRot="1" noChangeAspect="1"/>
+          </p:cNvSpPr>
+          <p:nvPr>
+            <p:ph type="sldImg"/>
+          </p:nvPr>
+        </p:nvSpPr>
+        <p:spPr/>
+      </p:sp>
+      <p:sp>
+        <p:nvSpPr>
+          <p:cNvPr id="3" name="Notes Placeholder 2"/>
+          <p:cNvSpPr>
+            <a:spLocks noGrp="1"/>
+          </p:cNvSpPr>
+          <p:nvPr>
+            <p:ph type="body" idx="1"/>
+          </p:nvPr>
+        </p:nvSpPr>
+        <p:spPr/>
+        <p:txBody>
+          <a:bodyPr/>
+          <a:lstStyle/>
+          <a:p>
+            <a:r>
+              <a:rPr lang="en-US" dirty="0" smtClean="0"/>
+              <a:t>What</a:t>
+            </a:r>
+            <a:r>
+              <a:rPr lang="en-US" baseline="0" dirty="0" smtClean="0"/>
+              <a:t> can a user do in using our application. User stories </a:t>
+            </a:r>
+          </a:p>
+          <a:p>
+            <a:r>
+              <a:rPr lang="en-US" baseline="0" dirty="0" smtClean="0"/>
+              <a:t> Browse list of patients see progress of each patient, their medical need. </a:t>
+            </a:r>
+          </a:p>
+          <a:p>
+            <a:r>
+              <a:rPr lang="en-US" baseline="0" dirty="0" smtClean="0"/>
+              <a:t>	Either donate or share on social networking site so as to spread awareness about the people in need. </a:t>
+            </a:r>
+          </a:p>
+          <a:p>
+            <a:r>
+              <a:rPr lang="en-US" baseline="0" dirty="0" smtClean="0"/>
+              <a:t>In activity feed user can know about which patients got funded special campaign messages and new patients that have joined the portal.</a:t>
+            </a:r>
+          </a:p>
+          <a:p>
+            <a:endParaRPr lang="en-US" dirty="0"/>
+          </a:p>
+        </p:txBody>
+      </p:sp>
+      <p:sp>
+        <p:nvSpPr>
+          <p:cNvPr id="4" name="Slide Number Placeholder 3"/>
+          <p:cNvSpPr>
+            <a:spLocks noGrp="1"/>
+          </p:cNvSpPr>
+          <p:nvPr>
+            <p:ph type="sldNum" sz="quarter" idx="10"/>
+          </p:nvPr>
+        </p:nvSpPr>
+        <p:spPr/>
+        <p:txBody>
+          <a:bodyPr/>
+          <a:lstStyle/>
+          <a:p>
+            <a:fld id="{8738D58C-D4A8-410D-9205-74F086C3C47E}" type="slidenum">
+              <a:rPr lang="en-US" smtClean="0"/>
+              <a:t>4</a:t>
+            </a:fld>
+            <a:endParaRPr lang="en-US"/>
+          </a:p>
+        </p:txBody>
+      </p:sp>
+    </p:spTree>
+    <p:extLst>
+      <p:ext uri="{BB962C8B-B14F-4D97-AF65-F5344CB8AC3E}">
+        <p14:creationId xmlns:p14="http://schemas.microsoft.com/office/powerpoint/2010/main" val="868549489"/>
+      </p:ext>
+    </p:extLst>
+  </p:cSld>
+  <p:clrMapOvr>
+    <a:masterClrMapping/>
+  </p:clrMapOvr>
+</p:notes>
 </file>
 
 <file path=ppt/slideLayouts/slideLayout1.xml><?xml version="1.0" encoding="utf-8"?>
@@ -3728,61 +4031,6 @@
             <a:avLst/>
           </a:prstGeom>
           <a:blipFill>
-            <a:blip r:embed="rId2"/>
-            <a:stretch>
-              <a:fillRect/>
-            </a:stretch>
-          </a:blipFill>
-          <a:ln w="63500" cmpd="sng">
-            <a:solidFill>
-              <a:schemeClr val="bg1"/>
-            </a:solidFill>
-          </a:ln>
-        </p:spPr>
-        <p:style>
-          <a:lnRef idx="2">
-            <a:schemeClr val="accent1">
-              <a:shade val="50000"/>
-            </a:schemeClr>
-          </a:lnRef>
-          <a:fillRef idx="1">
-            <a:schemeClr val="accent1"/>
-          </a:fillRef>
-          <a:effectRef idx="0">
-            <a:schemeClr val="accent1"/>
-          </a:effectRef>
-          <a:fontRef idx="minor">
-            <a:schemeClr val="lt1"/>
-          </a:fontRef>
-        </p:style>
-        <p:txBody>
-          <a:bodyPr rot="0" spcFirstLastPara="0" vert="horz" wrap="square" lIns="91440" tIns="45720" rIns="91440" bIns="45720" numCol="1" spcCol="0" rtlCol="0" fromWordArt="0" anchor="ctr" anchorCtr="0" forceAA="0" compatLnSpc="1">
-            <a:prstTxWarp prst="textNoShape">
-              <a:avLst/>
-            </a:prstTxWarp>
-            <a:noAutofit/>
-          </a:bodyPr>
-          <a:lstStyle/>
-          <a:p>
-            <a:endParaRPr lang="en-US"/>
-          </a:p>
-        </p:txBody>
-      </p:sp>
-      <p:sp>
-        <p:nvSpPr>
-          <p:cNvPr id="13" name="Oval 12"/>
-          <p:cNvSpPr/>
-          <p:nvPr/>
-        </p:nvSpPr>
-        <p:spPr>
-          <a:xfrm>
-            <a:off x="609600" y="2426642"/>
-            <a:ext cx="1781175" cy="1685925"/>
-          </a:xfrm>
-          <a:prstGeom prst="ellipse">
-            <a:avLst/>
-          </a:prstGeom>
-          <a:blipFill>
             <a:blip r:embed="rId3"/>
             <a:stretch>
               <a:fillRect/>
@@ -3825,6 +4073,61 @@
       </p:sp>
       <p:sp>
         <p:nvSpPr>
+          <p:cNvPr id="13" name="Oval 12"/>
+          <p:cNvSpPr/>
+          <p:nvPr/>
+        </p:nvSpPr>
+        <p:spPr>
+          <a:xfrm>
+            <a:off x="609600" y="2426642"/>
+            <a:ext cx="1781175" cy="1685925"/>
+          </a:xfrm>
+          <a:prstGeom prst="ellipse">
+            <a:avLst/>
+          </a:prstGeom>
+          <a:blipFill>
+            <a:blip r:embed="rId4"/>
+            <a:stretch>
+              <a:fillRect/>
+            </a:stretch>
+          </a:blipFill>
+          <a:ln w="63500" cmpd="sng">
+            <a:solidFill>
+              <a:schemeClr val="bg1"/>
+            </a:solidFill>
+          </a:ln>
+        </p:spPr>
+        <p:style>
+          <a:lnRef idx="2">
+            <a:schemeClr val="accent1">
+              <a:shade val="50000"/>
+            </a:schemeClr>
+          </a:lnRef>
+          <a:fillRef idx="1">
+            <a:schemeClr val="accent1"/>
+          </a:fillRef>
+          <a:effectRef idx="0">
+            <a:schemeClr val="accent1"/>
+          </a:effectRef>
+          <a:fontRef idx="minor">
+            <a:schemeClr val="lt1"/>
+          </a:fontRef>
+        </p:style>
+        <p:txBody>
+          <a:bodyPr rot="0" spcFirstLastPara="0" vert="horz" wrap="square" lIns="91440" tIns="45720" rIns="91440" bIns="45720" numCol="1" spcCol="0" rtlCol="0" fromWordArt="0" anchor="ctr" anchorCtr="0" forceAA="0" compatLnSpc="1">
+            <a:prstTxWarp prst="textNoShape">
+              <a:avLst/>
+            </a:prstTxWarp>
+            <a:noAutofit/>
+          </a:bodyPr>
+          <a:lstStyle/>
+          <a:p>
+            <a:endParaRPr lang="en-US"/>
+          </a:p>
+        </p:txBody>
+      </p:sp>
+      <p:sp>
+        <p:nvSpPr>
           <p:cNvPr id="14" name="Oval 13"/>
           <p:cNvSpPr/>
           <p:nvPr/>
@@ -3838,7 +4141,7 @@
             <a:avLst/>
           </a:prstGeom>
           <a:blipFill>
-            <a:blip r:embed="rId4"/>
+            <a:blip r:embed="rId5"/>
             <a:stretch>
               <a:fillRect/>
             </a:stretch>

</xml_diff>

<commit_message>
Updated Presentation with Thanks
</commit_message>
<xml_diff>
--- a/docs/groupProject.pptx
+++ b/docs/groupProject.pptx
@@ -5,7 +5,7 @@
     <p:sldMasterId id="2147483648" r:id="rId1"/>
   </p:sldMasterIdLst>
   <p:notesMasterIdLst>
-    <p:notesMasterId r:id="rId9"/>
+    <p:notesMasterId r:id="rId10"/>
   </p:notesMasterIdLst>
   <p:sldIdLst>
     <p:sldId id="256" r:id="rId2"/>
@@ -15,6 +15,7 @@
     <p:sldId id="260" r:id="rId6"/>
     <p:sldId id="261" r:id="rId7"/>
     <p:sldId id="262" r:id="rId8"/>
+    <p:sldId id="263" r:id="rId9"/>
   </p:sldIdLst>
   <p:sldSz cx="9144000" cy="6858000" type="screen4x3"/>
   <p:notesSz cx="6858000" cy="9144000"/>
@@ -851,11 +852,7 @@
           <a:p>
             <a:r>
               <a:rPr lang="en-US" baseline="0" dirty="0" smtClean="0"/>
-              <a:t>In activity feed user can know about which patients got funded special campaign messages and new patients that have joined the portal</a:t>
-            </a:r>
-            <a:r>
-              <a:rPr lang="en-US" baseline="0" dirty="0" smtClean="0"/>
-              <a:t>.</a:t>
+              <a:t>In activity feed user can know about which patients got funded special campaign messages and new patients that have joined the portal.</a:t>
             </a:r>
           </a:p>
           <a:p>
@@ -1110,6 +1107,173 @@
             <a:fld id="{8738D58C-D4A8-410D-9205-74F086C3C47E}" type="slidenum">
               <a:rPr lang="en-US" smtClean="0"/>
               <a:t>7</a:t>
+            </a:fld>
+            <a:endParaRPr lang="en-US"/>
+          </a:p>
+        </p:txBody>
+      </p:sp>
+    </p:spTree>
+    <p:extLst>
+      <p:ext uri="{BB962C8B-B14F-4D97-AF65-F5344CB8AC3E}">
+        <p14:creationId xmlns:p14="http://schemas.microsoft.com/office/powerpoint/2010/main" val="1916185895"/>
+      </p:ext>
+    </p:extLst>
+  </p:cSld>
+  <p:clrMapOvr>
+    <a:masterClrMapping/>
+  </p:clrMapOvr>
+</p:notes>
+</file>
+
+<file path=ppt/notesSlides/notesSlide6.xml><?xml version="1.0" encoding="utf-8"?>
+<p:notes xmlns:a="http://schemas.openxmlformats.org/drawingml/2006/main" xmlns:r="http://schemas.openxmlformats.org/officeDocument/2006/relationships" xmlns:p="http://schemas.openxmlformats.org/presentationml/2006/main">
+  <p:cSld>
+    <p:spTree>
+      <p:nvGrpSpPr>
+        <p:cNvPr id="1" name=""/>
+        <p:cNvGrpSpPr/>
+        <p:nvPr/>
+      </p:nvGrpSpPr>
+      <p:grpSpPr>
+        <a:xfrm>
+          <a:off x="0" y="0"/>
+          <a:ext cx="0" cy="0"/>
+          <a:chOff x="0" y="0"/>
+          <a:chExt cx="0" cy="0"/>
+        </a:xfrm>
+      </p:grpSpPr>
+      <p:sp>
+        <p:nvSpPr>
+          <p:cNvPr id="2" name="Slide Image Placeholder 1"/>
+          <p:cNvSpPr>
+            <a:spLocks noGrp="1" noRot="1" noChangeAspect="1"/>
+          </p:cNvSpPr>
+          <p:nvPr>
+            <p:ph type="sldImg"/>
+          </p:nvPr>
+        </p:nvSpPr>
+        <p:spPr/>
+      </p:sp>
+      <p:sp>
+        <p:nvSpPr>
+          <p:cNvPr id="3" name="Notes Placeholder 2"/>
+          <p:cNvSpPr>
+            <a:spLocks noGrp="1"/>
+          </p:cNvSpPr>
+          <p:nvPr>
+            <p:ph type="body" idx="1"/>
+          </p:nvPr>
+        </p:nvSpPr>
+        <p:spPr/>
+        <p:txBody>
+          <a:bodyPr/>
+          <a:lstStyle/>
+          <a:p>
+            <a:pPr marL="285750" indent="-285750">
+              <a:buFont typeface="Arial" panose="020B0604020202020204" pitchFamily="34" charset="0"/>
+              <a:buChar char="•"/>
+            </a:pPr>
+            <a:r>
+              <a:rPr lang="en-US" sz="1200" dirty="0" smtClean="0">
+                <a:solidFill>
+                  <a:schemeClr val="bg1"/>
+                </a:solidFill>
+              </a:rPr>
+              <a:t>Tablet UI</a:t>
+            </a:r>
+          </a:p>
+          <a:p>
+            <a:pPr marL="285750" indent="-285750">
+              <a:buFont typeface="Arial" panose="020B0604020202020204" pitchFamily="34" charset="0"/>
+              <a:buChar char="•"/>
+            </a:pPr>
+            <a:r>
+              <a:rPr lang="en-US" sz="1200" dirty="0" smtClean="0">
+                <a:solidFill>
+                  <a:schemeClr val="bg1"/>
+                </a:solidFill>
+              </a:rPr>
+              <a:t>Location aware notifications.</a:t>
+            </a:r>
+          </a:p>
+          <a:p>
+            <a:pPr marL="285750" indent="-285750">
+              <a:buFont typeface="Arial" panose="020B0604020202020204" pitchFamily="34" charset="0"/>
+              <a:buChar char="•"/>
+            </a:pPr>
+            <a:r>
+              <a:rPr lang="en-US" sz="1200" dirty="0" smtClean="0">
+                <a:solidFill>
+                  <a:schemeClr val="bg1"/>
+                </a:solidFill>
+              </a:rPr>
+              <a:t>Auto pay start of every month</a:t>
+            </a:r>
+          </a:p>
+          <a:p>
+            <a:pPr marL="285750" indent="-285750">
+              <a:buFont typeface="Arial" panose="020B0604020202020204" pitchFamily="34" charset="0"/>
+              <a:buChar char="•"/>
+            </a:pPr>
+            <a:r>
+              <a:rPr lang="en-US" sz="1200" dirty="0" smtClean="0">
+                <a:solidFill>
+                  <a:schemeClr val="bg1"/>
+                </a:solidFill>
+              </a:rPr>
+              <a:t>Integration with Watsi </a:t>
+            </a:r>
+            <a:r>
+              <a:rPr lang="en-US" sz="1200" dirty="0" err="1" smtClean="0">
+                <a:solidFill>
+                  <a:schemeClr val="bg1"/>
+                </a:solidFill>
+              </a:rPr>
+              <a:t>Api</a:t>
+            </a:r>
+            <a:endParaRPr lang="en-US" sz="1200" dirty="0" smtClean="0">
+              <a:solidFill>
+                <a:schemeClr val="bg1"/>
+              </a:solidFill>
+            </a:endParaRPr>
+          </a:p>
+          <a:p>
+            <a:pPr marL="285750" indent="-285750">
+              <a:buFont typeface="Arial" panose="020B0604020202020204" pitchFamily="34" charset="0"/>
+              <a:buChar char="•"/>
+            </a:pPr>
+            <a:r>
+              <a:rPr lang="en-US" sz="1200" dirty="0" smtClean="0">
+                <a:solidFill>
+                  <a:schemeClr val="bg1"/>
+                </a:solidFill>
+              </a:rPr>
+              <a:t>Heat map based on donation data.</a:t>
+            </a:r>
+          </a:p>
+          <a:p>
+            <a:endParaRPr lang="en-US" dirty="0"/>
+          </a:p>
+        </p:txBody>
+      </p:sp>
+      <p:sp>
+        <p:nvSpPr>
+          <p:cNvPr id="4" name="Slide Number Placeholder 3"/>
+          <p:cNvSpPr>
+            <a:spLocks noGrp="1"/>
+          </p:cNvSpPr>
+          <p:nvPr>
+            <p:ph type="sldNum" sz="quarter" idx="10"/>
+          </p:nvPr>
+        </p:nvSpPr>
+        <p:spPr/>
+        <p:txBody>
+          <a:bodyPr/>
+          <a:lstStyle/>
+          <a:p>
+            <a:fld id="{8738D58C-D4A8-410D-9205-74F086C3C47E}" type="slidenum">
+              <a:rPr lang="en-US" smtClean="0"/>
+              <a:t>8</a:t>
             </a:fld>
             <a:endParaRPr lang="en-US"/>
           </a:p>
@@ -4191,7 +4355,7 @@
                   <a:schemeClr val="bg1"/>
                 </a:solidFill>
               </a:rPr>
-              <a:t>world</a:t>
+              <a:t>world.</a:t>
             </a:r>
             <a:endParaRPr lang="en-US" dirty="0">
               <a:solidFill>
@@ -5326,15 +5490,7 @@
                   <a:schemeClr val="bg1"/>
                 </a:solidFill>
               </a:rPr>
-              <a:t>Watsi </a:t>
-            </a:r>
-            <a:r>
-              <a:rPr lang="en-US" sz="4800" b="1" dirty="0" smtClean="0">
-                <a:solidFill>
-                  <a:schemeClr val="bg1"/>
-                </a:solidFill>
-              </a:rPr>
-              <a:t>App</a:t>
+              <a:t>Watsi App</a:t>
             </a:r>
             <a:endParaRPr lang="en-US" sz="4800" b="1" dirty="0">
               <a:solidFill>
@@ -7174,6 +7330,171 @@
     <p:extLst>
       <p:ext uri="{BB962C8B-B14F-4D97-AF65-F5344CB8AC3E}">
         <p14:creationId xmlns:p14="http://schemas.microsoft.com/office/powerpoint/2010/main" val="1182910622"/>
+      </p:ext>
+    </p:extLst>
+  </p:cSld>
+  <p:clrMapOvr>
+    <a:masterClrMapping/>
+  </p:clrMapOvr>
+  <p:timing>
+    <p:tnLst>
+      <p:par>
+        <p:cTn id="1" dur="indefinite" restart="never" nodeType="tmRoot"/>
+      </p:par>
+    </p:tnLst>
+  </p:timing>
+</p:sld>
+</file>
+
+<file path=ppt/slides/slide8.xml><?xml version="1.0" encoding="utf-8"?>
+<p:sld xmlns:a="http://schemas.openxmlformats.org/drawingml/2006/main" xmlns:r="http://schemas.openxmlformats.org/officeDocument/2006/relationships" xmlns:p="http://schemas.openxmlformats.org/presentationml/2006/main">
+  <p:cSld>
+    <p:spTree>
+      <p:nvGrpSpPr>
+        <p:cNvPr id="1" name=""/>
+        <p:cNvGrpSpPr/>
+        <p:nvPr/>
+      </p:nvGrpSpPr>
+      <p:grpSpPr>
+        <a:xfrm>
+          <a:off x="0" y="0"/>
+          <a:ext cx="0" cy="0"/>
+          <a:chOff x="0" y="0"/>
+          <a:chExt cx="0" cy="0"/>
+        </a:xfrm>
+      </p:grpSpPr>
+      <p:sp>
+        <p:nvSpPr>
+          <p:cNvPr id="2" name="Title 1"/>
+          <p:cNvSpPr>
+            <a:spLocks noGrp="1"/>
+          </p:cNvSpPr>
+          <p:nvPr>
+            <p:ph type="title"/>
+          </p:nvPr>
+        </p:nvSpPr>
+        <p:spPr>
+          <a:xfrm>
+            <a:off x="0" y="1981200"/>
+            <a:ext cx="8229600" cy="3200400"/>
+          </a:xfrm>
+        </p:spPr>
+        <p:txBody>
+          <a:bodyPr>
+            <a:normAutofit fontScale="90000"/>
+          </a:bodyPr>
+          <a:lstStyle/>
+          <a:p>
+            <a:r>
+              <a:rPr lang="en-US" dirty="0" smtClean="0">
+                <a:solidFill>
+                  <a:schemeClr val="bg1"/>
+                </a:solidFill>
+              </a:rPr>
+              <a:t>Thanks.</a:t>
+            </a:r>
+            <a:br>
+              <a:rPr lang="en-US" dirty="0" smtClean="0">
+                <a:solidFill>
+                  <a:schemeClr val="bg1"/>
+                </a:solidFill>
+              </a:rPr>
+            </a:br>
+            <a:r>
+              <a:rPr lang="en-US" dirty="0" smtClean="0">
+                <a:solidFill>
+                  <a:schemeClr val="bg1"/>
+                </a:solidFill>
+              </a:rPr>
+              <a:t/>
+            </a:r>
+            <a:br>
+              <a:rPr lang="en-US" dirty="0" smtClean="0">
+                <a:solidFill>
+                  <a:schemeClr val="bg1"/>
+                </a:solidFill>
+              </a:rPr>
+            </a:br>
+            <a:r>
+              <a:rPr lang="en-US" dirty="0">
+                <a:solidFill>
+                  <a:schemeClr val="bg1"/>
+                </a:solidFill>
+              </a:rPr>
+              <a:t/>
+            </a:r>
+            <a:br>
+              <a:rPr lang="en-US" dirty="0">
+                <a:solidFill>
+                  <a:schemeClr val="bg1"/>
+                </a:solidFill>
+              </a:rPr>
+            </a:br>
+            <a:r>
+              <a:rPr lang="en-US" sz="3100" i="1" dirty="0" smtClean="0">
+                <a:solidFill>
+                  <a:schemeClr val="bg1"/>
+                </a:solidFill>
+              </a:rPr>
+              <a:t>Do good, do well. Donate for Watsi.</a:t>
+            </a:r>
+            <a:r>
+              <a:rPr lang="en-US" dirty="0">
+                <a:solidFill>
+                  <a:schemeClr val="bg1"/>
+                </a:solidFill>
+              </a:rPr>
+              <a:t/>
+            </a:r>
+            <a:br>
+              <a:rPr lang="en-US" dirty="0">
+                <a:solidFill>
+                  <a:schemeClr val="bg1"/>
+                </a:solidFill>
+              </a:rPr>
+            </a:br>
+            <a:r>
+              <a:rPr lang="en-US" dirty="0" smtClean="0">
+                <a:solidFill>
+                  <a:schemeClr val="bg1"/>
+                </a:solidFill>
+              </a:rPr>
+              <a:t/>
+            </a:r>
+            <a:br>
+              <a:rPr lang="en-US" dirty="0" smtClean="0">
+                <a:solidFill>
+                  <a:schemeClr val="bg1"/>
+                </a:solidFill>
+              </a:rPr>
+            </a:br>
+            <a:r>
+              <a:rPr lang="en-US" dirty="0" smtClean="0">
+                <a:solidFill>
+                  <a:schemeClr val="bg1"/>
+                </a:solidFill>
+              </a:rPr>
+              <a:t/>
+            </a:r>
+            <a:br>
+              <a:rPr lang="en-US" dirty="0" smtClean="0">
+                <a:solidFill>
+                  <a:schemeClr val="bg1"/>
+                </a:solidFill>
+              </a:rPr>
+            </a:br>
+            <a:endParaRPr lang="en-US" dirty="0">
+              <a:solidFill>
+                <a:schemeClr val="bg1"/>
+              </a:solidFill>
+            </a:endParaRPr>
+          </a:p>
+        </p:txBody>
+      </p:sp>
+    </p:spTree>
+    <p:extLst>
+      <p:ext uri="{BB962C8B-B14F-4D97-AF65-F5344CB8AC3E}">
+        <p14:creationId xmlns:p14="http://schemas.microsoft.com/office/powerpoint/2010/main" val="182225867"/>
       </p:ext>
     </p:extLst>
   </p:cSld>

</xml_diff>

<commit_message>
updated ppt with thanks note
</commit_message>
<xml_diff>
--- a/docs/groupProject.pptx
+++ b/docs/groupProject.pptx
@@ -863,42 +863,20 @@
           <a:p>
             <a:r>
               <a:rPr lang="en-US" baseline="0" dirty="0" smtClean="0"/>
-              <a:t>Create Awareness </a:t>
-            </a:r>
+              <a:t>Create Awareness : Patient list. </a:t>
+            </a:r>
+          </a:p>
+          <a:p>
             <a:r>
               <a:rPr lang="en-US" baseline="0" dirty="0" smtClean="0"/>
-              <a:t>: Patient </a:t>
-            </a:r>
+              <a:t>Help needy : By funding patient or Sharing their need on social media.</a:t>
+            </a:r>
+          </a:p>
+          <a:p>
             <a:r>
               <a:rPr lang="en-US" baseline="0" dirty="0" smtClean="0"/>
-              <a:t>list. </a:t>
-            </a:r>
-            <a:endParaRPr lang="en-US" baseline="0" dirty="0" smtClean="0"/>
-          </a:p>
-          <a:p>
-            <a:r>
-              <a:rPr lang="en-US" baseline="0" dirty="0" smtClean="0"/>
-              <a:t>Help needy </a:t>
-            </a:r>
-            <a:r>
-              <a:rPr lang="en-US" baseline="0" dirty="0" smtClean="0"/>
-              <a:t>: By funding patient or Sharing their need on social media.</a:t>
-            </a:r>
-          </a:p>
-          <a:p>
-            <a:r>
-              <a:rPr lang="en-US" baseline="0" dirty="0" smtClean="0"/>
-              <a:t>Motivate social circle: </a:t>
-            </a:r>
-            <a:r>
-              <a:rPr lang="en-US" baseline="0" dirty="0" smtClean="0"/>
-              <a:t>By campaign messages, Push </a:t>
-            </a:r>
-            <a:r>
-              <a:rPr lang="en-US" baseline="0" dirty="0" smtClean="0"/>
-              <a:t>notifications.</a:t>
-            </a:r>
-            <a:endParaRPr lang="en-US" baseline="0" dirty="0" smtClean="0"/>
+              <a:t>Motivate social circle: By campaign messages, Push notifications.</a:t>
+            </a:r>
           </a:p>
           <a:p>
             <a:endParaRPr lang="en-US" dirty="0"/>
@@ -4615,8 +4593,8 @@
         </p:nvSpPr>
         <p:spPr>
           <a:xfrm>
-            <a:off x="0" y="1981200"/>
-            <a:ext cx="8229600" cy="3200400"/>
+            <a:off x="533400" y="4495800"/>
+            <a:ext cx="8229600" cy="1295400"/>
           </a:xfrm>
         </p:spPr>
         <p:txBody>
@@ -4626,12 +4604,98 @@
           <a:lstStyle/>
           <a:p>
             <a:r>
+              <a:rPr lang="en-US" sz="3200" dirty="0">
+                <a:solidFill>
+                  <a:schemeClr val="bg1"/>
+                </a:solidFill>
+              </a:rPr>
+              <a:t>	</a:t>
+            </a:r>
+            <a:r>
+              <a:rPr lang="en-US" sz="3200" dirty="0" smtClean="0">
+                <a:solidFill>
+                  <a:schemeClr val="bg1"/>
+                </a:solidFill>
+              </a:rPr>
+              <a:t>	     </a:t>
+            </a:r>
+            <a:r>
+              <a:rPr lang="en-US" sz="3200" dirty="0" smtClean="0">
+                <a:solidFill>
+                  <a:schemeClr val="bg1"/>
+                </a:solidFill>
+              </a:rPr>
+              <a:t>Nathan and </a:t>
+            </a:r>
+            <a:r>
+              <a:rPr lang="en-US" sz="3200" dirty="0" err="1" smtClean="0">
+                <a:solidFill>
+                  <a:schemeClr val="bg1"/>
+                </a:solidFill>
+              </a:rPr>
+              <a:t>Codepath</a:t>
+            </a:r>
+            <a:r>
+              <a:rPr lang="en-US" sz="3200" dirty="0" smtClean="0">
+                <a:solidFill>
+                  <a:schemeClr val="bg1"/>
+                </a:solidFill>
+              </a:rPr>
+              <a:t/>
+            </a:r>
+            <a:br>
+              <a:rPr lang="en-US" sz="3200" dirty="0" smtClean="0">
+                <a:solidFill>
+                  <a:schemeClr val="bg1"/>
+                </a:solidFill>
+              </a:rPr>
+            </a:br>
+            <a:r>
+              <a:rPr lang="en-US" sz="3200" dirty="0" smtClean="0">
+                <a:solidFill>
+                  <a:schemeClr val="bg1"/>
+                </a:solidFill>
+              </a:rPr>
+              <a:t>	</a:t>
+            </a:r>
+            <a:r>
+              <a:rPr lang="en-US" sz="3200" dirty="0">
+                <a:solidFill>
+                  <a:schemeClr val="bg1"/>
+                </a:solidFill>
+              </a:rPr>
+              <a:t> </a:t>
+            </a:r>
+            <a:r>
+              <a:rPr lang="en-US" sz="3200" dirty="0" smtClean="0">
+                <a:solidFill>
+                  <a:schemeClr val="bg1"/>
+                </a:solidFill>
+              </a:rPr>
+              <a:t>    Jesus ( Mentor )</a:t>
+            </a:r>
+            <a:br>
+              <a:rPr lang="en-US" sz="3200" dirty="0" smtClean="0">
+                <a:solidFill>
+                  <a:schemeClr val="bg1"/>
+                </a:solidFill>
+              </a:rPr>
+            </a:br>
+            <a:r>
+              <a:rPr lang="en-US" sz="3200" dirty="0" smtClean="0">
+                <a:solidFill>
+                  <a:schemeClr val="bg1"/>
+                </a:solidFill>
+              </a:rPr>
+              <a:t>Yahoo ! </a:t>
+            </a:r>
+            <a:r>
               <a:rPr lang="en-US" dirty="0" smtClean="0">
                 <a:solidFill>
                   <a:schemeClr val="bg1"/>
                 </a:solidFill>
               </a:rPr>
-              <a:t>Thanks.</a:t>
+              <a:t/>
             </a:r>
             <a:br>
               <a:rPr lang="en-US" dirty="0" smtClean="0">
@@ -4669,15 +4733,7 @@
                   <a:schemeClr val="bg1"/>
                 </a:solidFill>
               </a:rPr>
-              <a:t>Do </a:t>
-            </a:r>
-            <a:r>
-              <a:rPr lang="en-US" sz="4000" i="1" dirty="0" smtClean="0">
-                <a:solidFill>
-                  <a:schemeClr val="bg1"/>
-                </a:solidFill>
-              </a:rPr>
-              <a:t>good, do well. Donate for Watsi.</a:t>
+              <a:t>Do good, do well. Donate for Watsi.</a:t>
             </a:r>
             <a:r>
               <a:rPr lang="en-US" sz="4000" dirty="0">
@@ -4725,6 +4781,44 @@
               </a:rPr>
             </a:br>
             <a:endParaRPr lang="en-US" dirty="0">
+              <a:solidFill>
+                <a:schemeClr val="bg1"/>
+              </a:solidFill>
+            </a:endParaRPr>
+          </a:p>
+        </p:txBody>
+      </p:sp>
+      <p:sp>
+        <p:nvSpPr>
+          <p:cNvPr id="3" name="TextBox 2"/>
+          <p:cNvSpPr txBox="1"/>
+          <p:nvPr/>
+        </p:nvSpPr>
+        <p:spPr>
+          <a:xfrm>
+            <a:off x="3581400" y="838200"/>
+            <a:ext cx="1942263" cy="830997"/>
+          </a:xfrm>
+          <a:prstGeom prst="rect">
+            <a:avLst/>
+          </a:prstGeom>
+          <a:noFill/>
+        </p:spPr>
+        <p:txBody>
+          <a:bodyPr wrap="none" rtlCol="0">
+            <a:spAutoFit/>
+          </a:bodyPr>
+          <a:lstStyle/>
+          <a:p>
+            <a:r>
+              <a:rPr lang="en-US" sz="4800" dirty="0" smtClean="0">
+                <a:solidFill>
+                  <a:schemeClr val="bg1"/>
+                </a:solidFill>
+              </a:rPr>
+              <a:t>Thanks</a:t>
+            </a:r>
+            <a:endParaRPr lang="en-US" sz="4800" dirty="0">
               <a:solidFill>
                 <a:schemeClr val="bg1"/>
               </a:solidFill>
@@ -5575,8 +5669,8 @@
         </p:nvSpPr>
         <p:spPr>
           <a:xfrm>
-            <a:off x="239486" y="2286000"/>
-            <a:ext cx="8915400" cy="1846659"/>
+            <a:off x="250372" y="2514600"/>
+            <a:ext cx="8915400" cy="2339102"/>
           </a:xfrm>
           <a:prstGeom prst="rect">
             <a:avLst/>
@@ -5626,7 +5720,29 @@
                   <a:schemeClr val="bg1"/>
                 </a:solidFill>
               </a:rPr>
-              <a:t>Payment Integration for donation</a:t>
+              <a:t>Payment Integration for </a:t>
+            </a:r>
+            <a:r>
+              <a:rPr lang="en-US" sz="3200" dirty="0" smtClean="0">
+                <a:solidFill>
+                  <a:schemeClr val="bg1"/>
+                </a:solidFill>
+              </a:rPr>
+              <a:t>donation</a:t>
+            </a:r>
+          </a:p>
+          <a:p>
+            <a:pPr marL="285750" indent="-285750">
+              <a:buFont typeface="Arial" panose="020B0604020202020204" pitchFamily="34" charset="0"/>
+              <a:buChar char="•"/>
+            </a:pPr>
+            <a:r>
+              <a:rPr lang="en-US" sz="3200" dirty="0" smtClean="0">
+                <a:solidFill>
+                  <a:schemeClr val="bg1"/>
+                </a:solidFill>
+              </a:rPr>
+              <a:t>Third party libraries</a:t>
             </a:r>
             <a:endParaRPr lang="en-US" sz="3200" dirty="0">
               <a:solidFill>
@@ -5755,21 +5871,8 @@
                   <a:schemeClr val="bg1"/>
                 </a:solidFill>
               </a:rPr>
-              <a:t>Code </a:t>
-            </a:r>
-            <a:r>
-              <a:rPr lang="en-US" sz="3200" dirty="0" smtClean="0">
-                <a:solidFill>
-                  <a:schemeClr val="bg1"/>
-                </a:solidFill>
-              </a:rPr>
-              <a:t>improvements.</a:t>
-            </a:r>
-            <a:endParaRPr lang="en-US" sz="3200" dirty="0" smtClean="0">
-              <a:solidFill>
-                <a:schemeClr val="bg1"/>
-              </a:solidFill>
-            </a:endParaRPr>
+              <a:t>Code improvements.</a:t>
+            </a:r>
           </a:p>
           <a:p>
             <a:pPr marL="285750" indent="-285750">

</xml_diff>

<commit_message>
Rervered content of imp slides from pervious presentation
</commit_message>
<xml_diff>
--- a/docs/groupProject.pptx
+++ b/docs/groupProject.pptx
@@ -767,8 +767,23 @@
           <a:p>
             <a:r>
               <a:rPr lang="en-US" baseline="0" dirty="0" smtClean="0"/>
-              <a:t> - &gt; To extend their reach and awareness with our mobile app.</a:t>
-            </a:r>
+              <a:t> - &gt; To extend their reach and awareness with our mobile </a:t>
+            </a:r>
+            <a:r>
+              <a:rPr lang="en-US" baseline="0" dirty="0" smtClean="0"/>
+              <a:t>app.</a:t>
+            </a:r>
+            <a:br>
+              <a:rPr lang="en-US" baseline="0" dirty="0" smtClean="0"/>
+            </a:br>
+            <a:endParaRPr lang="en-US" baseline="0" dirty="0" smtClean="0"/>
+          </a:p>
+          <a:p>
+            <a:r>
+              <a:rPr lang="en-US" baseline="0" dirty="0" smtClean="0"/>
+              <a:t>Pyramid structure of problem and inspiration</a:t>
+            </a:r>
+            <a:endParaRPr lang="en-US" baseline="0" dirty="0" smtClean="0"/>
           </a:p>
         </p:txBody>
       </p:sp>
@@ -1117,6 +1132,20 @@
                 </a:solidFill>
               </a:rPr>
               <a:t>”</a:t>
+            </a:r>
+          </a:p>
+          <a:p>
+            <a:pPr marL="285750" indent="-285750">
+              <a:buFont typeface="Arial" panose="020B0604020202020204" pitchFamily="34" charset="0"/>
+              <a:buChar char="•"/>
+            </a:pPr>
+            <a:r>
+              <a:rPr lang="en-US" sz="1200" baseline="0" dirty="0" smtClean="0">
+                <a:solidFill>
+                  <a:schemeClr val="bg1"/>
+                </a:solidFill>
+              </a:rPr>
+              <a:t>Timeline view</a:t>
             </a:r>
             <a:endParaRPr lang="en-US" sz="1200" dirty="0" smtClean="0">
               <a:solidFill>
@@ -5217,33 +5246,51 @@
       </p:grpSpPr>
       <p:sp>
         <p:nvSpPr>
-          <p:cNvPr id="2" name="Title 1"/>
-          <p:cNvSpPr>
-            <a:spLocks noGrp="1"/>
-          </p:cNvSpPr>
-          <p:nvPr>
-            <p:ph type="title"/>
-          </p:nvPr>
+          <p:cNvPr id="5" name="Title 1"/>
+          <p:cNvSpPr txBox="1">
+            <a:spLocks/>
+          </p:cNvSpPr>
+          <p:nvPr/>
         </p:nvSpPr>
         <p:spPr>
           <a:xfrm>
-            <a:off x="457200" y="685800"/>
+            <a:off x="457200" y="274638"/>
             <a:ext cx="8229600" cy="1143000"/>
           </a:xfrm>
-        </p:spPr>
-        <p:txBody>
-          <a:bodyPr/>
-          <a:lstStyle/>
-          <a:p>
-            <a:r>
-              <a:rPr lang="en-US" u="sng" dirty="0" smtClean="0">
+          <a:prstGeom prst="rect">
+            <a:avLst/>
+          </a:prstGeom>
+        </p:spPr>
+        <p:txBody>
+          <a:bodyPr vert="horz" lIns="91440" tIns="45720" rIns="91440" bIns="45720" rtlCol="0" anchor="ctr">
+            <a:normAutofit/>
+          </a:bodyPr>
+          <a:lstStyle>
+            <a:lvl1pPr algn="ctr" defTabSz="914400" rtl="0" eaLnBrk="1" latinLnBrk="0" hangingPunct="1">
+              <a:spcBef>
+                <a:spcPct val="0"/>
+              </a:spcBef>
+              <a:buNone/>
+              <a:defRPr sz="4400" kern="1200">
+                <a:solidFill>
+                  <a:schemeClr val="tx1"/>
+                </a:solidFill>
+                <a:latin typeface="+mj-lt"/>
+                <a:ea typeface="+mj-ea"/>
+                <a:cs typeface="+mj-cs"/>
+              </a:defRPr>
+            </a:lvl1pPr>
+          </a:lstStyle>
+          <a:p>
+            <a:r>
+              <a:rPr lang="en-US" smtClean="0">
                 <a:solidFill>
                   <a:schemeClr val="bg1"/>
                 </a:solidFill>
               </a:rPr>
               <a:t>Inspiration</a:t>
             </a:r>
-            <a:endParaRPr lang="en-US" u="sng" dirty="0">
+            <a:endParaRPr lang="en-US" dirty="0">
               <a:solidFill>
                 <a:schemeClr val="bg1"/>
               </a:solidFill>
@@ -5253,111 +5300,649 @@
       </p:sp>
       <p:sp>
         <p:nvSpPr>
-          <p:cNvPr id="3" name="TextBox 2"/>
-          <p:cNvSpPr txBox="1"/>
+          <p:cNvPr id="6" name="Rounded Rectangle 5"/>
+          <p:cNvSpPr/>
           <p:nvPr/>
         </p:nvSpPr>
         <p:spPr>
           <a:xfrm>
-            <a:off x="500743" y="2667000"/>
-            <a:ext cx="8324715" cy="2554545"/>
+            <a:off x="762000" y="1485900"/>
+            <a:ext cx="2743200" cy="723900"/>
+          </a:xfrm>
+          <a:prstGeom prst="roundRect">
+            <a:avLst/>
+          </a:prstGeom>
+          <a:noFill/>
+          <a:ln>
+            <a:solidFill>
+              <a:schemeClr val="bg1"/>
+            </a:solidFill>
+          </a:ln>
+        </p:spPr>
+        <p:style>
+          <a:lnRef idx="2">
+            <a:schemeClr val="accent1">
+              <a:shade val="50000"/>
+            </a:schemeClr>
+          </a:lnRef>
+          <a:fillRef idx="1">
+            <a:schemeClr val="accent1"/>
+          </a:fillRef>
+          <a:effectRef idx="0">
+            <a:schemeClr val="accent1"/>
+          </a:effectRef>
+          <a:fontRef idx="minor">
+            <a:schemeClr val="lt1"/>
+          </a:fontRef>
+        </p:style>
+        <p:txBody>
+          <a:bodyPr rtlCol="0" anchor="ctr"/>
+          <a:lstStyle/>
+          <a:p>
+            <a:pPr algn="ctr"/>
+            <a:r>
+              <a:rPr lang="en-US" sz="1600" dirty="0" smtClean="0">
+                <a:solidFill>
+                  <a:schemeClr val="bg1"/>
+                </a:solidFill>
+              </a:rPr>
+              <a:t>Non-Profit problems</a:t>
+            </a:r>
+            <a:endParaRPr lang="en-US" sz="1600" dirty="0">
+              <a:solidFill>
+                <a:schemeClr val="bg1"/>
+              </a:solidFill>
+            </a:endParaRPr>
+          </a:p>
+        </p:txBody>
+      </p:sp>
+      <p:sp>
+        <p:nvSpPr>
+          <p:cNvPr id="7" name="Rounded Rectangle 6"/>
+          <p:cNvSpPr/>
+          <p:nvPr/>
+        </p:nvSpPr>
+        <p:spPr>
+          <a:xfrm>
+            <a:off x="5943600" y="2345871"/>
+            <a:ext cx="1197429" cy="723900"/>
+          </a:xfrm>
+          <a:prstGeom prst="roundRect">
+            <a:avLst/>
+          </a:prstGeom>
+          <a:noFill/>
+          <a:ln>
+            <a:solidFill>
+              <a:schemeClr val="bg1"/>
+            </a:solidFill>
+          </a:ln>
+        </p:spPr>
+        <p:style>
+          <a:lnRef idx="2">
+            <a:schemeClr val="accent1">
+              <a:shade val="50000"/>
+            </a:schemeClr>
+          </a:lnRef>
+          <a:fillRef idx="1">
+            <a:schemeClr val="accent1"/>
+          </a:fillRef>
+          <a:effectRef idx="0">
+            <a:schemeClr val="accent1"/>
+          </a:effectRef>
+          <a:fontRef idx="minor">
+            <a:schemeClr val="lt1"/>
+          </a:fontRef>
+        </p:style>
+        <p:txBody>
+          <a:bodyPr rtlCol="0" anchor="ctr"/>
+          <a:lstStyle/>
+          <a:p>
+            <a:pPr algn="ctr"/>
+            <a:r>
+              <a:rPr lang="en-US" sz="1600" dirty="0" smtClean="0">
+                <a:solidFill>
+                  <a:schemeClr val="bg1"/>
+                </a:solidFill>
+              </a:rPr>
+              <a:t>Fast</a:t>
+            </a:r>
+            <a:endParaRPr lang="en-US" sz="1600" dirty="0">
+              <a:solidFill>
+                <a:schemeClr val="bg1"/>
+              </a:solidFill>
+            </a:endParaRPr>
+          </a:p>
+        </p:txBody>
+      </p:sp>
+      <p:sp>
+        <p:nvSpPr>
+          <p:cNvPr id="8" name="Rounded Rectangle 7"/>
+          <p:cNvSpPr/>
+          <p:nvPr/>
+        </p:nvSpPr>
+        <p:spPr>
+          <a:xfrm>
+            <a:off x="1230087" y="3189509"/>
+            <a:ext cx="1676400" cy="723900"/>
+          </a:xfrm>
+          <a:prstGeom prst="roundRect">
+            <a:avLst/>
+          </a:prstGeom>
+          <a:noFill/>
+          <a:ln>
+            <a:solidFill>
+              <a:schemeClr val="bg1"/>
+            </a:solidFill>
+          </a:ln>
+        </p:spPr>
+        <p:style>
+          <a:lnRef idx="2">
+            <a:schemeClr val="accent1">
+              <a:shade val="50000"/>
+            </a:schemeClr>
+          </a:lnRef>
+          <a:fillRef idx="1">
+            <a:schemeClr val="accent1"/>
+          </a:fillRef>
+          <a:effectRef idx="0">
+            <a:schemeClr val="accent1"/>
+          </a:effectRef>
+          <a:fontRef idx="minor">
+            <a:schemeClr val="lt1"/>
+          </a:fontRef>
+        </p:style>
+        <p:txBody>
+          <a:bodyPr rtlCol="0" anchor="ctr"/>
+          <a:lstStyle/>
+          <a:p>
+            <a:pPr algn="ctr"/>
+            <a:r>
+              <a:rPr lang="en-US" sz="1600" dirty="0" smtClean="0">
+                <a:solidFill>
+                  <a:schemeClr val="bg1"/>
+                </a:solidFill>
+              </a:rPr>
+              <a:t>Bureaucratic</a:t>
+            </a:r>
+            <a:endParaRPr lang="en-US" sz="1600" dirty="0">
+              <a:solidFill>
+                <a:schemeClr val="bg1"/>
+              </a:solidFill>
+            </a:endParaRPr>
+          </a:p>
+        </p:txBody>
+      </p:sp>
+      <p:sp>
+        <p:nvSpPr>
+          <p:cNvPr id="9" name="Rounded Rectangle 8"/>
+          <p:cNvSpPr/>
+          <p:nvPr/>
+        </p:nvSpPr>
+        <p:spPr>
+          <a:xfrm>
+            <a:off x="925287" y="4038600"/>
+            <a:ext cx="2286000" cy="723900"/>
+          </a:xfrm>
+          <a:prstGeom prst="roundRect">
+            <a:avLst/>
+          </a:prstGeom>
+          <a:noFill/>
+          <a:ln>
+            <a:solidFill>
+              <a:schemeClr val="bg1"/>
+            </a:solidFill>
+          </a:ln>
+        </p:spPr>
+        <p:style>
+          <a:lnRef idx="2">
+            <a:schemeClr val="accent1">
+              <a:shade val="50000"/>
+            </a:schemeClr>
+          </a:lnRef>
+          <a:fillRef idx="1">
+            <a:schemeClr val="accent1"/>
+          </a:fillRef>
+          <a:effectRef idx="0">
+            <a:schemeClr val="accent1"/>
+          </a:effectRef>
+          <a:fontRef idx="minor">
+            <a:schemeClr val="lt1"/>
+          </a:fontRef>
+        </p:style>
+        <p:txBody>
+          <a:bodyPr rtlCol="0" anchor="ctr"/>
+          <a:lstStyle/>
+          <a:p>
+            <a:pPr algn="ctr"/>
+            <a:r>
+              <a:rPr lang="en-US" sz="1600" dirty="0" smtClean="0">
+                <a:solidFill>
+                  <a:schemeClr val="bg1"/>
+                </a:solidFill>
+              </a:rPr>
+              <a:t>Difficult to enroll huge sections of society</a:t>
+            </a:r>
+            <a:endParaRPr lang="en-US" sz="1600" dirty="0">
+              <a:solidFill>
+                <a:schemeClr val="bg1"/>
+              </a:solidFill>
+            </a:endParaRPr>
+          </a:p>
+        </p:txBody>
+      </p:sp>
+      <p:sp>
+        <p:nvSpPr>
+          <p:cNvPr id="10" name="Rounded Rectangle 9"/>
+          <p:cNvSpPr/>
+          <p:nvPr/>
+        </p:nvSpPr>
+        <p:spPr>
+          <a:xfrm>
+            <a:off x="5257800" y="1485900"/>
+            <a:ext cx="2743200" cy="723900"/>
+          </a:xfrm>
+          <a:prstGeom prst="roundRect">
+            <a:avLst/>
+          </a:prstGeom>
+          <a:noFill/>
+          <a:ln>
+            <a:solidFill>
+              <a:schemeClr val="bg1"/>
+            </a:solidFill>
+          </a:ln>
+        </p:spPr>
+        <p:style>
+          <a:lnRef idx="2">
+            <a:schemeClr val="accent1">
+              <a:shade val="50000"/>
+            </a:schemeClr>
+          </a:lnRef>
+          <a:fillRef idx="1">
+            <a:schemeClr val="accent1"/>
+          </a:fillRef>
+          <a:effectRef idx="0">
+            <a:schemeClr val="accent1"/>
+          </a:effectRef>
+          <a:fontRef idx="minor">
+            <a:schemeClr val="lt1"/>
+          </a:fontRef>
+        </p:style>
+        <p:txBody>
+          <a:bodyPr rtlCol="0" anchor="ctr"/>
+          <a:lstStyle/>
+          <a:p>
+            <a:pPr algn="ctr"/>
+            <a:r>
+              <a:rPr lang="en-US" sz="1600" dirty="0" smtClean="0">
+                <a:solidFill>
+                  <a:schemeClr val="bg1"/>
+                </a:solidFill>
+              </a:rPr>
+              <a:t>Smart Phone Revolution</a:t>
+            </a:r>
+            <a:endParaRPr lang="en-US" sz="1600" dirty="0">
+              <a:solidFill>
+                <a:schemeClr val="bg1"/>
+              </a:solidFill>
+            </a:endParaRPr>
+          </a:p>
+        </p:txBody>
+      </p:sp>
+      <p:sp>
+        <p:nvSpPr>
+          <p:cNvPr id="11" name="Rounded Rectangle 10"/>
+          <p:cNvSpPr/>
+          <p:nvPr/>
+        </p:nvSpPr>
+        <p:spPr>
+          <a:xfrm>
+            <a:off x="1458686" y="2345871"/>
+            <a:ext cx="1197429" cy="723900"/>
+          </a:xfrm>
+          <a:prstGeom prst="roundRect">
+            <a:avLst/>
+          </a:prstGeom>
+          <a:noFill/>
+          <a:ln>
+            <a:solidFill>
+              <a:schemeClr val="bg1"/>
+            </a:solidFill>
+          </a:ln>
+        </p:spPr>
+        <p:style>
+          <a:lnRef idx="2">
+            <a:schemeClr val="accent1">
+              <a:shade val="50000"/>
+            </a:schemeClr>
+          </a:lnRef>
+          <a:fillRef idx="1">
+            <a:schemeClr val="accent1"/>
+          </a:fillRef>
+          <a:effectRef idx="0">
+            <a:schemeClr val="accent1"/>
+          </a:effectRef>
+          <a:fontRef idx="minor">
+            <a:schemeClr val="lt1"/>
+          </a:fontRef>
+        </p:style>
+        <p:txBody>
+          <a:bodyPr rtlCol="0" anchor="ctr"/>
+          <a:lstStyle/>
+          <a:p>
+            <a:pPr algn="ctr"/>
+            <a:r>
+              <a:rPr lang="en-US" sz="1600" dirty="0" smtClean="0">
+                <a:solidFill>
+                  <a:schemeClr val="bg1"/>
+                </a:solidFill>
+              </a:rPr>
+              <a:t>Slow</a:t>
+            </a:r>
+            <a:endParaRPr lang="en-US" sz="1600" dirty="0">
+              <a:solidFill>
+                <a:schemeClr val="bg1"/>
+              </a:solidFill>
+            </a:endParaRPr>
+          </a:p>
+        </p:txBody>
+      </p:sp>
+      <p:sp>
+        <p:nvSpPr>
+          <p:cNvPr id="12" name="Rounded Rectangle 11"/>
+          <p:cNvSpPr/>
+          <p:nvPr/>
+        </p:nvSpPr>
+        <p:spPr>
+          <a:xfrm>
+            <a:off x="5714999" y="3200395"/>
+            <a:ext cx="1676400" cy="723900"/>
+          </a:xfrm>
+          <a:prstGeom prst="roundRect">
+            <a:avLst/>
+          </a:prstGeom>
+          <a:noFill/>
+          <a:ln>
+            <a:solidFill>
+              <a:schemeClr val="bg1"/>
+            </a:solidFill>
+          </a:ln>
+        </p:spPr>
+        <p:style>
+          <a:lnRef idx="2">
+            <a:schemeClr val="accent1">
+              <a:shade val="50000"/>
+            </a:schemeClr>
+          </a:lnRef>
+          <a:fillRef idx="1">
+            <a:schemeClr val="accent1"/>
+          </a:fillRef>
+          <a:effectRef idx="0">
+            <a:schemeClr val="accent1"/>
+          </a:effectRef>
+          <a:fontRef idx="minor">
+            <a:schemeClr val="lt1"/>
+          </a:fontRef>
+        </p:style>
+        <p:txBody>
+          <a:bodyPr rtlCol="0" anchor="ctr"/>
+          <a:lstStyle/>
+          <a:p>
+            <a:pPr algn="ctr"/>
+            <a:r>
+              <a:rPr lang="en-US" sz="1600" dirty="0" smtClean="0">
+                <a:solidFill>
+                  <a:schemeClr val="bg1"/>
+                </a:solidFill>
+              </a:rPr>
+              <a:t>Free and Open</a:t>
+            </a:r>
+            <a:endParaRPr lang="en-US" sz="1600" dirty="0">
+              <a:solidFill>
+                <a:schemeClr val="bg1"/>
+              </a:solidFill>
+            </a:endParaRPr>
+          </a:p>
+        </p:txBody>
+      </p:sp>
+      <p:sp>
+        <p:nvSpPr>
+          <p:cNvPr id="13" name="Rounded Rectangle 12"/>
+          <p:cNvSpPr/>
+          <p:nvPr/>
+        </p:nvSpPr>
+        <p:spPr>
+          <a:xfrm>
+            <a:off x="5453742" y="4038600"/>
+            <a:ext cx="2286000" cy="723900"/>
+          </a:xfrm>
+          <a:prstGeom prst="roundRect">
+            <a:avLst/>
+          </a:prstGeom>
+          <a:noFill/>
+          <a:ln>
+            <a:solidFill>
+              <a:schemeClr val="bg1"/>
+            </a:solidFill>
+          </a:ln>
+        </p:spPr>
+        <p:style>
+          <a:lnRef idx="2">
+            <a:schemeClr val="accent1">
+              <a:shade val="50000"/>
+            </a:schemeClr>
+          </a:lnRef>
+          <a:fillRef idx="1">
+            <a:schemeClr val="accent1"/>
+          </a:fillRef>
+          <a:effectRef idx="0">
+            <a:schemeClr val="accent1"/>
+          </a:effectRef>
+          <a:fontRef idx="minor">
+            <a:schemeClr val="lt1"/>
+          </a:fontRef>
+        </p:style>
+        <p:txBody>
+          <a:bodyPr rtlCol="0" anchor="ctr"/>
+          <a:lstStyle/>
+          <a:p>
+            <a:pPr algn="ctr"/>
+            <a:r>
+              <a:rPr lang="en-US" sz="1600" dirty="0" smtClean="0">
+                <a:solidFill>
+                  <a:schemeClr val="bg1"/>
+                </a:solidFill>
+              </a:rPr>
+              <a:t>Power of Social Networks</a:t>
+            </a:r>
+            <a:endParaRPr lang="en-US" sz="1600" dirty="0">
+              <a:solidFill>
+                <a:schemeClr val="bg1"/>
+              </a:solidFill>
+            </a:endParaRPr>
+          </a:p>
+        </p:txBody>
+      </p:sp>
+      <p:sp>
+        <p:nvSpPr>
+          <p:cNvPr id="14" name="Rounded Rectangle 13"/>
+          <p:cNvSpPr/>
+          <p:nvPr/>
+        </p:nvSpPr>
+        <p:spPr>
+          <a:xfrm>
+            <a:off x="2971799" y="5553332"/>
+            <a:ext cx="2743200" cy="580767"/>
+          </a:xfrm>
+          <a:prstGeom prst="roundRect">
+            <a:avLst/>
+          </a:prstGeom>
+          <a:noFill/>
+          <a:ln>
+            <a:solidFill>
+              <a:schemeClr val="bg1"/>
+            </a:solidFill>
+          </a:ln>
+        </p:spPr>
+        <p:style>
+          <a:lnRef idx="2">
+            <a:schemeClr val="accent1">
+              <a:shade val="50000"/>
+            </a:schemeClr>
+          </a:lnRef>
+          <a:fillRef idx="1">
+            <a:schemeClr val="accent1"/>
+          </a:fillRef>
+          <a:effectRef idx="0">
+            <a:schemeClr val="accent1"/>
+          </a:effectRef>
+          <a:fontRef idx="minor">
+            <a:schemeClr val="lt1"/>
+          </a:fontRef>
+        </p:style>
+        <p:txBody>
+          <a:bodyPr rtlCol="0" anchor="ctr"/>
+          <a:lstStyle/>
+          <a:p>
+            <a:pPr algn="ctr"/>
+            <a:r>
+              <a:rPr lang="en-US" sz="1600" dirty="0" smtClean="0">
+                <a:solidFill>
+                  <a:schemeClr val="bg1"/>
+                </a:solidFill>
+              </a:rPr>
+              <a:t>Making Positive Change</a:t>
+            </a:r>
+            <a:endParaRPr lang="en-US" sz="1600" dirty="0">
+              <a:solidFill>
+                <a:schemeClr val="bg1"/>
+              </a:solidFill>
+            </a:endParaRPr>
+          </a:p>
+        </p:txBody>
+      </p:sp>
+      <p:pic>
+        <p:nvPicPr>
+          <p:cNvPr id="15" name="Picture 2" descr="C:\Users\gsangle\AppData\Local\Microsoft\Windows\Temporary Internet Files\Content.IE5\78SSJYYB\MC900060175[1].wmf"/>
+          <p:cNvPicPr>
+            <a:picLocks noChangeAspect="1" noChangeArrowheads="1"/>
+          </p:cNvPicPr>
+          <p:nvPr/>
+        </p:nvPicPr>
+        <p:blipFill>
+          <a:blip r:embed="rId3" cstate="print">
+            <a:extLst>
+              <a:ext uri="{28A0092B-C50C-407E-A947-70E740481C1C}">
+                <a14:useLocalDpi xmlns:a14="http://schemas.microsoft.com/office/drawing/2010/main" val="0"/>
+              </a:ext>
+            </a:extLst>
+          </a:blip>
+          <a:srcRect/>
+          <a:stretch>
+            <a:fillRect/>
+          </a:stretch>
+        </p:blipFill>
+        <p:spPr bwMode="auto">
+          <a:xfrm>
+            <a:off x="431160" y="1549966"/>
+            <a:ext cx="494127" cy="595767"/>
           </a:xfrm>
           <a:prstGeom prst="rect">
             <a:avLst/>
           </a:prstGeom>
           <a:noFill/>
-        </p:spPr>
-        <p:txBody>
-          <a:bodyPr wrap="none" rtlCol="0">
-            <a:spAutoFit/>
-          </a:bodyPr>
-          <a:lstStyle/>
-          <a:p>
-            <a:pPr marL="285750" indent="-285750">
-              <a:buFont typeface="Arial" panose="020B0604020202020204" pitchFamily="34" charset="0"/>
-              <a:buChar char="•"/>
-            </a:pPr>
-            <a:r>
-              <a:rPr lang="en-US" sz="3200" dirty="0">
-                <a:solidFill>
-                  <a:schemeClr val="bg1"/>
-                </a:solidFill>
-              </a:rPr>
-              <a:t>Medical care is never cheap.</a:t>
-            </a:r>
-          </a:p>
-          <a:p>
-            <a:pPr marL="285750" indent="-285750">
-              <a:buFont typeface="Arial" panose="020B0604020202020204" pitchFamily="34" charset="0"/>
-              <a:buChar char="•"/>
-            </a:pPr>
-            <a:r>
-              <a:rPr lang="en-US" sz="3200" dirty="0" smtClean="0">
-                <a:solidFill>
-                  <a:schemeClr val="bg1"/>
-                </a:solidFill>
-              </a:rPr>
-              <a:t>Watsi </a:t>
-            </a:r>
-            <a:r>
-              <a:rPr lang="en-US" sz="3200" dirty="0">
-                <a:solidFill>
-                  <a:schemeClr val="bg1"/>
-                </a:solidFill>
-              </a:rPr>
-              <a:t>harnesses the crowd to change that</a:t>
-            </a:r>
-            <a:r>
-              <a:rPr lang="en-US" sz="3200" dirty="0" smtClean="0">
-                <a:solidFill>
-                  <a:schemeClr val="bg1"/>
-                </a:solidFill>
-              </a:rPr>
-              <a:t>.</a:t>
-            </a:r>
-          </a:p>
-          <a:p>
-            <a:pPr marL="285750" indent="-285750">
-              <a:buFont typeface="Arial" panose="020B0604020202020204" pitchFamily="34" charset="0"/>
-              <a:buChar char="•"/>
-            </a:pPr>
-            <a:r>
-              <a:rPr lang="en-US" sz="3200" dirty="0" smtClean="0">
-                <a:solidFill>
-                  <a:schemeClr val="bg1"/>
-                </a:solidFill>
-              </a:rPr>
-              <a:t>No mobile app available for Watsi.</a:t>
-            </a:r>
-          </a:p>
-          <a:p>
-            <a:pPr marL="285750" indent="-285750">
-              <a:buFont typeface="Arial" panose="020B0604020202020204" pitchFamily="34" charset="0"/>
-              <a:buChar char="•"/>
-            </a:pPr>
-            <a:r>
-              <a:rPr lang="en-US" sz="3200" dirty="0" smtClean="0">
-                <a:solidFill>
-                  <a:schemeClr val="bg1"/>
-                </a:solidFill>
-              </a:rPr>
-              <a:t>Mobile and social media helps to extend reach.</a:t>
-            </a:r>
-            <a:endParaRPr lang="en-US" sz="3200" dirty="0">
-              <a:solidFill>
-                <a:schemeClr val="bg1"/>
-              </a:solidFill>
-            </a:endParaRPr>
-          </a:p>
-          <a:p>
-            <a:r>
-              <a:rPr lang="en-US" sz="3200" dirty="0" smtClean="0"/>
-              <a:t> </a:t>
-            </a:r>
-            <a:endParaRPr lang="en-US" sz="3200" dirty="0"/>
-          </a:p>
-        </p:txBody>
-      </p:sp>
+          <a:extLst>
+            <a:ext uri="{909E8E84-426E-40DD-AFC4-6F175D3DCCD1}">
+              <a14:hiddenFill xmlns:a14="http://schemas.microsoft.com/office/drawing/2010/main">
+                <a:solidFill>
+                  <a:srgbClr val="FFFFFF"/>
+                </a:solidFill>
+              </a14:hiddenFill>
+            </a:ext>
+          </a:extLst>
+        </p:spPr>
+      </p:pic>
+      <p:pic>
+        <p:nvPicPr>
+          <p:cNvPr id="16" name="Picture 3" descr="C:\Users\gsangle\AppData\Local\Microsoft\Windows\Temporary Internet Files\Content.IE5\0ZV58VNF\MC900433826[1].png"/>
+          <p:cNvPicPr>
+            <a:picLocks noChangeAspect="1" noChangeArrowheads="1"/>
+          </p:cNvPicPr>
+          <p:nvPr/>
+        </p:nvPicPr>
+        <p:blipFill>
+          <a:blip r:embed="rId4" cstate="print">
+            <a:extLst>
+              <a:ext uri="{28A0092B-C50C-407E-A947-70E740481C1C}">
+                <a14:useLocalDpi xmlns:a14="http://schemas.microsoft.com/office/drawing/2010/main" val="0"/>
+              </a:ext>
+            </a:extLst>
+          </a:blip>
+          <a:srcRect/>
+          <a:stretch>
+            <a:fillRect/>
+          </a:stretch>
+        </p:blipFill>
+        <p:spPr bwMode="auto">
+          <a:xfrm>
+            <a:off x="4932021" y="1570434"/>
+            <a:ext cx="543492" cy="543492"/>
+          </a:xfrm>
+          <a:prstGeom prst="rect">
+            <a:avLst/>
+          </a:prstGeom>
+          <a:noFill/>
+          <a:extLst>
+            <a:ext uri="{909E8E84-426E-40DD-AFC4-6F175D3DCCD1}">
+              <a14:hiddenFill xmlns:a14="http://schemas.microsoft.com/office/drawing/2010/main">
+                <a:solidFill>
+                  <a:srgbClr val="FFFFFF"/>
+                </a:solidFill>
+              </a14:hiddenFill>
+            </a:ext>
+          </a:extLst>
+        </p:spPr>
+      </p:pic>
+      <p:pic>
+        <p:nvPicPr>
+          <p:cNvPr id="17" name="Picture 4" descr="C:\Users\gsangle\AppData\Local\Microsoft\Windows\Temporary Internet Files\Content.IE5\78SSJYYB\MC900436363[1].png"/>
+          <p:cNvPicPr>
+            <a:picLocks noChangeAspect="1" noChangeArrowheads="1"/>
+          </p:cNvPicPr>
+          <p:nvPr/>
+        </p:nvPicPr>
+        <p:blipFill>
+          <a:blip r:embed="rId5" cstate="print">
+            <a:extLst>
+              <a:ext uri="{28A0092B-C50C-407E-A947-70E740481C1C}">
+                <a14:useLocalDpi xmlns:a14="http://schemas.microsoft.com/office/drawing/2010/main" val="0"/>
+              </a:ext>
+            </a:extLst>
+          </a:blip>
+          <a:srcRect/>
+          <a:stretch>
+            <a:fillRect/>
+          </a:stretch>
+        </p:blipFill>
+        <p:spPr bwMode="auto">
+          <a:xfrm>
+            <a:off x="5257800" y="5776118"/>
+            <a:ext cx="715961" cy="715961"/>
+          </a:xfrm>
+          <a:prstGeom prst="rect">
+            <a:avLst/>
+          </a:prstGeom>
+          <a:noFill/>
+          <a:extLst>
+            <a:ext uri="{909E8E84-426E-40DD-AFC4-6F175D3DCCD1}">
+              <a14:hiddenFill xmlns:a14="http://schemas.microsoft.com/office/drawing/2010/main">
+                <a:solidFill>
+                  <a:srgbClr val="FFFFFF"/>
+                </a:solidFill>
+              </a14:hiddenFill>
+            </a:ext>
+          </a:extLst>
+        </p:spPr>
+      </p:pic>
     </p:spTree>
     <p:extLst>
       <p:ext uri="{BB962C8B-B14F-4D97-AF65-F5344CB8AC3E}">
@@ -5397,7 +5982,7 @@
       </p:grpSpPr>
       <p:sp>
         <p:nvSpPr>
-          <p:cNvPr id="2" name="Title 1"/>
+          <p:cNvPr id="5" name="Title 1"/>
           <p:cNvSpPr>
             <a:spLocks noGrp="1"/>
           </p:cNvSpPr>
@@ -5407,7 +5992,7 @@
         </p:nvSpPr>
         <p:spPr>
           <a:xfrm>
-            <a:off x="381000" y="609600"/>
+            <a:off x="457200" y="274638"/>
             <a:ext cx="8229600" cy="1143000"/>
           </a:xfrm>
         </p:spPr>
@@ -5418,14 +6003,14 @@
           <a:lstStyle/>
           <a:p>
             <a:r>
-              <a:rPr lang="en-US" sz="4800" u="sng" dirty="0" smtClean="0">
+              <a:rPr lang="en-US" sz="4800" dirty="0" smtClean="0">
                 <a:solidFill>
                   <a:schemeClr val="bg1"/>
                 </a:solidFill>
               </a:rPr>
               <a:t>Watsi App</a:t>
             </a:r>
-            <a:endParaRPr lang="en-US" sz="4800" u="sng" dirty="0">
+            <a:endParaRPr lang="en-US" sz="4800" dirty="0">
               <a:solidFill>
                 <a:schemeClr val="bg1"/>
               </a:solidFill>
@@ -5435,86 +6020,564 @@
       </p:sp>
       <p:sp>
         <p:nvSpPr>
-          <p:cNvPr id="8" name="TextBox 7"/>
-          <p:cNvSpPr txBox="1"/>
+          <p:cNvPr id="6" name="Rounded Rectangle 5"/>
+          <p:cNvSpPr/>
           <p:nvPr/>
         </p:nvSpPr>
         <p:spPr>
           <a:xfrm>
-            <a:off x="1295400" y="2438400"/>
-            <a:ext cx="6781800" cy="3108543"/>
+            <a:off x="674370" y="1905000"/>
+            <a:ext cx="1927860" cy="1066800"/>
+          </a:xfrm>
+          <a:prstGeom prst="roundRect">
+            <a:avLst/>
+          </a:prstGeom>
+          <a:noFill/>
+          <a:ln>
+            <a:solidFill>
+              <a:schemeClr val="bg1"/>
+            </a:solidFill>
+          </a:ln>
+        </p:spPr>
+        <p:style>
+          <a:lnRef idx="2">
+            <a:schemeClr val="accent1">
+              <a:shade val="50000"/>
+            </a:schemeClr>
+          </a:lnRef>
+          <a:fillRef idx="1">
+            <a:schemeClr val="accent1"/>
+          </a:fillRef>
+          <a:effectRef idx="0">
+            <a:schemeClr val="accent1"/>
+          </a:effectRef>
+          <a:fontRef idx="minor">
+            <a:schemeClr val="lt1"/>
+          </a:fontRef>
+        </p:style>
+        <p:txBody>
+          <a:bodyPr rtlCol="0" anchor="ctr"/>
+          <a:lstStyle/>
+          <a:p>
+            <a:pPr algn="ctr"/>
+            <a:r>
+              <a:rPr lang="en-US" sz="1600" dirty="0" smtClean="0">
+                <a:solidFill>
+                  <a:schemeClr val="bg1"/>
+                </a:solidFill>
+              </a:rPr>
+              <a:t>Browse Patients in need</a:t>
+            </a:r>
+            <a:endParaRPr lang="en-US" sz="1600" dirty="0">
+              <a:solidFill>
+                <a:schemeClr val="bg1"/>
+              </a:solidFill>
+            </a:endParaRPr>
+          </a:p>
+        </p:txBody>
+      </p:sp>
+      <p:sp>
+        <p:nvSpPr>
+          <p:cNvPr id="7" name="Rounded Rectangle 6"/>
+          <p:cNvSpPr/>
+          <p:nvPr/>
+        </p:nvSpPr>
+        <p:spPr>
+          <a:xfrm>
+            <a:off x="3581400" y="1905000"/>
+            <a:ext cx="1752600" cy="1066800"/>
+          </a:xfrm>
+          <a:prstGeom prst="roundRect">
+            <a:avLst/>
+          </a:prstGeom>
+          <a:noFill/>
+          <a:ln>
+            <a:solidFill>
+              <a:schemeClr val="bg1"/>
+            </a:solidFill>
+          </a:ln>
+        </p:spPr>
+        <p:style>
+          <a:lnRef idx="2">
+            <a:schemeClr val="accent1">
+              <a:shade val="50000"/>
+            </a:schemeClr>
+          </a:lnRef>
+          <a:fillRef idx="1">
+            <a:schemeClr val="accent1"/>
+          </a:fillRef>
+          <a:effectRef idx="0">
+            <a:schemeClr val="accent1"/>
+          </a:effectRef>
+          <a:fontRef idx="minor">
+            <a:schemeClr val="lt1"/>
+          </a:fontRef>
+        </p:style>
+        <p:txBody>
+          <a:bodyPr rtlCol="0" anchor="ctr"/>
+          <a:lstStyle/>
+          <a:p>
+            <a:pPr algn="ctr"/>
+            <a:r>
+              <a:rPr lang="en-US" sz="1600" dirty="0" smtClean="0">
+                <a:solidFill>
+                  <a:schemeClr val="bg1"/>
+                </a:solidFill>
+              </a:rPr>
+              <a:t>Make it easy to donate</a:t>
+            </a:r>
+            <a:endParaRPr lang="en-US" sz="1600" dirty="0">
+              <a:solidFill>
+                <a:schemeClr val="bg1"/>
+              </a:solidFill>
+            </a:endParaRPr>
+          </a:p>
+        </p:txBody>
+      </p:sp>
+      <p:sp>
+        <p:nvSpPr>
+          <p:cNvPr id="9" name="Rounded Rectangle 8"/>
+          <p:cNvSpPr/>
+          <p:nvPr/>
+        </p:nvSpPr>
+        <p:spPr>
+          <a:xfrm>
+            <a:off x="6324600" y="1905000"/>
+            <a:ext cx="1752600" cy="1066800"/>
+          </a:xfrm>
+          <a:prstGeom prst="roundRect">
+            <a:avLst/>
+          </a:prstGeom>
+          <a:noFill/>
+          <a:ln>
+            <a:solidFill>
+              <a:schemeClr val="bg1"/>
+            </a:solidFill>
+          </a:ln>
+        </p:spPr>
+        <p:style>
+          <a:lnRef idx="2">
+            <a:schemeClr val="accent1">
+              <a:shade val="50000"/>
+            </a:schemeClr>
+          </a:lnRef>
+          <a:fillRef idx="1">
+            <a:schemeClr val="accent1"/>
+          </a:fillRef>
+          <a:effectRef idx="0">
+            <a:schemeClr val="accent1"/>
+          </a:effectRef>
+          <a:fontRef idx="minor">
+            <a:schemeClr val="lt1"/>
+          </a:fontRef>
+        </p:style>
+        <p:txBody>
+          <a:bodyPr rtlCol="0" anchor="ctr"/>
+          <a:lstStyle/>
+          <a:p>
+            <a:pPr algn="ctr"/>
+            <a:r>
+              <a:rPr lang="en-US" sz="1600" dirty="0" smtClean="0">
+                <a:solidFill>
+                  <a:schemeClr val="bg1"/>
+                </a:solidFill>
+              </a:rPr>
+              <a:t>Make it easy to Share</a:t>
+            </a:r>
+            <a:endParaRPr lang="en-US" sz="1600" dirty="0">
+              <a:solidFill>
+                <a:schemeClr val="bg1"/>
+              </a:solidFill>
+            </a:endParaRPr>
+          </a:p>
+        </p:txBody>
+      </p:sp>
+      <p:sp>
+        <p:nvSpPr>
+          <p:cNvPr id="10" name="Rounded Rectangle 9"/>
+          <p:cNvSpPr/>
+          <p:nvPr/>
+        </p:nvSpPr>
+        <p:spPr>
+          <a:xfrm>
+            <a:off x="2286763" y="4572000"/>
+            <a:ext cx="4626542" cy="1066800"/>
+          </a:xfrm>
+          <a:prstGeom prst="roundRect">
+            <a:avLst/>
+          </a:prstGeom>
+          <a:noFill/>
+          <a:ln>
+            <a:solidFill>
+              <a:schemeClr val="bg1"/>
+            </a:solidFill>
+          </a:ln>
+        </p:spPr>
+        <p:style>
+          <a:lnRef idx="2">
+            <a:schemeClr val="accent1">
+              <a:shade val="50000"/>
+            </a:schemeClr>
+          </a:lnRef>
+          <a:fillRef idx="1">
+            <a:schemeClr val="accent1"/>
+          </a:fillRef>
+          <a:effectRef idx="0">
+            <a:schemeClr val="accent1"/>
+          </a:effectRef>
+          <a:fontRef idx="minor">
+            <a:schemeClr val="lt1"/>
+          </a:fontRef>
+        </p:style>
+        <p:txBody>
+          <a:bodyPr rtlCol="0" anchor="ctr"/>
+          <a:lstStyle/>
+          <a:p>
+            <a:pPr algn="ctr"/>
+            <a:r>
+              <a:rPr lang="en-US" sz="1600" dirty="0" smtClean="0">
+                <a:solidFill>
+                  <a:schemeClr val="bg1"/>
+                </a:solidFill>
+              </a:rPr>
+              <a:t>Make it fun, while keeping it serious</a:t>
+            </a:r>
+            <a:endParaRPr lang="en-US" sz="1600" dirty="0">
+              <a:solidFill>
+                <a:schemeClr val="bg1"/>
+              </a:solidFill>
+            </a:endParaRPr>
+          </a:p>
+        </p:txBody>
+      </p:sp>
+      <p:pic>
+        <p:nvPicPr>
+          <p:cNvPr id="11" name="Picture 2" descr="C:\Users\gsangle\AppData\Local\Microsoft\Windows\Temporary Internet Files\Content.IE5\78SSJYYB\MC900390846[1].wmf"/>
+          <p:cNvPicPr>
+            <a:picLocks noChangeAspect="1" noChangeArrowheads="1"/>
+          </p:cNvPicPr>
+          <p:nvPr/>
+        </p:nvPicPr>
+        <p:blipFill>
+          <a:blip r:embed="rId3" cstate="print">
+            <a:extLst>
+              <a:ext uri="{28A0092B-C50C-407E-A947-70E740481C1C}">
+                <a14:useLocalDpi xmlns:a14="http://schemas.microsoft.com/office/drawing/2010/main" val="0"/>
+              </a:ext>
+            </a:extLst>
+          </a:blip>
+          <a:srcRect/>
+          <a:stretch>
+            <a:fillRect/>
+          </a:stretch>
+        </p:blipFill>
+        <p:spPr bwMode="auto">
+          <a:xfrm>
+            <a:off x="1066800" y="3113026"/>
+            <a:ext cx="365125" cy="429935"/>
           </a:xfrm>
           <a:prstGeom prst="rect">
             <a:avLst/>
           </a:prstGeom>
           <a:noFill/>
-        </p:spPr>
-        <p:txBody>
-          <a:bodyPr wrap="square" rtlCol="0">
-            <a:spAutoFit/>
-          </a:bodyPr>
-          <a:lstStyle/>
-          <a:p>
-            <a:pPr marL="285750" indent="-285750">
-              <a:buFont typeface="Arial" panose="020B0604020202020204" pitchFamily="34" charset="0"/>
-              <a:buChar char="•"/>
-            </a:pPr>
-            <a:r>
-              <a:rPr lang="en-US" sz="4000" dirty="0" smtClean="0">
-                <a:solidFill>
-                  <a:schemeClr val="bg1"/>
-                </a:solidFill>
-              </a:rPr>
-              <a:t>Awareness</a:t>
-            </a:r>
-          </a:p>
-          <a:p>
-            <a:pPr marL="285750" indent="-285750">
-              <a:buFont typeface="Arial" panose="020B0604020202020204" pitchFamily="34" charset="0"/>
-              <a:buChar char="•"/>
-            </a:pPr>
-            <a:r>
-              <a:rPr lang="en-US" sz="4000" dirty="0" smtClean="0">
-                <a:solidFill>
-                  <a:schemeClr val="bg1"/>
-                </a:solidFill>
-              </a:rPr>
-              <a:t>Help</a:t>
-            </a:r>
-          </a:p>
-          <a:p>
-            <a:pPr marL="285750" indent="-285750">
-              <a:buFont typeface="Arial" panose="020B0604020202020204" pitchFamily="34" charset="0"/>
-              <a:buChar char="•"/>
-            </a:pPr>
-            <a:r>
-              <a:rPr lang="en-US" sz="4000" dirty="0" smtClean="0">
-                <a:solidFill>
-                  <a:schemeClr val="bg1"/>
-                </a:solidFill>
-              </a:rPr>
-              <a:t>Motivate</a:t>
-            </a:r>
-          </a:p>
-          <a:p>
-            <a:pPr marL="285750" indent="-285750">
-              <a:buFont typeface="Arial" panose="020B0604020202020204" pitchFamily="34" charset="0"/>
-              <a:buChar char="•"/>
-            </a:pPr>
-            <a:endParaRPr lang="en-US" sz="4000" dirty="0" smtClean="0"/>
-          </a:p>
-          <a:p>
-            <a:pPr marL="285750" indent="-285750">
-              <a:buFont typeface="Arial" panose="020B0604020202020204" pitchFamily="34" charset="0"/>
-              <a:buChar char="•"/>
-            </a:pPr>
-            <a:endParaRPr lang="en-US" dirty="0" smtClean="0"/>
-          </a:p>
-          <a:p>
-            <a:endParaRPr lang="en-US" dirty="0"/>
-          </a:p>
-        </p:txBody>
-      </p:sp>
+          <a:extLst>
+            <a:ext uri="{909E8E84-426E-40DD-AFC4-6F175D3DCCD1}">
+              <a14:hiddenFill xmlns:a14="http://schemas.microsoft.com/office/drawing/2010/main">
+                <a:solidFill>
+                  <a:srgbClr val="FFFFFF"/>
+                </a:solidFill>
+              </a14:hiddenFill>
+            </a:ext>
+          </a:extLst>
+        </p:spPr>
+      </p:pic>
+      <p:pic>
+        <p:nvPicPr>
+          <p:cNvPr id="12" name="Picture 3" descr="C:\Users\gsangle\AppData\Local\Microsoft\Windows\Temporary Internet Files\Content.IE5\78SSJYYB\MC900439824[1].png"/>
+          <p:cNvPicPr>
+            <a:picLocks noChangeAspect="1" noChangeArrowheads="1"/>
+          </p:cNvPicPr>
+          <p:nvPr/>
+        </p:nvPicPr>
+        <p:blipFill>
+          <a:blip r:embed="rId4" cstate="print">
+            <a:extLst>
+              <a:ext uri="{28A0092B-C50C-407E-A947-70E740481C1C}">
+                <a14:useLocalDpi xmlns:a14="http://schemas.microsoft.com/office/drawing/2010/main" val="0"/>
+              </a:ext>
+            </a:extLst>
+          </a:blip>
+          <a:srcRect/>
+          <a:stretch>
+            <a:fillRect/>
+          </a:stretch>
+        </p:blipFill>
+        <p:spPr bwMode="auto">
+          <a:xfrm>
+            <a:off x="1638300" y="3124200"/>
+            <a:ext cx="446088" cy="446088"/>
+          </a:xfrm>
+          <a:prstGeom prst="rect">
+            <a:avLst/>
+          </a:prstGeom>
+          <a:noFill/>
+          <a:extLst>
+            <a:ext uri="{909E8E84-426E-40DD-AFC4-6F175D3DCCD1}">
+              <a14:hiddenFill xmlns:a14="http://schemas.microsoft.com/office/drawing/2010/main">
+                <a:solidFill>
+                  <a:srgbClr val="FFFFFF"/>
+                </a:solidFill>
+              </a14:hiddenFill>
+            </a:ext>
+          </a:extLst>
+        </p:spPr>
+      </p:pic>
+      <p:pic>
+        <p:nvPicPr>
+          <p:cNvPr id="13" name="Picture 4" descr="C:\Users\gsangle\AppData\Local\Microsoft\Windows\Temporary Internet Files\Content.IE5\NLRQO756\MP900442458[1].jpg"/>
+          <p:cNvPicPr>
+            <a:picLocks noChangeAspect="1" noChangeArrowheads="1"/>
+          </p:cNvPicPr>
+          <p:nvPr/>
+        </p:nvPicPr>
+        <p:blipFill>
+          <a:blip r:embed="rId5" cstate="print">
+            <a:extLst>
+              <a:ext uri="{28A0092B-C50C-407E-A947-70E740481C1C}">
+                <a14:useLocalDpi xmlns:a14="http://schemas.microsoft.com/office/drawing/2010/main" val="0"/>
+              </a:ext>
+            </a:extLst>
+          </a:blip>
+          <a:srcRect/>
+          <a:stretch>
+            <a:fillRect/>
+          </a:stretch>
+        </p:blipFill>
+        <p:spPr bwMode="auto">
+          <a:xfrm>
+            <a:off x="4227194" y="3131762"/>
+            <a:ext cx="461011" cy="386104"/>
+          </a:xfrm>
+          <a:prstGeom prst="rect">
+            <a:avLst/>
+          </a:prstGeom>
+          <a:noFill/>
+          <a:extLst>
+            <a:ext uri="{909E8E84-426E-40DD-AFC4-6F175D3DCCD1}">
+              <a14:hiddenFill xmlns:a14="http://schemas.microsoft.com/office/drawing/2010/main">
+                <a:solidFill>
+                  <a:srgbClr val="FFFFFF"/>
+                </a:solidFill>
+              </a14:hiddenFill>
+            </a:ext>
+          </a:extLst>
+        </p:spPr>
+      </p:pic>
+      <p:pic>
+        <p:nvPicPr>
+          <p:cNvPr id="14" name="Picture 5" descr="C:\Users\gsangle\AppData\Local\Microsoft\Windows\Temporary Internet Files\Content.IE5\78SSJYYB\MC900304333[1].wmf"/>
+          <p:cNvPicPr>
+            <a:picLocks noChangeAspect="1" noChangeArrowheads="1"/>
+          </p:cNvPicPr>
+          <p:nvPr/>
+        </p:nvPicPr>
+        <p:blipFill>
+          <a:blip r:embed="rId6" cstate="print">
+            <a:extLst>
+              <a:ext uri="{28A0092B-C50C-407E-A947-70E740481C1C}">
+                <a14:useLocalDpi xmlns:a14="http://schemas.microsoft.com/office/drawing/2010/main" val="0"/>
+              </a:ext>
+            </a:extLst>
+          </a:blip>
+          <a:srcRect/>
+          <a:stretch>
+            <a:fillRect/>
+          </a:stretch>
+        </p:blipFill>
+        <p:spPr bwMode="auto">
+          <a:xfrm>
+            <a:off x="6477000" y="3163888"/>
+            <a:ext cx="436305" cy="406400"/>
+          </a:xfrm>
+          <a:prstGeom prst="rect">
+            <a:avLst/>
+          </a:prstGeom>
+          <a:noFill/>
+          <a:extLst>
+            <a:ext uri="{909E8E84-426E-40DD-AFC4-6F175D3DCCD1}">
+              <a14:hiddenFill xmlns:a14="http://schemas.microsoft.com/office/drawing/2010/main">
+                <a:solidFill>
+                  <a:srgbClr val="FFFFFF"/>
+                </a:solidFill>
+              </a14:hiddenFill>
+            </a:ext>
+          </a:extLst>
+        </p:spPr>
+      </p:pic>
+      <p:pic>
+        <p:nvPicPr>
+          <p:cNvPr id="15" name="Picture 6" descr="C:\Users\gsangle\AppData\Local\Microsoft\Windows\Temporary Internet Files\Content.IE5\0ZV58VNF\MC900020127[1].wmf"/>
+          <p:cNvPicPr>
+            <a:picLocks noChangeAspect="1" noChangeArrowheads="1"/>
+          </p:cNvPicPr>
+          <p:nvPr/>
+        </p:nvPicPr>
+        <p:blipFill>
+          <a:blip r:embed="rId7" cstate="print">
+            <a:extLst>
+              <a:ext uri="{28A0092B-C50C-407E-A947-70E740481C1C}">
+                <a14:useLocalDpi xmlns:a14="http://schemas.microsoft.com/office/drawing/2010/main" val="0"/>
+              </a:ext>
+            </a:extLst>
+          </a:blip>
+          <a:srcRect/>
+          <a:stretch>
+            <a:fillRect/>
+          </a:stretch>
+        </p:blipFill>
+        <p:spPr bwMode="auto">
+          <a:xfrm>
+            <a:off x="7200900" y="3175796"/>
+            <a:ext cx="538079" cy="430818"/>
+          </a:xfrm>
+          <a:prstGeom prst="rect">
+            <a:avLst/>
+          </a:prstGeom>
+          <a:noFill/>
+          <a:extLst>
+            <a:ext uri="{909E8E84-426E-40DD-AFC4-6F175D3DCCD1}">
+              <a14:hiddenFill xmlns:a14="http://schemas.microsoft.com/office/drawing/2010/main">
+                <a:solidFill>
+                  <a:srgbClr val="FFFFFF"/>
+                </a:solidFill>
+              </a14:hiddenFill>
+            </a:ext>
+          </a:extLst>
+        </p:spPr>
+      </p:pic>
+      <p:pic>
+        <p:nvPicPr>
+          <p:cNvPr id="16" name="Picture 10" descr="C:\Users\gsangle\AppData\Local\Microsoft\Windows\Temporary Internet Files\Content.IE5\GLU7V41X\MP900431311[1].jpg"/>
+          <p:cNvPicPr>
+            <a:picLocks noChangeAspect="1" noChangeArrowheads="1"/>
+          </p:cNvPicPr>
+          <p:nvPr/>
+        </p:nvPicPr>
+        <p:blipFill>
+          <a:blip r:embed="rId8" cstate="print">
+            <a:extLst>
+              <a:ext uri="{28A0092B-C50C-407E-A947-70E740481C1C}">
+                <a14:useLocalDpi xmlns:a14="http://schemas.microsoft.com/office/drawing/2010/main" val="0"/>
+              </a:ext>
+            </a:extLst>
+          </a:blip>
+          <a:srcRect/>
+          <a:stretch>
+            <a:fillRect/>
+          </a:stretch>
+        </p:blipFill>
+        <p:spPr bwMode="auto">
+          <a:xfrm>
+            <a:off x="3200401" y="5823443"/>
+            <a:ext cx="497750" cy="504647"/>
+          </a:xfrm>
+          <a:prstGeom prst="rect">
+            <a:avLst/>
+          </a:prstGeom>
+          <a:noFill/>
+          <a:extLst>
+            <a:ext uri="{909E8E84-426E-40DD-AFC4-6F175D3DCCD1}">
+              <a14:hiddenFill xmlns:a14="http://schemas.microsoft.com/office/drawing/2010/main">
+                <a:solidFill>
+                  <a:srgbClr val="FFFFFF"/>
+                </a:solidFill>
+              </a14:hiddenFill>
+            </a:ext>
+          </a:extLst>
+        </p:spPr>
+      </p:pic>
+      <p:pic>
+        <p:nvPicPr>
+          <p:cNvPr id="17" name="Picture 11" descr="C:\Users\gsangle\AppData\Local\Microsoft\Windows\Temporary Internet Files\Content.IE5\78SSJYYB\MP910216394[1].png"/>
+          <p:cNvPicPr>
+            <a:picLocks noChangeAspect="1" noChangeArrowheads="1"/>
+          </p:cNvPicPr>
+          <p:nvPr/>
+        </p:nvPicPr>
+        <p:blipFill>
+          <a:blip r:embed="rId9" cstate="print">
+            <a:extLst>
+              <a:ext uri="{28A0092B-C50C-407E-A947-70E740481C1C}">
+                <a14:useLocalDpi xmlns:a14="http://schemas.microsoft.com/office/drawing/2010/main" val="0"/>
+              </a:ext>
+            </a:extLst>
+          </a:blip>
+          <a:srcRect/>
+          <a:stretch>
+            <a:fillRect/>
+          </a:stretch>
+        </p:blipFill>
+        <p:spPr bwMode="auto">
+          <a:xfrm>
+            <a:off x="4240736" y="5823443"/>
+            <a:ext cx="718596" cy="626026"/>
+          </a:xfrm>
+          <a:prstGeom prst="rect">
+            <a:avLst/>
+          </a:prstGeom>
+          <a:noFill/>
+          <a:extLst>
+            <a:ext uri="{909E8E84-426E-40DD-AFC4-6F175D3DCCD1}">
+              <a14:hiddenFill xmlns:a14="http://schemas.microsoft.com/office/drawing/2010/main">
+                <a:solidFill>
+                  <a:srgbClr val="FFFFFF"/>
+                </a:solidFill>
+              </a14:hiddenFill>
+            </a:ext>
+          </a:extLst>
+        </p:spPr>
+      </p:pic>
+      <p:pic>
+        <p:nvPicPr>
+          <p:cNvPr id="18" name="Picture 12" descr="C:\Users\gsangle\AppData\Local\Microsoft\Windows\Temporary Internet Files\Content.IE5\0ZV58VNF\MC900435795[1].wmf"/>
+          <p:cNvPicPr>
+            <a:picLocks noChangeAspect="1" noChangeArrowheads="1"/>
+          </p:cNvPicPr>
+          <p:nvPr/>
+        </p:nvPicPr>
+        <p:blipFill>
+          <a:blip r:embed="rId10" cstate="print">
+            <a:extLst>
+              <a:ext uri="{28A0092B-C50C-407E-A947-70E740481C1C}">
+                <a14:useLocalDpi xmlns:a14="http://schemas.microsoft.com/office/drawing/2010/main" val="0"/>
+              </a:ext>
+            </a:extLst>
+          </a:blip>
+          <a:srcRect/>
+          <a:stretch>
+            <a:fillRect/>
+          </a:stretch>
+        </p:blipFill>
+        <p:spPr bwMode="auto">
+          <a:xfrm>
+            <a:off x="5334000" y="5855897"/>
+            <a:ext cx="440904" cy="439737"/>
+          </a:xfrm>
+          <a:prstGeom prst="rect">
+            <a:avLst/>
+          </a:prstGeom>
+          <a:noFill/>
+          <a:extLst>
+            <a:ext uri="{909E8E84-426E-40DD-AFC4-6F175D3DCCD1}">
+              <a14:hiddenFill xmlns:a14="http://schemas.microsoft.com/office/drawing/2010/main">
+                <a:solidFill>
+                  <a:srgbClr val="FFFFFF"/>
+                </a:solidFill>
+              </a14:hiddenFill>
+            </a:ext>
+          </a:extLst>
+        </p:spPr>
+      </p:pic>
     </p:spTree>
     <p:extLst>
       <p:ext uri="{BB962C8B-B14F-4D97-AF65-F5344CB8AC3E}">
@@ -5627,7 +6690,7 @@
       </p:grpSpPr>
       <p:sp>
         <p:nvSpPr>
-          <p:cNvPr id="2" name="Title 1"/>
+          <p:cNvPr id="5" name="Title 1"/>
           <p:cNvSpPr>
             <a:spLocks noGrp="1"/>
           </p:cNvSpPr>
@@ -5637,7 +6700,7 @@
         </p:nvSpPr>
         <p:spPr>
           <a:xfrm>
-            <a:off x="381000" y="685800"/>
+            <a:off x="457200" y="274638"/>
             <a:ext cx="8229600" cy="1143000"/>
           </a:xfrm>
         </p:spPr>
@@ -5646,115 +6709,13 @@
           <a:lstStyle/>
           <a:p>
             <a:r>
-              <a:rPr lang="en-US" u="sng" dirty="0" smtClean="0">
+              <a:rPr lang="en-US" dirty="0" smtClean="0">
                 <a:solidFill>
                   <a:schemeClr val="bg1"/>
                 </a:solidFill>
               </a:rPr>
               <a:t>Challenges</a:t>
             </a:r>
-            <a:endParaRPr lang="en-US" u="sng" dirty="0">
-              <a:solidFill>
-                <a:schemeClr val="bg1"/>
-              </a:solidFill>
-            </a:endParaRPr>
-          </a:p>
-        </p:txBody>
-      </p:sp>
-      <p:sp>
-        <p:nvSpPr>
-          <p:cNvPr id="3" name="Rectangle 2"/>
-          <p:cNvSpPr/>
-          <p:nvPr/>
-        </p:nvSpPr>
-        <p:spPr>
-          <a:xfrm>
-            <a:off x="250372" y="2514600"/>
-            <a:ext cx="8915400" cy="2339102"/>
-          </a:xfrm>
-          <a:prstGeom prst="rect">
-            <a:avLst/>
-          </a:prstGeom>
-        </p:spPr>
-        <p:txBody>
-          <a:bodyPr wrap="square">
-            <a:spAutoFit/>
-          </a:bodyPr>
-          <a:lstStyle/>
-          <a:p>
-            <a:pPr marL="285750" indent="-285750">
-              <a:buFont typeface="Arial" panose="020B0604020202020204" pitchFamily="34" charset="0"/>
-              <a:buChar char="•"/>
-            </a:pPr>
-            <a:r>
-              <a:rPr lang="en-US" sz="3200" dirty="0" smtClean="0">
-                <a:solidFill>
-                  <a:schemeClr val="bg1"/>
-                </a:solidFill>
-              </a:rPr>
-              <a:t>No API available from Watsi.org</a:t>
-            </a:r>
-          </a:p>
-          <a:p>
-            <a:pPr marL="285750" indent="-285750">
-              <a:buFont typeface="Arial" panose="020B0604020202020204" pitchFamily="34" charset="0"/>
-              <a:buChar char="•"/>
-            </a:pPr>
-            <a:r>
-              <a:rPr lang="en-US" sz="3200" dirty="0" smtClean="0">
-                <a:solidFill>
-                  <a:schemeClr val="bg1"/>
-                </a:solidFill>
-              </a:rPr>
-              <a:t>Patient images</a:t>
-            </a:r>
-          </a:p>
-          <a:p>
-            <a:pPr marL="285750" indent="-285750">
-              <a:buFont typeface="Arial" panose="020B0604020202020204" pitchFamily="34" charset="0"/>
-              <a:buChar char="•"/>
-            </a:pPr>
-            <a:r>
-              <a:rPr lang="en-US" sz="3200" dirty="0" smtClean="0">
-                <a:solidFill>
-                  <a:schemeClr val="bg1"/>
-                </a:solidFill>
-              </a:rPr>
-              <a:t>Payment Integration for </a:t>
-            </a:r>
-            <a:r>
-              <a:rPr lang="en-US" sz="3200" dirty="0" smtClean="0">
-                <a:solidFill>
-                  <a:schemeClr val="bg1"/>
-                </a:solidFill>
-              </a:rPr>
-              <a:t>donation</a:t>
-            </a:r>
-          </a:p>
-          <a:p>
-            <a:pPr marL="285750" indent="-285750">
-              <a:buFont typeface="Arial" panose="020B0604020202020204" pitchFamily="34" charset="0"/>
-              <a:buChar char="•"/>
-            </a:pPr>
-            <a:r>
-              <a:rPr lang="en-US" sz="3200" dirty="0" smtClean="0">
-                <a:solidFill>
-                  <a:schemeClr val="bg1"/>
-                </a:solidFill>
-              </a:rPr>
-              <a:t>Third party libraries</a:t>
-            </a:r>
-            <a:endParaRPr lang="en-US" sz="3200" dirty="0">
-              <a:solidFill>
-                <a:schemeClr val="bg1"/>
-              </a:solidFill>
-            </a:endParaRPr>
-          </a:p>
-          <a:p>
-            <a:pPr marL="285750" indent="-285750">
-              <a:buFont typeface="Arial" panose="020B0604020202020204" pitchFamily="34" charset="0"/>
-              <a:buChar char="•"/>
-            </a:pPr>
             <a:endParaRPr lang="en-US" dirty="0">
               <a:solidFill>
                 <a:schemeClr val="bg1"/>
@@ -5763,6 +6724,525 @@
           </a:p>
         </p:txBody>
       </p:sp>
+      <p:sp>
+        <p:nvSpPr>
+          <p:cNvPr id="6" name="Rounded Rectangle 5"/>
+          <p:cNvSpPr/>
+          <p:nvPr/>
+        </p:nvSpPr>
+        <p:spPr>
+          <a:xfrm>
+            <a:off x="5410200" y="1905000"/>
+            <a:ext cx="2590800" cy="1066800"/>
+          </a:xfrm>
+          <a:prstGeom prst="roundRect">
+            <a:avLst/>
+          </a:prstGeom>
+          <a:noFill/>
+          <a:ln>
+            <a:solidFill>
+              <a:schemeClr val="bg1"/>
+            </a:solidFill>
+          </a:ln>
+        </p:spPr>
+        <p:style>
+          <a:lnRef idx="2">
+            <a:schemeClr val="accent1">
+              <a:shade val="50000"/>
+            </a:schemeClr>
+          </a:lnRef>
+          <a:fillRef idx="1">
+            <a:schemeClr val="accent1"/>
+          </a:fillRef>
+          <a:effectRef idx="0">
+            <a:schemeClr val="accent1"/>
+          </a:effectRef>
+          <a:fontRef idx="minor">
+            <a:schemeClr val="lt1"/>
+          </a:fontRef>
+        </p:style>
+        <p:txBody>
+          <a:bodyPr rtlCol="0" anchor="ctr"/>
+          <a:lstStyle/>
+          <a:p>
+            <a:pPr algn="ctr"/>
+            <a:r>
+              <a:rPr lang="en-US" sz="1600" dirty="0" smtClean="0">
+                <a:solidFill>
+                  <a:schemeClr val="bg1"/>
+                </a:solidFill>
+              </a:rPr>
+              <a:t>Presenting Profile Images with Donation Details</a:t>
+            </a:r>
+            <a:endParaRPr lang="en-US" sz="1600" dirty="0">
+              <a:solidFill>
+                <a:schemeClr val="bg1"/>
+              </a:solidFill>
+            </a:endParaRPr>
+          </a:p>
+        </p:txBody>
+      </p:sp>
+      <p:sp>
+        <p:nvSpPr>
+          <p:cNvPr id="7" name="Rounded Rectangle 6"/>
+          <p:cNvSpPr/>
+          <p:nvPr/>
+        </p:nvSpPr>
+        <p:spPr>
+          <a:xfrm>
+            <a:off x="1371600" y="1905000"/>
+            <a:ext cx="2514600" cy="1066800"/>
+          </a:xfrm>
+          <a:prstGeom prst="roundRect">
+            <a:avLst/>
+          </a:prstGeom>
+          <a:noFill/>
+          <a:ln>
+            <a:solidFill>
+              <a:schemeClr val="bg1"/>
+            </a:solidFill>
+          </a:ln>
+        </p:spPr>
+        <p:style>
+          <a:lnRef idx="2">
+            <a:schemeClr val="accent1">
+              <a:shade val="50000"/>
+            </a:schemeClr>
+          </a:lnRef>
+          <a:fillRef idx="1">
+            <a:schemeClr val="accent1"/>
+          </a:fillRef>
+          <a:effectRef idx="0">
+            <a:schemeClr val="accent1"/>
+          </a:effectRef>
+          <a:fontRef idx="minor">
+            <a:schemeClr val="lt1"/>
+          </a:fontRef>
+        </p:style>
+        <p:txBody>
+          <a:bodyPr rtlCol="0" anchor="ctr"/>
+          <a:lstStyle/>
+          <a:p>
+            <a:pPr algn="ctr"/>
+            <a:r>
+              <a:rPr lang="en-US" sz="1600" dirty="0" smtClean="0">
+                <a:solidFill>
+                  <a:schemeClr val="bg1"/>
+                </a:solidFill>
+              </a:rPr>
+              <a:t>Getting Data from watsi.org</a:t>
+            </a:r>
+            <a:endParaRPr lang="en-US" sz="1600" dirty="0">
+              <a:solidFill>
+                <a:schemeClr val="bg1"/>
+              </a:solidFill>
+            </a:endParaRPr>
+          </a:p>
+        </p:txBody>
+      </p:sp>
+      <p:sp>
+        <p:nvSpPr>
+          <p:cNvPr id="8" name="Rounded Rectangle 7"/>
+          <p:cNvSpPr/>
+          <p:nvPr/>
+        </p:nvSpPr>
+        <p:spPr>
+          <a:xfrm>
+            <a:off x="1371600" y="4572000"/>
+            <a:ext cx="2590800" cy="1066800"/>
+          </a:xfrm>
+          <a:prstGeom prst="roundRect">
+            <a:avLst/>
+          </a:prstGeom>
+          <a:noFill/>
+          <a:ln>
+            <a:solidFill>
+              <a:schemeClr val="bg1"/>
+            </a:solidFill>
+          </a:ln>
+        </p:spPr>
+        <p:style>
+          <a:lnRef idx="2">
+            <a:schemeClr val="accent1">
+              <a:shade val="50000"/>
+            </a:schemeClr>
+          </a:lnRef>
+          <a:fillRef idx="1">
+            <a:schemeClr val="accent1"/>
+          </a:fillRef>
+          <a:effectRef idx="0">
+            <a:schemeClr val="accent1"/>
+          </a:effectRef>
+          <a:fontRef idx="minor">
+            <a:schemeClr val="lt1"/>
+          </a:fontRef>
+        </p:style>
+        <p:txBody>
+          <a:bodyPr rtlCol="0" anchor="ctr"/>
+          <a:lstStyle/>
+          <a:p>
+            <a:pPr algn="ctr"/>
+            <a:r>
+              <a:rPr lang="en-US" sz="1600" dirty="0" smtClean="0">
+                <a:solidFill>
+                  <a:schemeClr val="bg1"/>
+                </a:solidFill>
+              </a:rPr>
+              <a:t>User Login and Facebook Integration </a:t>
+            </a:r>
+            <a:endParaRPr lang="en-US" sz="1600" dirty="0">
+              <a:solidFill>
+                <a:schemeClr val="bg1"/>
+              </a:solidFill>
+            </a:endParaRPr>
+          </a:p>
+        </p:txBody>
+      </p:sp>
+      <p:sp>
+        <p:nvSpPr>
+          <p:cNvPr id="9" name="Rounded Rectangle 8"/>
+          <p:cNvSpPr/>
+          <p:nvPr/>
+        </p:nvSpPr>
+        <p:spPr>
+          <a:xfrm>
+            <a:off x="5410200" y="4572000"/>
+            <a:ext cx="2514600" cy="1066800"/>
+          </a:xfrm>
+          <a:prstGeom prst="roundRect">
+            <a:avLst/>
+          </a:prstGeom>
+          <a:noFill/>
+          <a:ln>
+            <a:solidFill>
+              <a:schemeClr val="bg1"/>
+            </a:solidFill>
+          </a:ln>
+        </p:spPr>
+        <p:style>
+          <a:lnRef idx="2">
+            <a:schemeClr val="accent1">
+              <a:shade val="50000"/>
+            </a:schemeClr>
+          </a:lnRef>
+          <a:fillRef idx="1">
+            <a:schemeClr val="accent1"/>
+          </a:fillRef>
+          <a:effectRef idx="0">
+            <a:schemeClr val="accent1"/>
+          </a:effectRef>
+          <a:fontRef idx="minor">
+            <a:schemeClr val="lt1"/>
+          </a:fontRef>
+        </p:style>
+        <p:txBody>
+          <a:bodyPr rtlCol="0" anchor="ctr"/>
+          <a:lstStyle/>
+          <a:p>
+            <a:pPr algn="ctr"/>
+            <a:r>
+              <a:rPr lang="en-US" sz="1600" dirty="0" smtClean="0">
+                <a:solidFill>
+                  <a:schemeClr val="bg1"/>
+                </a:solidFill>
+              </a:rPr>
+              <a:t>Minimal, polished and lively UI</a:t>
+            </a:r>
+            <a:endParaRPr lang="en-US" sz="1600" dirty="0">
+              <a:solidFill>
+                <a:schemeClr val="bg1"/>
+              </a:solidFill>
+            </a:endParaRPr>
+          </a:p>
+        </p:txBody>
+      </p:sp>
+      <p:pic>
+        <p:nvPicPr>
+          <p:cNvPr id="10" name="Picture 2" descr="C:\Program Files (x86)\Microsoft Office\MEDIA\CAGCAT10\j0300520.gif"/>
+          <p:cNvPicPr>
+            <a:picLocks noChangeAspect="1" noChangeArrowheads="1" noCrop="1"/>
+          </p:cNvPicPr>
+          <p:nvPr/>
+        </p:nvPicPr>
+        <p:blipFill>
+          <a:blip r:embed="rId2">
+            <a:extLst>
+              <a:ext uri="{28A0092B-C50C-407E-A947-70E740481C1C}">
+                <a14:useLocalDpi xmlns:a14="http://schemas.microsoft.com/office/drawing/2010/main" val="0"/>
+              </a:ext>
+            </a:extLst>
+          </a:blip>
+          <a:srcRect/>
+          <a:stretch>
+            <a:fillRect/>
+          </a:stretch>
+        </p:blipFill>
+        <p:spPr bwMode="auto">
+          <a:xfrm>
+            <a:off x="2209800" y="3085398"/>
+            <a:ext cx="639762" cy="550195"/>
+          </a:xfrm>
+          <a:prstGeom prst="rect">
+            <a:avLst/>
+          </a:prstGeom>
+          <a:noFill/>
+          <a:extLst>
+            <a:ext uri="{909E8E84-426E-40DD-AFC4-6F175D3DCCD1}">
+              <a14:hiddenFill xmlns:a14="http://schemas.microsoft.com/office/drawing/2010/main">
+                <a:solidFill>
+                  <a:srgbClr val="FFFFFF"/>
+                </a:solidFill>
+              </a14:hiddenFill>
+            </a:ext>
+          </a:extLst>
+        </p:spPr>
+      </p:pic>
+      <p:pic>
+        <p:nvPicPr>
+          <p:cNvPr id="11" name="Picture 3" descr="C:\Users\gsangle\AppData\Local\Microsoft\Windows\Temporary Internet Files\Content.IE5\78SSJYYB\MC900339826[1].wmf"/>
+          <p:cNvPicPr>
+            <a:picLocks noChangeAspect="1" noChangeArrowheads="1"/>
+          </p:cNvPicPr>
+          <p:nvPr/>
+        </p:nvPicPr>
+        <p:blipFill>
+          <a:blip r:embed="rId3" cstate="print">
+            <a:extLst>
+              <a:ext uri="{28A0092B-C50C-407E-A947-70E740481C1C}">
+                <a14:useLocalDpi xmlns:a14="http://schemas.microsoft.com/office/drawing/2010/main" val="0"/>
+              </a:ext>
+            </a:extLst>
+          </a:blip>
+          <a:srcRect/>
+          <a:stretch>
+            <a:fillRect/>
+          </a:stretch>
+        </p:blipFill>
+        <p:spPr bwMode="auto">
+          <a:xfrm>
+            <a:off x="5978565" y="3085398"/>
+            <a:ext cx="499204" cy="459161"/>
+          </a:xfrm>
+          <a:prstGeom prst="rect">
+            <a:avLst/>
+          </a:prstGeom>
+          <a:noFill/>
+          <a:extLst>
+            <a:ext uri="{909E8E84-426E-40DD-AFC4-6F175D3DCCD1}">
+              <a14:hiddenFill xmlns:a14="http://schemas.microsoft.com/office/drawing/2010/main">
+                <a:solidFill>
+                  <a:srgbClr val="FFFFFF"/>
+                </a:solidFill>
+              </a14:hiddenFill>
+            </a:ext>
+          </a:extLst>
+        </p:spPr>
+      </p:pic>
+      <p:pic>
+        <p:nvPicPr>
+          <p:cNvPr id="12" name="Picture 5" descr="C:\Users\gsangle\AppData\Local\Microsoft\Windows\Temporary Internet Files\Content.IE5\NLRQO756\MC900434829[1].png"/>
+          <p:cNvPicPr>
+            <a:picLocks noChangeAspect="1" noChangeArrowheads="1"/>
+          </p:cNvPicPr>
+          <p:nvPr/>
+        </p:nvPicPr>
+        <p:blipFill>
+          <a:blip r:embed="rId4" cstate="print">
+            <a:extLst>
+              <a:ext uri="{28A0092B-C50C-407E-A947-70E740481C1C}">
+                <a14:useLocalDpi xmlns:a14="http://schemas.microsoft.com/office/drawing/2010/main" val="0"/>
+              </a:ext>
+            </a:extLst>
+          </a:blip>
+          <a:srcRect/>
+          <a:stretch>
+            <a:fillRect/>
+          </a:stretch>
+        </p:blipFill>
+        <p:spPr bwMode="auto">
+          <a:xfrm>
+            <a:off x="6769781" y="3051152"/>
+            <a:ext cx="454025" cy="454025"/>
+          </a:xfrm>
+          <a:prstGeom prst="rect">
+            <a:avLst/>
+          </a:prstGeom>
+          <a:noFill/>
+          <a:extLst>
+            <a:ext uri="{909E8E84-426E-40DD-AFC4-6F175D3DCCD1}">
+              <a14:hiddenFill xmlns:a14="http://schemas.microsoft.com/office/drawing/2010/main">
+                <a:solidFill>
+                  <a:srgbClr val="FFFFFF"/>
+                </a:solidFill>
+              </a14:hiddenFill>
+            </a:ext>
+          </a:extLst>
+        </p:spPr>
+      </p:pic>
+      <p:pic>
+        <p:nvPicPr>
+          <p:cNvPr id="13" name="Picture 6" descr="C:\Users\gsangle\AppData\Local\Microsoft\Windows\Temporary Internet Files\Content.IE5\GLU7V41X\MC900432593[1].png"/>
+          <p:cNvPicPr>
+            <a:picLocks noChangeAspect="1" noChangeArrowheads="1"/>
+          </p:cNvPicPr>
+          <p:nvPr/>
+        </p:nvPicPr>
+        <p:blipFill>
+          <a:blip r:embed="rId5" cstate="print">
+            <a:extLst>
+              <a:ext uri="{28A0092B-C50C-407E-A947-70E740481C1C}">
+                <a14:useLocalDpi xmlns:a14="http://schemas.microsoft.com/office/drawing/2010/main" val="0"/>
+              </a:ext>
+            </a:extLst>
+          </a:blip>
+          <a:srcRect/>
+          <a:stretch>
+            <a:fillRect/>
+          </a:stretch>
+        </p:blipFill>
+        <p:spPr bwMode="auto">
+          <a:xfrm>
+            <a:off x="1905000" y="5791200"/>
+            <a:ext cx="423863" cy="423863"/>
+          </a:xfrm>
+          <a:prstGeom prst="rect">
+            <a:avLst/>
+          </a:prstGeom>
+          <a:noFill/>
+          <a:extLst>
+            <a:ext uri="{909E8E84-426E-40DD-AFC4-6F175D3DCCD1}">
+              <a14:hiddenFill xmlns:a14="http://schemas.microsoft.com/office/drawing/2010/main">
+                <a:solidFill>
+                  <a:srgbClr val="FFFFFF"/>
+                </a:solidFill>
+              </a14:hiddenFill>
+            </a:ext>
+          </a:extLst>
+        </p:spPr>
+      </p:pic>
+      <p:pic>
+        <p:nvPicPr>
+          <p:cNvPr id="14" name="Picture 7" descr="C:\Users\gsangle\AppData\Local\Microsoft\Windows\Temporary Internet Files\Content.IE5\NLRQO756\MC900356077[1].wmf"/>
+          <p:cNvPicPr>
+            <a:picLocks noChangeAspect="1" noChangeArrowheads="1"/>
+          </p:cNvPicPr>
+          <p:nvPr/>
+        </p:nvPicPr>
+        <p:blipFill>
+          <a:blip r:embed="rId6" cstate="print">
+            <a:extLst>
+              <a:ext uri="{28A0092B-C50C-407E-A947-70E740481C1C}">
+                <a14:useLocalDpi xmlns:a14="http://schemas.microsoft.com/office/drawing/2010/main" val="0"/>
+              </a:ext>
+            </a:extLst>
+          </a:blip>
+          <a:srcRect/>
+          <a:stretch>
+            <a:fillRect/>
+          </a:stretch>
+        </p:blipFill>
+        <p:spPr bwMode="auto">
+          <a:xfrm>
+            <a:off x="2717760" y="5791200"/>
+            <a:ext cx="510642" cy="525463"/>
+          </a:xfrm>
+          <a:prstGeom prst="rect">
+            <a:avLst/>
+          </a:prstGeom>
+          <a:noFill/>
+          <a:extLst>
+            <a:ext uri="{909E8E84-426E-40DD-AFC4-6F175D3DCCD1}">
+              <a14:hiddenFill xmlns:a14="http://schemas.microsoft.com/office/drawing/2010/main">
+                <a:solidFill>
+                  <a:srgbClr val="FFFFFF"/>
+                </a:solidFill>
+              </a14:hiddenFill>
+            </a:ext>
+          </a:extLst>
+        </p:spPr>
+      </p:pic>
+      <p:pic>
+        <p:nvPicPr>
+          <p:cNvPr id="15" name="Picture 8" descr="C:\Users\gsangle\AppData\Local\Microsoft\Windows\Temporary Internet Files\Content.IE5\78SSJYYB\MC900411924[1].wmf"/>
+          <p:cNvPicPr>
+            <a:picLocks noChangeAspect="1" noChangeArrowheads="1"/>
+          </p:cNvPicPr>
+          <p:nvPr/>
+        </p:nvPicPr>
+        <p:blipFill>
+          <a:blip r:embed="rId7" cstate="print">
+            <a:extLst>
+              <a:ext uri="{28A0092B-C50C-407E-A947-70E740481C1C}">
+                <a14:useLocalDpi xmlns:a14="http://schemas.microsoft.com/office/drawing/2010/main" val="0"/>
+              </a:ext>
+            </a:extLst>
+          </a:blip>
+          <a:srcRect/>
+          <a:stretch>
+            <a:fillRect/>
+          </a:stretch>
+        </p:blipFill>
+        <p:spPr bwMode="auto">
+          <a:xfrm>
+            <a:off x="6031796" y="5786744"/>
+            <a:ext cx="392742" cy="432773"/>
+          </a:xfrm>
+          <a:prstGeom prst="rect">
+            <a:avLst/>
+          </a:prstGeom>
+          <a:noFill/>
+          <a:extLst>
+            <a:ext uri="{909E8E84-426E-40DD-AFC4-6F175D3DCCD1}">
+              <a14:hiddenFill xmlns:a14="http://schemas.microsoft.com/office/drawing/2010/main">
+                <a:solidFill>
+                  <a:srgbClr val="FFFFFF"/>
+                </a:solidFill>
+              </a14:hiddenFill>
+            </a:ext>
+          </a:extLst>
+        </p:spPr>
+      </p:pic>
+      <p:pic>
+        <p:nvPicPr>
+          <p:cNvPr id="16" name="Picture 13" descr="C:\Users\gsangle\AppData\Local\Microsoft\Windows\Temporary Internet Files\Content.IE5\NLRQO756\MP900431739[1].jpg"/>
+          <p:cNvPicPr>
+            <a:picLocks noChangeAspect="1" noChangeArrowheads="1"/>
+          </p:cNvPicPr>
+          <p:nvPr/>
+        </p:nvPicPr>
+        <p:blipFill>
+          <a:blip r:embed="rId8" cstate="print">
+            <a:extLst>
+              <a:ext uri="{28A0092B-C50C-407E-A947-70E740481C1C}">
+                <a14:useLocalDpi xmlns:a14="http://schemas.microsoft.com/office/drawing/2010/main" val="0"/>
+              </a:ext>
+            </a:extLst>
+          </a:blip>
+          <a:srcRect/>
+          <a:stretch>
+            <a:fillRect/>
+          </a:stretch>
+        </p:blipFill>
+        <p:spPr bwMode="auto">
+          <a:xfrm>
+            <a:off x="6715352" y="5758883"/>
+            <a:ext cx="447448" cy="447448"/>
+          </a:xfrm>
+          <a:prstGeom prst="rect">
+            <a:avLst/>
+          </a:prstGeom>
+          <a:noFill/>
+          <a:extLst>
+            <a:ext uri="{909E8E84-426E-40DD-AFC4-6F175D3DCCD1}">
+              <a14:hiddenFill xmlns:a14="http://schemas.microsoft.com/office/drawing/2010/main">
+                <a:solidFill>
+                  <a:srgbClr val="FFFFFF"/>
+                </a:solidFill>
+              </a14:hiddenFill>
+            </a:ext>
+          </a:extLst>
+        </p:spPr>
+      </p:pic>
     </p:spTree>
     <p:extLst>
       <p:ext uri="{BB962C8B-B14F-4D97-AF65-F5344CB8AC3E}">

</xml_diff>

<commit_message>
Updated testimonial from watsi
</commit_message>
<xml_diff>
--- a/docs/groupProject.pptx
+++ b/docs/groupProject.pptx
@@ -201,7 +201,7 @@
           <a:p>
             <a:fld id="{5EE39229-6641-4520-99DB-0FFD4D3BF858}" type="datetimeFigureOut">
               <a:rPr lang="en-US" smtClean="0"/>
-              <a:t>8/3/2014</a:t>
+              <a:t>8/4/2014</a:t>
             </a:fld>
             <a:endParaRPr lang="en-US"/>
           </a:p>
@@ -767,11 +767,7 @@
           <a:p>
             <a:r>
               <a:rPr lang="en-US" baseline="0" dirty="0" smtClean="0"/>
-              <a:t> - &gt; To extend their reach and awareness with our mobile </a:t>
-            </a:r>
-            <a:r>
-              <a:rPr lang="en-US" baseline="0" dirty="0" smtClean="0"/>
-              <a:t>app.</a:t>
+              <a:t> - &gt; To extend their reach and awareness with our mobile app.</a:t>
             </a:r>
             <a:br>
               <a:rPr lang="en-US" baseline="0" dirty="0" smtClean="0"/>
@@ -783,7 +779,6 @@
               <a:rPr lang="en-US" baseline="0" dirty="0" smtClean="0"/>
               <a:t>Pyramid structure of problem and inspiration</a:t>
             </a:r>
-            <a:endParaRPr lang="en-US" baseline="0" dirty="0" smtClean="0"/>
           </a:p>
         </p:txBody>
       </p:sp>
@@ -1689,7 +1684,7 @@
           <a:p>
             <a:fld id="{C16D46D2-A5CF-4EF4-A6E9-A8A0D2AF825B}" type="datetimeFigureOut">
               <a:rPr lang="en-US" smtClean="0"/>
-              <a:t>8/3/2014</a:t>
+              <a:t>8/4/2014</a:t>
             </a:fld>
             <a:endParaRPr lang="en-US"/>
           </a:p>
@@ -1859,7 +1854,7 @@
           <a:p>
             <a:fld id="{C16D46D2-A5CF-4EF4-A6E9-A8A0D2AF825B}" type="datetimeFigureOut">
               <a:rPr lang="en-US" smtClean="0"/>
-              <a:t>8/3/2014</a:t>
+              <a:t>8/4/2014</a:t>
             </a:fld>
             <a:endParaRPr lang="en-US"/>
           </a:p>
@@ -2039,7 +2034,7 @@
           <a:p>
             <a:fld id="{C16D46D2-A5CF-4EF4-A6E9-A8A0D2AF825B}" type="datetimeFigureOut">
               <a:rPr lang="en-US" smtClean="0"/>
-              <a:t>8/3/2014</a:t>
+              <a:t>8/4/2014</a:t>
             </a:fld>
             <a:endParaRPr lang="en-US"/>
           </a:p>
@@ -2209,7 +2204,7 @@
           <a:p>
             <a:fld id="{C16D46D2-A5CF-4EF4-A6E9-A8A0D2AF825B}" type="datetimeFigureOut">
               <a:rPr lang="en-US" smtClean="0"/>
-              <a:t>8/3/2014</a:t>
+              <a:t>8/4/2014</a:t>
             </a:fld>
             <a:endParaRPr lang="en-US"/>
           </a:p>
@@ -2455,7 +2450,7 @@
           <a:p>
             <a:fld id="{C16D46D2-A5CF-4EF4-A6E9-A8A0D2AF825B}" type="datetimeFigureOut">
               <a:rPr lang="en-US" smtClean="0"/>
-              <a:t>8/3/2014</a:t>
+              <a:t>8/4/2014</a:t>
             </a:fld>
             <a:endParaRPr lang="en-US"/>
           </a:p>
@@ -2743,7 +2738,7 @@
           <a:p>
             <a:fld id="{C16D46D2-A5CF-4EF4-A6E9-A8A0D2AF825B}" type="datetimeFigureOut">
               <a:rPr lang="en-US" smtClean="0"/>
-              <a:t>8/3/2014</a:t>
+              <a:t>8/4/2014</a:t>
             </a:fld>
             <a:endParaRPr lang="en-US"/>
           </a:p>
@@ -3165,7 +3160,7 @@
           <a:p>
             <a:fld id="{C16D46D2-A5CF-4EF4-A6E9-A8A0D2AF825B}" type="datetimeFigureOut">
               <a:rPr lang="en-US" smtClean="0"/>
-              <a:t>8/3/2014</a:t>
+              <a:t>8/4/2014</a:t>
             </a:fld>
             <a:endParaRPr lang="en-US"/>
           </a:p>
@@ -3283,7 +3278,7 @@
           <a:p>
             <a:fld id="{C16D46D2-A5CF-4EF4-A6E9-A8A0D2AF825B}" type="datetimeFigureOut">
               <a:rPr lang="en-US" smtClean="0"/>
-              <a:t>8/3/2014</a:t>
+              <a:t>8/4/2014</a:t>
             </a:fld>
             <a:endParaRPr lang="en-US"/>
           </a:p>
@@ -3378,7 +3373,7 @@
           <a:p>
             <a:fld id="{C16D46D2-A5CF-4EF4-A6E9-A8A0D2AF825B}" type="datetimeFigureOut">
               <a:rPr lang="en-US" smtClean="0"/>
-              <a:t>8/3/2014</a:t>
+              <a:t>8/4/2014</a:t>
             </a:fld>
             <a:endParaRPr lang="en-US"/>
           </a:p>
@@ -3655,7 +3650,7 @@
           <a:p>
             <a:fld id="{C16D46D2-A5CF-4EF4-A6E9-A8A0D2AF825B}" type="datetimeFigureOut">
               <a:rPr lang="en-US" smtClean="0"/>
-              <a:t>8/3/2014</a:t>
+              <a:t>8/4/2014</a:t>
             </a:fld>
             <a:endParaRPr lang="en-US"/>
           </a:p>
@@ -3908,7 +3903,7 @@
           <a:p>
             <a:fld id="{C16D46D2-A5CF-4EF4-A6E9-A8A0D2AF825B}" type="datetimeFigureOut">
               <a:rPr lang="en-US" smtClean="0"/>
-              <a:t>8/3/2014</a:t>
+              <a:t>8/4/2014</a:t>
             </a:fld>
             <a:endParaRPr lang="en-US"/>
           </a:p>
@@ -4124,7 +4119,7 @@
           <a:p>
             <a:fld id="{C16D46D2-A5CF-4EF4-A6E9-A8A0D2AF825B}" type="datetimeFigureOut">
               <a:rPr lang="en-US" smtClean="0"/>
-              <a:t>8/3/2014</a:t>
+              <a:t>8/4/2014</a:t>
             </a:fld>
             <a:endParaRPr lang="en-US"/>
           </a:p>
@@ -4646,15 +4641,7 @@
                   <a:schemeClr val="bg1"/>
                 </a:solidFill>
               </a:rPr>
-              <a:t>	     </a:t>
-            </a:r>
-            <a:r>
-              <a:rPr lang="en-US" sz="3200" dirty="0" smtClean="0">
-                <a:solidFill>
-                  <a:schemeClr val="bg1"/>
-                </a:solidFill>
-              </a:rPr>
-              <a:t>Nathan and </a:t>
+              <a:t>	     Nathan and </a:t>
             </a:r>
             <a:r>
               <a:rPr lang="en-US" sz="3200" dirty="0" err="1" smtClean="0">
@@ -7485,12 +7472,20 @@
           <a:lstStyle/>
           <a:p>
             <a:r>
-              <a:rPr lang="en-US" dirty="0" smtClean="0">
+              <a:rPr lang="en-US" dirty="0">
                 <a:solidFill>
                   <a:schemeClr val="bg1"/>
                 </a:solidFill>
               </a:rPr>
-              <a:t>“</a:t>
+              <a:t>"We were really excited that </a:t>
+            </a:r>
+            <a:r>
+              <a:rPr lang="en-US" dirty="0" err="1">
+                <a:solidFill>
+                  <a:schemeClr val="bg1"/>
+                </a:solidFill>
+              </a:rPr>
+              <a:t>Rutvij</a:t>
             </a:r>
             <a:r>
               <a:rPr lang="en-US" dirty="0">
@@ -7498,15 +7493,7 @@
                   <a:schemeClr val="bg1"/>
                 </a:solidFill>
               </a:rPr>
-              <a:t>At first glance, it looks amazing. Thanks again for picking us as your project</a:t>
-            </a:r>
-            <a:r>
-              <a:rPr lang="en-US" dirty="0" smtClean="0">
-                <a:solidFill>
-                  <a:schemeClr val="bg1"/>
-                </a:solidFill>
-              </a:rPr>
-              <a:t>!”</a:t>
+              <a:t> and his team decided to help out Watsi by building us an awesome Android app. Thanks guys!"</a:t>
             </a:r>
             <a:endParaRPr lang="en-US" dirty="0">
               <a:solidFill>
@@ -7538,7 +7525,7 @@
         </p:blipFill>
         <p:spPr>
           <a:xfrm>
-            <a:off x="5867400" y="3733800"/>
+            <a:off x="5867400" y="3810000"/>
             <a:ext cx="1905000" cy="1905000"/>
           </a:xfrm>
           <a:prstGeom prst="rect">

</xml_diff>

<commit_message>
Updated PPT as per our discussion tonight
</commit_message>
<xml_diff>
--- a/docs/groupProject.pptx
+++ b/docs/groupProject.pptx
@@ -14,7 +14,7 @@
     <p:sldId id="259" r:id="rId5"/>
     <p:sldId id="260" r:id="rId6"/>
     <p:sldId id="261" r:id="rId7"/>
-    <p:sldId id="266" r:id="rId8"/>
+    <p:sldId id="268" r:id="rId8"/>
     <p:sldId id="263" r:id="rId9"/>
     <p:sldId id="265" r:id="rId10"/>
     <p:sldId id="264" r:id="rId11"/>
@@ -1102,31 +1102,7 @@
                   <a:schemeClr val="bg1"/>
                 </a:solidFill>
               </a:rPr>
-              <a:t>High</a:t>
-            </a:r>
-            <a:r>
-              <a:rPr lang="en-US" sz="1200" baseline="0" dirty="0" smtClean="0">
-                <a:solidFill>
-                  <a:schemeClr val="bg1"/>
-                </a:solidFill>
-              </a:rPr>
-              <a:t> level roadmap from “Now” to “</a:t>
-            </a:r>
-            <a:r>
-              <a:rPr lang="en-US" sz="1200" baseline="0" dirty="0" err="1" smtClean="0">
-                <a:solidFill>
-                  <a:schemeClr val="bg1"/>
-                </a:solidFill>
-              </a:rPr>
-              <a:t>Playstore</a:t>
-            </a:r>
-            <a:r>
-              <a:rPr lang="en-US" sz="1200" baseline="0" dirty="0" smtClean="0">
-                <a:solidFill>
-                  <a:schemeClr val="bg1"/>
-                </a:solidFill>
-              </a:rPr>
-              <a:t>”</a:t>
+              <a:t>Tablet UI</a:t>
             </a:r>
           </a:p>
           <a:p>
@@ -1135,18 +1111,68 @@
               <a:buChar char="•"/>
             </a:pPr>
             <a:r>
-              <a:rPr lang="en-US" sz="1200" baseline="0" dirty="0" smtClean="0">
+              <a:rPr lang="en-US" sz="1200" dirty="0" smtClean="0">
                 <a:solidFill>
                   <a:schemeClr val="bg1"/>
                 </a:solidFill>
               </a:rPr>
-              <a:t>Timeline view</a:t>
+              <a:t>Location aware notifications.</a:t>
+            </a:r>
+          </a:p>
+          <a:p>
+            <a:pPr marL="285750" indent="-285750">
+              <a:buFont typeface="Arial" panose="020B0604020202020204" pitchFamily="34" charset="0"/>
+              <a:buChar char="•"/>
+            </a:pPr>
+            <a:r>
+              <a:rPr lang="en-US" sz="1200" dirty="0" smtClean="0">
+                <a:solidFill>
+                  <a:schemeClr val="bg1"/>
+                </a:solidFill>
+              </a:rPr>
+              <a:t>Auto pay start of every month</a:t>
+            </a:r>
+          </a:p>
+          <a:p>
+            <a:pPr marL="285750" indent="-285750">
+              <a:buFont typeface="Arial" panose="020B0604020202020204" pitchFamily="34" charset="0"/>
+              <a:buChar char="•"/>
+            </a:pPr>
+            <a:r>
+              <a:rPr lang="en-US" sz="1200" dirty="0" smtClean="0">
+                <a:solidFill>
+                  <a:schemeClr val="bg1"/>
+                </a:solidFill>
+              </a:rPr>
+              <a:t>Integration with Watsi </a:t>
+            </a:r>
+            <a:r>
+              <a:rPr lang="en-US" sz="1200" dirty="0" err="1" smtClean="0">
+                <a:solidFill>
+                  <a:schemeClr val="bg1"/>
+                </a:solidFill>
+              </a:rPr>
+              <a:t>Api</a:t>
             </a:r>
             <a:endParaRPr lang="en-US" sz="1200" dirty="0" smtClean="0">
               <a:solidFill>
                 <a:schemeClr val="bg1"/>
               </a:solidFill>
             </a:endParaRPr>
+          </a:p>
+          <a:p>
+            <a:pPr marL="285750" indent="-285750">
+              <a:buFont typeface="Arial" panose="020B0604020202020204" pitchFamily="34" charset="0"/>
+              <a:buChar char="•"/>
+            </a:pPr>
+            <a:r>
+              <a:rPr lang="en-US" sz="1200" dirty="0" smtClean="0">
+                <a:solidFill>
+                  <a:schemeClr val="bg1"/>
+                </a:solidFill>
+              </a:rPr>
+              <a:t>Heat map based on donation data.</a:t>
+            </a:r>
           </a:p>
           <a:p>
             <a:endParaRPr lang="en-US" dirty="0"/>
@@ -4617,7 +4643,7 @@
         </p:nvSpPr>
         <p:spPr>
           <a:xfrm>
-            <a:off x="533400" y="4495800"/>
+            <a:off x="533400" y="4953000"/>
             <a:ext cx="8229600" cy="1295400"/>
           </a:xfrm>
         </p:spPr>
@@ -4641,85 +4667,8 @@
                   <a:schemeClr val="bg1"/>
                 </a:solidFill>
               </a:rPr>
-              <a:t>	     Nathan and </a:t>
-            </a:r>
-            <a:r>
-              <a:rPr lang="en-US" sz="3200" dirty="0" err="1" smtClean="0">
-                <a:solidFill>
-                  <a:schemeClr val="bg1"/>
-                </a:solidFill>
-              </a:rPr>
-              <a:t>Codepath</a:t>
-            </a:r>
-            <a:r>
-              <a:rPr lang="en-US" sz="3200" dirty="0" smtClean="0">
-                <a:solidFill>
-                  <a:schemeClr val="bg1"/>
-                </a:solidFill>
-              </a:rPr>
-              <a:t/>
-            </a:r>
-            <a:br>
-              <a:rPr lang="en-US" sz="3200" dirty="0" smtClean="0">
-                <a:solidFill>
-                  <a:schemeClr val="bg1"/>
-                </a:solidFill>
-              </a:rPr>
-            </a:br>
-            <a:r>
-              <a:rPr lang="en-US" sz="3200" dirty="0" smtClean="0">
-                <a:solidFill>
-                  <a:schemeClr val="bg1"/>
-                </a:solidFill>
-              </a:rPr>
               <a:t>	</a:t>
             </a:r>
-            <a:r>
-              <a:rPr lang="en-US" sz="3200" dirty="0">
-                <a:solidFill>
-                  <a:schemeClr val="bg1"/>
-                </a:solidFill>
-              </a:rPr>
-              <a:t> </a:t>
-            </a:r>
-            <a:r>
-              <a:rPr lang="en-US" sz="3200" dirty="0" smtClean="0">
-                <a:solidFill>
-                  <a:schemeClr val="bg1"/>
-                </a:solidFill>
-              </a:rPr>
-              <a:t>    Jesus ( Mentor )</a:t>
-            </a:r>
-            <a:br>
-              <a:rPr lang="en-US" sz="3200" dirty="0" smtClean="0">
-                <a:solidFill>
-                  <a:schemeClr val="bg1"/>
-                </a:solidFill>
-              </a:rPr>
-            </a:br>
-            <a:r>
-              <a:rPr lang="en-US" sz="3200" dirty="0" smtClean="0">
-                <a:solidFill>
-                  <a:schemeClr val="bg1"/>
-                </a:solidFill>
-              </a:rPr>
-              <a:t>Yahoo ! </a:t>
-            </a:r>
-            <a:r>
-              <a:rPr lang="en-US" dirty="0" smtClean="0">
-                <a:solidFill>
-                  <a:schemeClr val="bg1"/>
-                </a:solidFill>
-              </a:rPr>
-              <a:t/>
-            </a:r>
-            <a:br>
-              <a:rPr lang="en-US" dirty="0" smtClean="0">
-                <a:solidFill>
-                  <a:schemeClr val="bg1"/>
-                </a:solidFill>
-              </a:rPr>
-            </a:br>
             <a:r>
               <a:rPr lang="en-US" dirty="0" smtClean="0">
                 <a:solidFill>
@@ -4812,7 +4761,7 @@
         </p:nvSpPr>
         <p:spPr>
           <a:xfrm>
-            <a:off x="3581400" y="838200"/>
+            <a:off x="3516086" y="816429"/>
             <a:ext cx="1942263" cy="830997"/>
           </a:xfrm>
           <a:prstGeom prst="rect">
@@ -4839,6 +4788,72 @@
                 <a:schemeClr val="bg1"/>
               </a:solidFill>
             </a:endParaRPr>
+          </a:p>
+        </p:txBody>
+      </p:sp>
+      <p:sp>
+        <p:nvSpPr>
+          <p:cNvPr id="4" name="TextBox 3"/>
+          <p:cNvSpPr txBox="1"/>
+          <p:nvPr/>
+        </p:nvSpPr>
+        <p:spPr>
+          <a:xfrm>
+            <a:off x="3429980" y="2209800"/>
+            <a:ext cx="4289379" cy="2031325"/>
+          </a:xfrm>
+          <a:prstGeom prst="rect">
+            <a:avLst/>
+          </a:prstGeom>
+          <a:noFill/>
+        </p:spPr>
+        <p:txBody>
+          <a:bodyPr wrap="none" rtlCol="0">
+            <a:spAutoFit/>
+          </a:bodyPr>
+          <a:lstStyle/>
+          <a:p>
+            <a:r>
+              <a:rPr lang="en-US" sz="3600" dirty="0" smtClean="0">
+                <a:solidFill>
+                  <a:schemeClr val="bg1"/>
+                </a:solidFill>
+              </a:rPr>
+              <a:t>Nathan and Codepath</a:t>
+            </a:r>
+            <a:br>
+              <a:rPr lang="en-US" sz="3600" dirty="0" smtClean="0">
+                <a:solidFill>
+                  <a:schemeClr val="bg1"/>
+                </a:solidFill>
+              </a:rPr>
+            </a:br>
+            <a:r>
+              <a:rPr lang="en-US" sz="3600" dirty="0" smtClean="0">
+                <a:solidFill>
+                  <a:schemeClr val="bg1"/>
+                </a:solidFill>
+              </a:rPr>
+              <a:t>Jesus</a:t>
+            </a:r>
+          </a:p>
+          <a:p>
+            <a:r>
+              <a:rPr lang="en-US" sz="3600" dirty="0" smtClean="0">
+                <a:solidFill>
+                  <a:schemeClr val="bg1"/>
+                </a:solidFill>
+              </a:rPr>
+              <a:t>Yahoo !</a:t>
+            </a:r>
+            <a:r>
+              <a:rPr lang="en-US" dirty="0" smtClean="0"/>
+              <a:t/>
+            </a:r>
+            <a:br>
+              <a:rPr lang="en-US" dirty="0" smtClean="0"/>
+            </a:br>
+            <a:endParaRPr lang="en-US" dirty="0"/>
           </a:p>
         </p:txBody>
       </p:sp>
@@ -5352,7 +5367,7 @@
         <p:spPr>
           <a:xfrm>
             <a:off x="5943600" y="2345871"/>
-            <a:ext cx="1197429" cy="723900"/>
+            <a:ext cx="1295400" cy="723900"/>
           </a:xfrm>
           <a:prstGeom prst="roundRect">
             <a:avLst/>
@@ -5391,7 +5406,7 @@
                   <a:schemeClr val="bg1"/>
                 </a:solidFill>
               </a:rPr>
-              <a:t>Fast</a:t>
+              <a:t>Feed, Notification</a:t>
             </a:r>
             <a:endParaRPr lang="en-US" sz="1600" dirty="0">
               <a:solidFill>
@@ -5449,7 +5464,7 @@
                   <a:schemeClr val="bg1"/>
                 </a:solidFill>
               </a:rPr>
-              <a:t>Bureaucratic</a:t>
+              <a:t>Help</a:t>
             </a:r>
             <a:endParaRPr lang="en-US" sz="1600" dirty="0">
               <a:solidFill>
@@ -5507,7 +5522,7 @@
                   <a:schemeClr val="bg1"/>
                 </a:solidFill>
               </a:rPr>
-              <a:t>Difficult to enroll huge sections of society</a:t>
+              <a:t>Engagement &amp; Reach</a:t>
             </a:r>
             <a:endParaRPr lang="en-US" sz="1600" dirty="0">
               <a:solidFill>
@@ -5565,7 +5580,7 @@
                   <a:schemeClr val="bg1"/>
                 </a:solidFill>
               </a:rPr>
-              <a:t>Smart Phone Revolution</a:t>
+              <a:t>Watsi App</a:t>
             </a:r>
             <a:endParaRPr lang="en-US" sz="1600" dirty="0">
               <a:solidFill>
@@ -5623,7 +5638,7 @@
                   <a:schemeClr val="bg1"/>
                 </a:solidFill>
               </a:rPr>
-              <a:t>Slow</a:t>
+              <a:t>Awareness</a:t>
             </a:r>
             <a:endParaRPr lang="en-US" sz="1600" dirty="0">
               <a:solidFill>
@@ -5681,7 +5696,22 @@
                   <a:schemeClr val="bg1"/>
                 </a:solidFill>
               </a:rPr>
-              <a:t>Free and Open</a:t>
+              <a:t>Single click </a:t>
+            </a:r>
+            <a:br>
+              <a:rPr lang="en-US" sz="1600" dirty="0" smtClean="0">
+                <a:solidFill>
+                  <a:schemeClr val="bg1"/>
+                </a:solidFill>
+              </a:rPr>
+            </a:br>
+            <a:r>
+              <a:rPr lang="en-US" sz="1600" dirty="0" smtClean="0">
+                <a:solidFill>
+                  <a:schemeClr val="bg1"/>
+                </a:solidFill>
+              </a:rPr>
+              <a:t>Donate/Share</a:t>
             </a:r>
             <a:endParaRPr lang="en-US" sz="1600" dirty="0">
               <a:solidFill>
@@ -5739,7 +5769,7 @@
                   <a:schemeClr val="bg1"/>
                 </a:solidFill>
               </a:rPr>
-              <a:t>Power of Social Networks</a:t>
+              <a:t>Social Networks</a:t>
             </a:r>
             <a:endParaRPr lang="en-US" sz="1600" dirty="0">
               <a:solidFill>
@@ -6106,12 +6136,28 @@
           <a:p>
             <a:pPr algn="ctr"/>
             <a:r>
+              <a:rPr lang="en-US" sz="1600" dirty="0">
+                <a:solidFill>
+                  <a:schemeClr val="bg1"/>
+                </a:solidFill>
+              </a:rPr>
+              <a:t>E</a:t>
+            </a:r>
+            <a:r>
               <a:rPr lang="en-US" sz="1600" dirty="0" smtClean="0">
                 <a:solidFill>
                   <a:schemeClr val="bg1"/>
                 </a:solidFill>
               </a:rPr>
-              <a:t>Make it easy to donate</a:t>
+              <a:t>asy </a:t>
+            </a:r>
+            <a:r>
+              <a:rPr lang="en-US" sz="1600" dirty="0" smtClean="0">
+                <a:solidFill>
+                  <a:schemeClr val="bg1"/>
+                </a:solidFill>
+              </a:rPr>
+              <a:t>to donate</a:t>
             </a:r>
             <a:endParaRPr lang="en-US" sz="1600" dirty="0">
               <a:solidFill>
@@ -6164,12 +6210,28 @@
           <a:p>
             <a:pPr algn="ctr"/>
             <a:r>
+              <a:rPr lang="en-US" sz="1600" dirty="0">
+                <a:solidFill>
+                  <a:schemeClr val="bg1"/>
+                </a:solidFill>
+              </a:rPr>
+              <a:t>E</a:t>
+            </a:r>
+            <a:r>
               <a:rPr lang="en-US" sz="1600" dirty="0" smtClean="0">
                 <a:solidFill>
                   <a:schemeClr val="bg1"/>
                 </a:solidFill>
               </a:rPr>
-              <a:t>Make it easy to Share</a:t>
+              <a:t>asy </a:t>
+            </a:r>
+            <a:r>
+              <a:rPr lang="en-US" sz="1600" dirty="0" smtClean="0">
+                <a:solidFill>
+                  <a:schemeClr val="bg1"/>
+                </a:solidFill>
+              </a:rPr>
+              <a:t>to Share</a:t>
             </a:r>
             <a:endParaRPr lang="en-US" sz="1600" dirty="0">
               <a:solidFill>
@@ -6759,7 +6821,7 @@
                   <a:schemeClr val="bg1"/>
                 </a:solidFill>
               </a:rPr>
-              <a:t>Presenting Profile Images with Donation Details</a:t>
+              <a:t>Third Party Libraries</a:t>
             </a:r>
             <a:endParaRPr lang="en-US" sz="1600" dirty="0">
               <a:solidFill>
@@ -6870,12 +6932,20 @@
           <a:p>
             <a:pPr algn="ctr"/>
             <a:r>
+              <a:rPr lang="en-US" sz="1600" dirty="0" err="1" smtClean="0">
+                <a:solidFill>
+                  <a:schemeClr val="bg1"/>
+                </a:solidFill>
+              </a:rPr>
+              <a:t>Paypal</a:t>
+            </a:r>
+            <a:r>
               <a:rPr lang="en-US" sz="1600" dirty="0" smtClean="0">
                 <a:solidFill>
                   <a:schemeClr val="bg1"/>
                 </a:solidFill>
               </a:rPr>
-              <a:t>User Login and Facebook Integration </a:t>
+              <a:t> Integration</a:t>
             </a:r>
             <a:endParaRPr lang="en-US" sz="1600" dirty="0">
               <a:solidFill>
@@ -6943,293 +7013,6 @@
           </a:p>
         </p:txBody>
       </p:sp>
-      <p:pic>
-        <p:nvPicPr>
-          <p:cNvPr id="10" name="Picture 2" descr="C:\Program Files (x86)\Microsoft Office\MEDIA\CAGCAT10\j0300520.gif"/>
-          <p:cNvPicPr>
-            <a:picLocks noChangeAspect="1" noChangeArrowheads="1" noCrop="1"/>
-          </p:cNvPicPr>
-          <p:nvPr/>
-        </p:nvPicPr>
-        <p:blipFill>
-          <a:blip r:embed="rId2">
-            <a:extLst>
-              <a:ext uri="{28A0092B-C50C-407E-A947-70E740481C1C}">
-                <a14:useLocalDpi xmlns:a14="http://schemas.microsoft.com/office/drawing/2010/main" val="0"/>
-              </a:ext>
-            </a:extLst>
-          </a:blip>
-          <a:srcRect/>
-          <a:stretch>
-            <a:fillRect/>
-          </a:stretch>
-        </p:blipFill>
-        <p:spPr bwMode="auto">
-          <a:xfrm>
-            <a:off x="2209800" y="3085398"/>
-            <a:ext cx="639762" cy="550195"/>
-          </a:xfrm>
-          <a:prstGeom prst="rect">
-            <a:avLst/>
-          </a:prstGeom>
-          <a:noFill/>
-          <a:extLst>
-            <a:ext uri="{909E8E84-426E-40DD-AFC4-6F175D3DCCD1}">
-              <a14:hiddenFill xmlns:a14="http://schemas.microsoft.com/office/drawing/2010/main">
-                <a:solidFill>
-                  <a:srgbClr val="FFFFFF"/>
-                </a:solidFill>
-              </a14:hiddenFill>
-            </a:ext>
-          </a:extLst>
-        </p:spPr>
-      </p:pic>
-      <p:pic>
-        <p:nvPicPr>
-          <p:cNvPr id="11" name="Picture 3" descr="C:\Users\gsangle\AppData\Local\Microsoft\Windows\Temporary Internet Files\Content.IE5\78SSJYYB\MC900339826[1].wmf"/>
-          <p:cNvPicPr>
-            <a:picLocks noChangeAspect="1" noChangeArrowheads="1"/>
-          </p:cNvPicPr>
-          <p:nvPr/>
-        </p:nvPicPr>
-        <p:blipFill>
-          <a:blip r:embed="rId3" cstate="print">
-            <a:extLst>
-              <a:ext uri="{28A0092B-C50C-407E-A947-70E740481C1C}">
-                <a14:useLocalDpi xmlns:a14="http://schemas.microsoft.com/office/drawing/2010/main" val="0"/>
-              </a:ext>
-            </a:extLst>
-          </a:blip>
-          <a:srcRect/>
-          <a:stretch>
-            <a:fillRect/>
-          </a:stretch>
-        </p:blipFill>
-        <p:spPr bwMode="auto">
-          <a:xfrm>
-            <a:off x="5978565" y="3085398"/>
-            <a:ext cx="499204" cy="459161"/>
-          </a:xfrm>
-          <a:prstGeom prst="rect">
-            <a:avLst/>
-          </a:prstGeom>
-          <a:noFill/>
-          <a:extLst>
-            <a:ext uri="{909E8E84-426E-40DD-AFC4-6F175D3DCCD1}">
-              <a14:hiddenFill xmlns:a14="http://schemas.microsoft.com/office/drawing/2010/main">
-                <a:solidFill>
-                  <a:srgbClr val="FFFFFF"/>
-                </a:solidFill>
-              </a14:hiddenFill>
-            </a:ext>
-          </a:extLst>
-        </p:spPr>
-      </p:pic>
-      <p:pic>
-        <p:nvPicPr>
-          <p:cNvPr id="12" name="Picture 5" descr="C:\Users\gsangle\AppData\Local\Microsoft\Windows\Temporary Internet Files\Content.IE5\NLRQO756\MC900434829[1].png"/>
-          <p:cNvPicPr>
-            <a:picLocks noChangeAspect="1" noChangeArrowheads="1"/>
-          </p:cNvPicPr>
-          <p:nvPr/>
-        </p:nvPicPr>
-        <p:blipFill>
-          <a:blip r:embed="rId4" cstate="print">
-            <a:extLst>
-              <a:ext uri="{28A0092B-C50C-407E-A947-70E740481C1C}">
-                <a14:useLocalDpi xmlns:a14="http://schemas.microsoft.com/office/drawing/2010/main" val="0"/>
-              </a:ext>
-            </a:extLst>
-          </a:blip>
-          <a:srcRect/>
-          <a:stretch>
-            <a:fillRect/>
-          </a:stretch>
-        </p:blipFill>
-        <p:spPr bwMode="auto">
-          <a:xfrm>
-            <a:off x="6769781" y="3051152"/>
-            <a:ext cx="454025" cy="454025"/>
-          </a:xfrm>
-          <a:prstGeom prst="rect">
-            <a:avLst/>
-          </a:prstGeom>
-          <a:noFill/>
-          <a:extLst>
-            <a:ext uri="{909E8E84-426E-40DD-AFC4-6F175D3DCCD1}">
-              <a14:hiddenFill xmlns:a14="http://schemas.microsoft.com/office/drawing/2010/main">
-                <a:solidFill>
-                  <a:srgbClr val="FFFFFF"/>
-                </a:solidFill>
-              </a14:hiddenFill>
-            </a:ext>
-          </a:extLst>
-        </p:spPr>
-      </p:pic>
-      <p:pic>
-        <p:nvPicPr>
-          <p:cNvPr id="13" name="Picture 6" descr="C:\Users\gsangle\AppData\Local\Microsoft\Windows\Temporary Internet Files\Content.IE5\GLU7V41X\MC900432593[1].png"/>
-          <p:cNvPicPr>
-            <a:picLocks noChangeAspect="1" noChangeArrowheads="1"/>
-          </p:cNvPicPr>
-          <p:nvPr/>
-        </p:nvPicPr>
-        <p:blipFill>
-          <a:blip r:embed="rId5" cstate="print">
-            <a:extLst>
-              <a:ext uri="{28A0092B-C50C-407E-A947-70E740481C1C}">
-                <a14:useLocalDpi xmlns:a14="http://schemas.microsoft.com/office/drawing/2010/main" val="0"/>
-              </a:ext>
-            </a:extLst>
-          </a:blip>
-          <a:srcRect/>
-          <a:stretch>
-            <a:fillRect/>
-          </a:stretch>
-        </p:blipFill>
-        <p:spPr bwMode="auto">
-          <a:xfrm>
-            <a:off x="1905000" y="5791200"/>
-            <a:ext cx="423863" cy="423863"/>
-          </a:xfrm>
-          <a:prstGeom prst="rect">
-            <a:avLst/>
-          </a:prstGeom>
-          <a:noFill/>
-          <a:extLst>
-            <a:ext uri="{909E8E84-426E-40DD-AFC4-6F175D3DCCD1}">
-              <a14:hiddenFill xmlns:a14="http://schemas.microsoft.com/office/drawing/2010/main">
-                <a:solidFill>
-                  <a:srgbClr val="FFFFFF"/>
-                </a:solidFill>
-              </a14:hiddenFill>
-            </a:ext>
-          </a:extLst>
-        </p:spPr>
-      </p:pic>
-      <p:pic>
-        <p:nvPicPr>
-          <p:cNvPr id="14" name="Picture 7" descr="C:\Users\gsangle\AppData\Local\Microsoft\Windows\Temporary Internet Files\Content.IE5\NLRQO756\MC900356077[1].wmf"/>
-          <p:cNvPicPr>
-            <a:picLocks noChangeAspect="1" noChangeArrowheads="1"/>
-          </p:cNvPicPr>
-          <p:nvPr/>
-        </p:nvPicPr>
-        <p:blipFill>
-          <a:blip r:embed="rId6" cstate="print">
-            <a:extLst>
-              <a:ext uri="{28A0092B-C50C-407E-A947-70E740481C1C}">
-                <a14:useLocalDpi xmlns:a14="http://schemas.microsoft.com/office/drawing/2010/main" val="0"/>
-              </a:ext>
-            </a:extLst>
-          </a:blip>
-          <a:srcRect/>
-          <a:stretch>
-            <a:fillRect/>
-          </a:stretch>
-        </p:blipFill>
-        <p:spPr bwMode="auto">
-          <a:xfrm>
-            <a:off x="2717760" y="5791200"/>
-            <a:ext cx="510642" cy="525463"/>
-          </a:xfrm>
-          <a:prstGeom prst="rect">
-            <a:avLst/>
-          </a:prstGeom>
-          <a:noFill/>
-          <a:extLst>
-            <a:ext uri="{909E8E84-426E-40DD-AFC4-6F175D3DCCD1}">
-              <a14:hiddenFill xmlns:a14="http://schemas.microsoft.com/office/drawing/2010/main">
-                <a:solidFill>
-                  <a:srgbClr val="FFFFFF"/>
-                </a:solidFill>
-              </a14:hiddenFill>
-            </a:ext>
-          </a:extLst>
-        </p:spPr>
-      </p:pic>
-      <p:pic>
-        <p:nvPicPr>
-          <p:cNvPr id="15" name="Picture 8" descr="C:\Users\gsangle\AppData\Local\Microsoft\Windows\Temporary Internet Files\Content.IE5\78SSJYYB\MC900411924[1].wmf"/>
-          <p:cNvPicPr>
-            <a:picLocks noChangeAspect="1" noChangeArrowheads="1"/>
-          </p:cNvPicPr>
-          <p:nvPr/>
-        </p:nvPicPr>
-        <p:blipFill>
-          <a:blip r:embed="rId7" cstate="print">
-            <a:extLst>
-              <a:ext uri="{28A0092B-C50C-407E-A947-70E740481C1C}">
-                <a14:useLocalDpi xmlns:a14="http://schemas.microsoft.com/office/drawing/2010/main" val="0"/>
-              </a:ext>
-            </a:extLst>
-          </a:blip>
-          <a:srcRect/>
-          <a:stretch>
-            <a:fillRect/>
-          </a:stretch>
-        </p:blipFill>
-        <p:spPr bwMode="auto">
-          <a:xfrm>
-            <a:off x="6031796" y="5786744"/>
-            <a:ext cx="392742" cy="432773"/>
-          </a:xfrm>
-          <a:prstGeom prst="rect">
-            <a:avLst/>
-          </a:prstGeom>
-          <a:noFill/>
-          <a:extLst>
-            <a:ext uri="{909E8E84-426E-40DD-AFC4-6F175D3DCCD1}">
-              <a14:hiddenFill xmlns:a14="http://schemas.microsoft.com/office/drawing/2010/main">
-                <a:solidFill>
-                  <a:srgbClr val="FFFFFF"/>
-                </a:solidFill>
-              </a14:hiddenFill>
-            </a:ext>
-          </a:extLst>
-        </p:spPr>
-      </p:pic>
-      <p:pic>
-        <p:nvPicPr>
-          <p:cNvPr id="16" name="Picture 13" descr="C:\Users\gsangle\AppData\Local\Microsoft\Windows\Temporary Internet Files\Content.IE5\NLRQO756\MP900431739[1].jpg"/>
-          <p:cNvPicPr>
-            <a:picLocks noChangeAspect="1" noChangeArrowheads="1"/>
-          </p:cNvPicPr>
-          <p:nvPr/>
-        </p:nvPicPr>
-        <p:blipFill>
-          <a:blip r:embed="rId8" cstate="print">
-            <a:extLst>
-              <a:ext uri="{28A0092B-C50C-407E-A947-70E740481C1C}">
-                <a14:useLocalDpi xmlns:a14="http://schemas.microsoft.com/office/drawing/2010/main" val="0"/>
-              </a:ext>
-            </a:extLst>
-          </a:blip>
-          <a:srcRect/>
-          <a:stretch>
-            <a:fillRect/>
-          </a:stretch>
-        </p:blipFill>
-        <p:spPr bwMode="auto">
-          <a:xfrm>
-            <a:off x="6715352" y="5758883"/>
-            <a:ext cx="447448" cy="447448"/>
-          </a:xfrm>
-          <a:prstGeom prst="rect">
-            <a:avLst/>
-          </a:prstGeom>
-          <a:noFill/>
-          <a:extLst>
-            <a:ext uri="{909E8E84-426E-40DD-AFC4-6F175D3DCCD1}">
-              <a14:hiddenFill xmlns:a14="http://schemas.microsoft.com/office/drawing/2010/main">
-                <a:solidFill>
-                  <a:srgbClr val="FFFFFF"/>
-                </a:solidFill>
-              </a14:hiddenFill>
-            </a:ext>
-          </a:extLst>
-        </p:spPr>
-      </p:pic>
     </p:spTree>
     <p:extLst>
       <p:ext uri="{BB962C8B-B14F-4D97-AF65-F5344CB8AC3E}">
@@ -7277,25 +7060,20 @@
             <p:ph type="title"/>
           </p:nvPr>
         </p:nvSpPr>
-        <p:spPr>
-          <a:xfrm>
-            <a:off x="402772" y="762000"/>
-            <a:ext cx="8229600" cy="1143000"/>
-          </a:xfrm>
-        </p:spPr>
+        <p:spPr/>
         <p:txBody>
           <a:bodyPr/>
           <a:lstStyle/>
           <a:p>
             <a:r>
-              <a:rPr lang="en-US" u="sng" dirty="0" smtClean="0">
+              <a:rPr lang="en-US" dirty="0" smtClean="0">
                 <a:solidFill>
                   <a:schemeClr val="bg1"/>
                 </a:solidFill>
               </a:rPr>
               <a:t>Future work</a:t>
             </a:r>
-            <a:endParaRPr lang="en-US" u="sng" dirty="0">
+            <a:endParaRPr lang="en-US" dirty="0">
               <a:solidFill>
                 <a:schemeClr val="bg1"/>
               </a:solidFill>
@@ -7305,117 +7083,295 @@
       </p:sp>
       <p:sp>
         <p:nvSpPr>
-          <p:cNvPr id="10" name="TextBox 9"/>
-          <p:cNvSpPr txBox="1"/>
+          <p:cNvPr id="6" name="Rounded Rectangle 5"/>
+          <p:cNvSpPr/>
           <p:nvPr/>
         </p:nvSpPr>
         <p:spPr>
           <a:xfrm>
-            <a:off x="413658" y="2133600"/>
-            <a:ext cx="8632371" cy="2831544"/>
+            <a:off x="3091543" y="1752600"/>
+            <a:ext cx="2639558" cy="1197429"/>
+          </a:xfrm>
+          <a:prstGeom prst="roundRect">
+            <a:avLst/>
+          </a:prstGeom>
+          <a:noFill/>
+          <a:ln>
+            <a:solidFill>
+              <a:schemeClr val="bg1"/>
+            </a:solidFill>
+          </a:ln>
+        </p:spPr>
+        <p:style>
+          <a:lnRef idx="2">
+            <a:schemeClr val="accent1">
+              <a:shade val="50000"/>
+            </a:schemeClr>
+          </a:lnRef>
+          <a:fillRef idx="1">
+            <a:schemeClr val="accent1"/>
+          </a:fillRef>
+          <a:effectRef idx="0">
+            <a:schemeClr val="accent1"/>
+          </a:effectRef>
+          <a:fontRef idx="minor">
+            <a:schemeClr val="lt1"/>
+          </a:fontRef>
+        </p:style>
+        <p:txBody>
+          <a:bodyPr rtlCol="0" anchor="ctr"/>
+          <a:lstStyle/>
+          <a:p>
+            <a:r>
+              <a:rPr lang="en-US" sz="1600" dirty="0">
+                <a:solidFill>
+                  <a:schemeClr val="bg1"/>
+                </a:solidFill>
+              </a:rPr>
+              <a:t>Integration with Watsi API &amp; Payment gateway.</a:t>
+            </a:r>
+          </a:p>
+        </p:txBody>
+      </p:sp>
+      <p:sp>
+        <p:nvSpPr>
+          <p:cNvPr id="7" name="Rounded Rectangle 6"/>
+          <p:cNvSpPr/>
+          <p:nvPr/>
+        </p:nvSpPr>
+        <p:spPr>
+          <a:xfrm>
+            <a:off x="631371" y="4158343"/>
+            <a:ext cx="2590800" cy="1066800"/>
+          </a:xfrm>
+          <a:prstGeom prst="roundRect">
+            <a:avLst/>
+          </a:prstGeom>
+          <a:noFill/>
+          <a:ln>
+            <a:solidFill>
+              <a:schemeClr val="bg1"/>
+            </a:solidFill>
+          </a:ln>
+        </p:spPr>
+        <p:style>
+          <a:lnRef idx="2">
+            <a:schemeClr val="accent1">
+              <a:shade val="50000"/>
+            </a:schemeClr>
+          </a:lnRef>
+          <a:fillRef idx="1">
+            <a:schemeClr val="accent1"/>
+          </a:fillRef>
+          <a:effectRef idx="0">
+            <a:schemeClr val="accent1"/>
+          </a:effectRef>
+          <a:fontRef idx="minor">
+            <a:schemeClr val="lt1"/>
+          </a:fontRef>
+        </p:style>
+        <p:txBody>
+          <a:bodyPr rtlCol="0" anchor="ctr"/>
+          <a:lstStyle/>
+          <a:p>
+            <a:r>
+              <a:rPr lang="en-US" sz="1600" dirty="0">
+                <a:solidFill>
+                  <a:schemeClr val="bg1"/>
+                </a:solidFill>
+              </a:rPr>
+              <a:t>Automated testing on various </a:t>
+            </a:r>
+            <a:r>
+              <a:rPr lang="en-US" sz="1600" dirty="0" smtClean="0">
+                <a:solidFill>
+                  <a:schemeClr val="bg1"/>
+                </a:solidFill>
+              </a:rPr>
+              <a:t>devices</a:t>
+            </a:r>
+            <a:endParaRPr lang="en-US" sz="1600" dirty="0">
+              <a:solidFill>
+                <a:schemeClr val="bg1"/>
+              </a:solidFill>
+            </a:endParaRPr>
+          </a:p>
+        </p:txBody>
+      </p:sp>
+      <p:sp>
+        <p:nvSpPr>
+          <p:cNvPr id="8" name="Rounded Rectangle 7"/>
+          <p:cNvSpPr/>
+          <p:nvPr/>
+        </p:nvSpPr>
+        <p:spPr>
+          <a:xfrm>
+            <a:off x="5638801" y="4158343"/>
+            <a:ext cx="2654678" cy="1066800"/>
+          </a:xfrm>
+          <a:prstGeom prst="roundRect">
+            <a:avLst/>
+          </a:prstGeom>
+          <a:noFill/>
+          <a:ln>
+            <a:solidFill>
+              <a:schemeClr val="bg1"/>
+            </a:solidFill>
+          </a:ln>
+        </p:spPr>
+        <p:style>
+          <a:lnRef idx="2">
+            <a:schemeClr val="accent1">
+              <a:shade val="50000"/>
+            </a:schemeClr>
+          </a:lnRef>
+          <a:fillRef idx="1">
+            <a:schemeClr val="accent1"/>
+          </a:fillRef>
+          <a:effectRef idx="0">
+            <a:schemeClr val="accent1"/>
+          </a:effectRef>
+          <a:fontRef idx="minor">
+            <a:schemeClr val="lt1"/>
+          </a:fontRef>
+        </p:style>
+        <p:txBody>
+          <a:bodyPr rtlCol="0" anchor="ctr"/>
+          <a:lstStyle/>
+          <a:p>
+            <a:pPr algn="ctr"/>
+            <a:r>
+              <a:rPr lang="en-US" sz="1600" dirty="0">
+                <a:solidFill>
+                  <a:schemeClr val="bg1"/>
+                </a:solidFill>
+              </a:rPr>
+              <a:t>Official approval from Watsi release to play store</a:t>
+            </a:r>
+            <a:endParaRPr lang="en-US" sz="1600" dirty="0">
+              <a:solidFill>
+                <a:schemeClr val="bg1"/>
+              </a:solidFill>
+            </a:endParaRPr>
+          </a:p>
+        </p:txBody>
+      </p:sp>
+      <p:pic>
+        <p:nvPicPr>
+          <p:cNvPr id="1029" name="Picture 5" descr="C:\Users\gsangle\AppData\Local\Microsoft\Windows\Temporary Internet Files\Content.IE5\GLU7V41X\MC900250855[1].wmf"/>
+          <p:cNvPicPr>
+            <a:picLocks noChangeAspect="1" noChangeArrowheads="1"/>
+          </p:cNvPicPr>
+          <p:nvPr/>
+        </p:nvPicPr>
+        <p:blipFill>
+          <a:blip r:embed="rId3" cstate="print">
+            <a:extLst>
+              <a:ext uri="{28A0092B-C50C-407E-A947-70E740481C1C}">
+                <a14:useLocalDpi xmlns:a14="http://schemas.microsoft.com/office/drawing/2010/main" val="0"/>
+              </a:ext>
+            </a:extLst>
+          </a:blip>
+          <a:srcRect/>
+          <a:stretch>
+            <a:fillRect/>
+          </a:stretch>
+        </p:blipFill>
+        <p:spPr bwMode="auto">
+          <a:xfrm>
+            <a:off x="6629400" y="5379744"/>
+            <a:ext cx="673479" cy="541200"/>
           </a:xfrm>
           <a:prstGeom prst="rect">
             <a:avLst/>
           </a:prstGeom>
           <a:noFill/>
-        </p:spPr>
-        <p:txBody>
-          <a:bodyPr wrap="square" rtlCol="0">
-            <a:spAutoFit/>
-          </a:bodyPr>
-          <a:lstStyle/>
-          <a:p>
-            <a:endParaRPr lang="en-US" dirty="0" smtClean="0"/>
-          </a:p>
-          <a:p>
-            <a:pPr marL="285750" indent="-285750">
-              <a:buFont typeface="Arial" panose="020B0604020202020204" pitchFamily="34" charset="0"/>
-              <a:buChar char="•"/>
-            </a:pPr>
-            <a:r>
-              <a:rPr lang="en-US" sz="3200" dirty="0" smtClean="0">
-                <a:solidFill>
-                  <a:schemeClr val="bg1"/>
-                </a:solidFill>
-              </a:rPr>
-              <a:t>Code improvements.</a:t>
-            </a:r>
-          </a:p>
-          <a:p>
-            <a:pPr marL="285750" indent="-285750">
-              <a:buFont typeface="Arial" panose="020B0604020202020204" pitchFamily="34" charset="0"/>
-              <a:buChar char="•"/>
-            </a:pPr>
-            <a:r>
-              <a:rPr lang="en-US" sz="3200" dirty="0">
-                <a:solidFill>
-                  <a:schemeClr val="bg1"/>
-                </a:solidFill>
-              </a:rPr>
-              <a:t>Official approval from </a:t>
-            </a:r>
-            <a:r>
-              <a:rPr lang="en-US" sz="3200" dirty="0" smtClean="0">
-                <a:solidFill>
-                  <a:schemeClr val="bg1"/>
-                </a:solidFill>
-              </a:rPr>
-              <a:t>Watsi.</a:t>
-            </a:r>
-          </a:p>
-          <a:p>
-            <a:pPr marL="285750" indent="-285750">
-              <a:buFont typeface="Arial" panose="020B0604020202020204" pitchFamily="34" charset="0"/>
-              <a:buChar char="•"/>
-            </a:pPr>
-            <a:r>
-              <a:rPr lang="en-US" sz="3200" dirty="0" smtClean="0">
-                <a:solidFill>
-                  <a:schemeClr val="bg1"/>
-                </a:solidFill>
-              </a:rPr>
-              <a:t>Integration with Watsi API &amp; Payment gateway.</a:t>
-            </a:r>
-          </a:p>
-          <a:p>
-            <a:pPr marL="285750" indent="-285750">
-              <a:buFont typeface="Arial" panose="020B0604020202020204" pitchFamily="34" charset="0"/>
-              <a:buChar char="•"/>
-            </a:pPr>
-            <a:r>
-              <a:rPr lang="en-US" sz="3200" dirty="0" smtClean="0">
-                <a:solidFill>
-                  <a:schemeClr val="bg1"/>
-                </a:solidFill>
-              </a:rPr>
-              <a:t>App testing on various devices ( AppThwack).</a:t>
-            </a:r>
-          </a:p>
-          <a:p>
-            <a:pPr marL="285750" indent="-285750">
-              <a:buFont typeface="Arial" panose="020B0604020202020204" pitchFamily="34" charset="0"/>
-              <a:buChar char="•"/>
-            </a:pPr>
-            <a:r>
-              <a:rPr lang="en-US" sz="3200" dirty="0" smtClean="0">
-                <a:solidFill>
-                  <a:schemeClr val="bg1"/>
-                </a:solidFill>
-              </a:rPr>
-              <a:t>Release to play store.</a:t>
-            </a:r>
-            <a:endParaRPr lang="en-US" sz="3200" dirty="0">
-              <a:solidFill>
-                <a:schemeClr val="bg1"/>
-              </a:solidFill>
-            </a:endParaRPr>
-          </a:p>
-        </p:txBody>
-      </p:sp>
+          <a:extLst>
+            <a:ext uri="{909E8E84-426E-40DD-AFC4-6F175D3DCCD1}">
+              <a14:hiddenFill xmlns:a14="http://schemas.microsoft.com/office/drawing/2010/main">
+                <a:solidFill>
+                  <a:srgbClr val="FFFFFF"/>
+                </a:solidFill>
+              </a14:hiddenFill>
+            </a:ext>
+          </a:extLst>
+        </p:spPr>
+      </p:pic>
+      <p:pic>
+        <p:nvPicPr>
+          <p:cNvPr id="1039" name="Picture 15" descr="C:\Users\gsangle\AppData\Local\Microsoft\Windows\Temporary Internet Files\Content.IE5\NLRQO756\MC900440391[1].png"/>
+          <p:cNvPicPr>
+            <a:picLocks noChangeAspect="1" noChangeArrowheads="1"/>
+          </p:cNvPicPr>
+          <p:nvPr/>
+        </p:nvPicPr>
+        <p:blipFill>
+          <a:blip r:embed="rId4" cstate="print">
+            <a:extLst>
+              <a:ext uri="{28A0092B-C50C-407E-A947-70E740481C1C}">
+                <a14:useLocalDpi xmlns:a14="http://schemas.microsoft.com/office/drawing/2010/main" val="0"/>
+              </a:ext>
+            </a:extLst>
+          </a:blip>
+          <a:srcRect/>
+          <a:stretch>
+            <a:fillRect/>
+          </a:stretch>
+        </p:blipFill>
+        <p:spPr bwMode="auto">
+          <a:xfrm>
+            <a:off x="4137025" y="3076906"/>
+            <a:ext cx="511175" cy="511175"/>
+          </a:xfrm>
+          <a:prstGeom prst="rect">
+            <a:avLst/>
+          </a:prstGeom>
+          <a:noFill/>
+          <a:extLst>
+            <a:ext uri="{909E8E84-426E-40DD-AFC4-6F175D3DCCD1}">
+              <a14:hiddenFill xmlns:a14="http://schemas.microsoft.com/office/drawing/2010/main">
+                <a:solidFill>
+                  <a:srgbClr val="FFFFFF"/>
+                </a:solidFill>
+              </a14:hiddenFill>
+            </a:ext>
+          </a:extLst>
+        </p:spPr>
+      </p:pic>
+      <p:pic>
+        <p:nvPicPr>
+          <p:cNvPr id="3" name="Picture 2"/>
+          <p:cNvPicPr>
+            <a:picLocks noChangeAspect="1"/>
+          </p:cNvPicPr>
+          <p:nvPr/>
+        </p:nvPicPr>
+        <p:blipFill>
+          <a:blip r:embed="rId5" cstate="print">
+            <a:extLst>
+              <a:ext uri="{28A0092B-C50C-407E-A947-70E740481C1C}">
+                <a14:useLocalDpi xmlns:a14="http://schemas.microsoft.com/office/drawing/2010/main" val="0"/>
+              </a:ext>
+            </a:extLst>
+          </a:blip>
+          <a:stretch>
+            <a:fillRect/>
+          </a:stretch>
+        </p:blipFill>
+        <p:spPr>
+          <a:xfrm>
+            <a:off x="1295400" y="5347087"/>
+            <a:ext cx="838200" cy="838200"/>
+          </a:xfrm>
+          <a:prstGeom prst="rect">
+            <a:avLst/>
+          </a:prstGeom>
+        </p:spPr>
+      </p:pic>
     </p:spTree>
     <p:extLst>
       <p:ext uri="{BB962C8B-B14F-4D97-AF65-F5344CB8AC3E}">
-        <p14:creationId xmlns:p14="http://schemas.microsoft.com/office/powerpoint/2010/main" val="2940699058"/>
+        <p14:creationId xmlns:p14="http://schemas.microsoft.com/office/powerpoint/2010/main" val="2376931789"/>
       </p:ext>
     </p:extLst>
   </p:cSld>
@@ -7472,7 +7428,7 @@
           <a:lstStyle/>
           <a:p>
             <a:r>
-              <a:rPr lang="en-US" dirty="0">
+              <a:rPr lang="en-US" sz="3200" dirty="0">
                 <a:solidFill>
                   <a:schemeClr val="bg1"/>
                 </a:solidFill>
@@ -7480,7 +7436,7 @@
               <a:t>"We were really excited that </a:t>
             </a:r>
             <a:r>
-              <a:rPr lang="en-US" dirty="0" err="1">
+              <a:rPr lang="en-US" sz="3200" dirty="0" err="1">
                 <a:solidFill>
                   <a:schemeClr val="bg1"/>
                 </a:solidFill>
@@ -7488,18 +7444,13 @@
               <a:t>Rutvij</a:t>
             </a:r>
             <a:r>
-              <a:rPr lang="en-US" dirty="0">
+              <a:rPr lang="en-US" sz="3200" dirty="0">
                 <a:solidFill>
                   <a:schemeClr val="bg1"/>
                 </a:solidFill>
               </a:rPr>
               <a:t> and his team decided to help out Watsi by building us an awesome Android app. Thanks guys!"</a:t>
             </a:r>
-            <a:endParaRPr lang="en-US" dirty="0">
-              <a:solidFill>
-                <a:schemeClr val="bg1"/>
-              </a:solidFill>
-            </a:endParaRPr>
           </a:p>
         </p:txBody>
       </p:sp>
@@ -7596,7 +7547,7 @@
         <p:spPr>
           <a:xfrm>
             <a:off x="5867400" y="6139934"/>
-            <a:ext cx="2122184" cy="369332"/>
+            <a:ext cx="2227918" cy="369332"/>
           </a:xfrm>
           <a:prstGeom prst="rect">
             <a:avLst/>
@@ -7610,14 +7561,22 @@
           <a:lstStyle/>
           <a:p>
             <a:r>
-              <a:rPr lang="en-US" dirty="0" smtClean="0">
+              <a:rPr lang="en-US" b="1" dirty="0" smtClean="0">
                 <a:solidFill>
                   <a:schemeClr val="bg1"/>
                 </a:solidFill>
               </a:rPr>
-              <a:t>Cofounder Watsi.org</a:t>
-            </a:r>
-            <a:endParaRPr lang="en-US" dirty="0">
+              <a:t>Co-founder </a:t>
+            </a:r>
+            <a:r>
+              <a:rPr lang="en-US" b="1" dirty="0" smtClean="0">
+                <a:solidFill>
+                  <a:schemeClr val="bg1"/>
+                </a:solidFill>
+              </a:rPr>
+              <a:t>Watsi.org</a:t>
+            </a:r>
+            <a:endParaRPr lang="en-US" b="1" dirty="0">
               <a:solidFill>
                 <a:schemeClr val="bg1"/>
               </a:solidFill>

</xml_diff>

<commit_message>
latest changes from Ganesh
</commit_message>
<xml_diff>
--- a/docs/groupProject.pptx
+++ b/docs/groupProject.pptx
@@ -201,7 +201,7 @@
           <a:p>
             <a:fld id="{5EE39229-6641-4520-99DB-0FFD4D3BF858}" type="datetimeFigureOut">
               <a:rPr lang="en-US" smtClean="0"/>
-              <a:t>8/4/2014</a:t>
+              <a:t>8/5/14</a:t>
             </a:fld>
             <a:endParaRPr lang="en-US"/>
           </a:p>
@@ -1710,7 +1710,7 @@
           <a:p>
             <a:fld id="{C16D46D2-A5CF-4EF4-A6E9-A8A0D2AF825B}" type="datetimeFigureOut">
               <a:rPr lang="en-US" smtClean="0"/>
-              <a:t>8/4/2014</a:t>
+              <a:t>8/5/14</a:t>
             </a:fld>
             <a:endParaRPr lang="en-US"/>
           </a:p>
@@ -1880,7 +1880,7 @@
           <a:p>
             <a:fld id="{C16D46D2-A5CF-4EF4-A6E9-A8A0D2AF825B}" type="datetimeFigureOut">
               <a:rPr lang="en-US" smtClean="0"/>
-              <a:t>8/4/2014</a:t>
+              <a:t>8/5/14</a:t>
             </a:fld>
             <a:endParaRPr lang="en-US"/>
           </a:p>
@@ -2060,7 +2060,7 @@
           <a:p>
             <a:fld id="{C16D46D2-A5CF-4EF4-A6E9-A8A0D2AF825B}" type="datetimeFigureOut">
               <a:rPr lang="en-US" smtClean="0"/>
-              <a:t>8/4/2014</a:t>
+              <a:t>8/5/14</a:t>
             </a:fld>
             <a:endParaRPr lang="en-US"/>
           </a:p>
@@ -2230,7 +2230,7 @@
           <a:p>
             <a:fld id="{C16D46D2-A5CF-4EF4-A6E9-A8A0D2AF825B}" type="datetimeFigureOut">
               <a:rPr lang="en-US" smtClean="0"/>
-              <a:t>8/4/2014</a:t>
+              <a:t>8/5/14</a:t>
             </a:fld>
             <a:endParaRPr lang="en-US"/>
           </a:p>
@@ -2476,7 +2476,7 @@
           <a:p>
             <a:fld id="{C16D46D2-A5CF-4EF4-A6E9-A8A0D2AF825B}" type="datetimeFigureOut">
               <a:rPr lang="en-US" smtClean="0"/>
-              <a:t>8/4/2014</a:t>
+              <a:t>8/5/14</a:t>
             </a:fld>
             <a:endParaRPr lang="en-US"/>
           </a:p>
@@ -2764,7 +2764,7 @@
           <a:p>
             <a:fld id="{C16D46D2-A5CF-4EF4-A6E9-A8A0D2AF825B}" type="datetimeFigureOut">
               <a:rPr lang="en-US" smtClean="0"/>
-              <a:t>8/4/2014</a:t>
+              <a:t>8/5/14</a:t>
             </a:fld>
             <a:endParaRPr lang="en-US"/>
           </a:p>
@@ -3186,7 +3186,7 @@
           <a:p>
             <a:fld id="{C16D46D2-A5CF-4EF4-A6E9-A8A0D2AF825B}" type="datetimeFigureOut">
               <a:rPr lang="en-US" smtClean="0"/>
-              <a:t>8/4/2014</a:t>
+              <a:t>8/5/14</a:t>
             </a:fld>
             <a:endParaRPr lang="en-US"/>
           </a:p>
@@ -3304,7 +3304,7 @@
           <a:p>
             <a:fld id="{C16D46D2-A5CF-4EF4-A6E9-A8A0D2AF825B}" type="datetimeFigureOut">
               <a:rPr lang="en-US" smtClean="0"/>
-              <a:t>8/4/2014</a:t>
+              <a:t>8/5/14</a:t>
             </a:fld>
             <a:endParaRPr lang="en-US"/>
           </a:p>
@@ -3399,7 +3399,7 @@
           <a:p>
             <a:fld id="{C16D46D2-A5CF-4EF4-A6E9-A8A0D2AF825B}" type="datetimeFigureOut">
               <a:rPr lang="en-US" smtClean="0"/>
-              <a:t>8/4/2014</a:t>
+              <a:t>8/5/14</a:t>
             </a:fld>
             <a:endParaRPr lang="en-US"/>
           </a:p>
@@ -3676,7 +3676,7 @@
           <a:p>
             <a:fld id="{C16D46D2-A5CF-4EF4-A6E9-A8A0D2AF825B}" type="datetimeFigureOut">
               <a:rPr lang="en-US" smtClean="0"/>
-              <a:t>8/4/2014</a:t>
+              <a:t>8/5/14</a:t>
             </a:fld>
             <a:endParaRPr lang="en-US"/>
           </a:p>
@@ -3929,7 +3929,7 @@
           <a:p>
             <a:fld id="{C16D46D2-A5CF-4EF4-A6E9-A8A0D2AF825B}" type="datetimeFigureOut">
               <a:rPr lang="en-US" smtClean="0"/>
-              <a:t>8/4/2014</a:t>
+              <a:t>8/5/14</a:t>
             </a:fld>
             <a:endParaRPr lang="en-US"/>
           </a:p>
@@ -4145,7 +4145,7 @@
           <a:p>
             <a:fld id="{C16D46D2-A5CF-4EF4-A6E9-A8A0D2AF825B}" type="datetimeFigureOut">
               <a:rPr lang="en-US" smtClean="0"/>
-              <a:t>8/4/2014</a:t>
+              <a:t>8/5/14</a:t>
             </a:fld>
             <a:endParaRPr lang="en-US"/>
           </a:p>
@@ -4607,7 +4607,7 @@
   <p:timing>
     <p:tnLst>
       <p:par>
-        <p:cTn id="1" dur="indefinite" restart="never" nodeType="tmRoot"/>
+        <p:cTn xmlns:p14="http://schemas.microsoft.com/office/powerpoint/2010/main" id="1" dur="indefinite" restart="never" nodeType="tmRoot"/>
       </p:par>
     </p:tnLst>
   </p:timing>
@@ -4643,7 +4643,7 @@
         </p:nvSpPr>
         <p:spPr>
           <a:xfrm>
-            <a:off x="533400" y="4953000"/>
+            <a:off x="381000" y="5257800"/>
             <a:ext cx="8229600" cy="1295400"/>
           </a:xfrm>
         </p:spPr>
@@ -4799,7 +4799,7 @@
         </p:nvSpPr>
         <p:spPr>
           <a:xfrm>
-            <a:off x="3429980" y="2209800"/>
+            <a:off x="2438400" y="2209800"/>
             <a:ext cx="4289379" cy="2031325"/>
           </a:xfrm>
           <a:prstGeom prst="rect">
@@ -4813,6 +4813,7 @@
           </a:bodyPr>
           <a:lstStyle/>
           <a:p>
+            <a:pPr algn="ctr"/>
             <a:r>
               <a:rPr lang="en-US" sz="3600" dirty="0" smtClean="0">
                 <a:solidFill>
@@ -4838,6 +4839,7 @@
             </a:r>
           </a:p>
           <a:p>
+            <a:pPr algn="ctr"/>
             <a:r>
               <a:rPr lang="en-US" sz="3600" dirty="0" smtClean="0">
                 <a:solidFill>
@@ -4870,7 +4872,7 @@
   <p:timing>
     <p:tnLst>
       <p:par>
-        <p:cTn id="1" dur="indefinite" restart="never" nodeType="tmRoot"/>
+        <p:cTn xmlns:p14="http://schemas.microsoft.com/office/powerpoint/2010/main" id="1" dur="indefinite" restart="never" nodeType="tmRoot"/>
       </p:par>
     </p:tnLst>
   </p:timing>
@@ -5222,7 +5224,7 @@
   <p:timing>
     <p:tnLst>
       <p:par>
-        <p:cTn id="1" dur="indefinite" restart="never" nodeType="tmRoot"/>
+        <p:cTn xmlns:p14="http://schemas.microsoft.com/office/powerpoint/2010/main" id="1" dur="indefinite" restart="never" nodeType="tmRoot"/>
       </p:par>
     </p:tnLst>
   </p:timing>
@@ -5868,7 +5870,7 @@
           </a:prstGeom>
           <a:noFill/>
           <a:extLst>
-            <a:ext uri="{909E8E84-426E-40DD-AFC4-6F175D3DCCD1}">
+            <a:ext uri="{909E8E84-426E-40dd-AFC4-6F175D3DCCD1}">
               <a14:hiddenFill xmlns:a14="http://schemas.microsoft.com/office/drawing/2010/main">
                 <a:solidFill>
                   <a:srgbClr val="FFFFFF"/>
@@ -5909,7 +5911,7 @@
           </a:prstGeom>
           <a:noFill/>
           <a:extLst>
-            <a:ext uri="{909E8E84-426E-40DD-AFC4-6F175D3DCCD1}">
+            <a:ext uri="{909E8E84-426E-40dd-AFC4-6F175D3DCCD1}">
               <a14:hiddenFill xmlns:a14="http://schemas.microsoft.com/office/drawing/2010/main">
                 <a:solidFill>
                   <a:srgbClr val="FFFFFF"/>
@@ -5950,7 +5952,7 @@
           </a:prstGeom>
           <a:noFill/>
           <a:extLst>
-            <a:ext uri="{909E8E84-426E-40DD-AFC4-6F175D3DCCD1}">
+            <a:ext uri="{909E8E84-426E-40dd-AFC4-6F175D3DCCD1}">
               <a14:hiddenFill xmlns:a14="http://schemas.microsoft.com/office/drawing/2010/main">
                 <a:solidFill>
                   <a:srgbClr val="FFFFFF"/>
@@ -5973,7 +5975,7 @@
   <p:timing>
     <p:tnLst>
       <p:par>
-        <p:cTn id="1" dur="indefinite" restart="never" nodeType="tmRoot"/>
+        <p:cTn xmlns:p14="http://schemas.microsoft.com/office/powerpoint/2010/main" id="1" dur="indefinite" restart="never" nodeType="tmRoot"/>
       </p:par>
     </p:tnLst>
   </p:timing>
@@ -6149,15 +6151,7 @@
                   <a:schemeClr val="bg1"/>
                 </a:solidFill>
               </a:rPr>
-              <a:t>asy </a:t>
-            </a:r>
-            <a:r>
-              <a:rPr lang="en-US" sz="1600" dirty="0" smtClean="0">
-                <a:solidFill>
-                  <a:schemeClr val="bg1"/>
-                </a:solidFill>
-              </a:rPr>
-              <a:t>to donate</a:t>
+              <a:t>asy to donate</a:t>
             </a:r>
             <a:endParaRPr lang="en-US" sz="1600" dirty="0">
               <a:solidFill>
@@ -6223,15 +6217,7 @@
                   <a:schemeClr val="bg1"/>
                 </a:solidFill>
               </a:rPr>
-              <a:t>asy </a:t>
-            </a:r>
-            <a:r>
-              <a:rPr lang="en-US" sz="1600" dirty="0" smtClean="0">
-                <a:solidFill>
-                  <a:schemeClr val="bg1"/>
-                </a:solidFill>
-              </a:rPr>
-              <a:t>to Share</a:t>
+              <a:t>asy to Share</a:t>
             </a:r>
             <a:endParaRPr lang="en-US" sz="1600" dirty="0">
               <a:solidFill>
@@ -6330,7 +6316,7 @@
           </a:prstGeom>
           <a:noFill/>
           <a:extLst>
-            <a:ext uri="{909E8E84-426E-40DD-AFC4-6F175D3DCCD1}">
+            <a:ext uri="{909E8E84-426E-40dd-AFC4-6F175D3DCCD1}">
               <a14:hiddenFill xmlns:a14="http://schemas.microsoft.com/office/drawing/2010/main">
                 <a:solidFill>
                   <a:srgbClr val="FFFFFF"/>
@@ -6371,7 +6357,7 @@
           </a:prstGeom>
           <a:noFill/>
           <a:extLst>
-            <a:ext uri="{909E8E84-426E-40DD-AFC4-6F175D3DCCD1}">
+            <a:ext uri="{909E8E84-426E-40dd-AFC4-6F175D3DCCD1}">
               <a14:hiddenFill xmlns:a14="http://schemas.microsoft.com/office/drawing/2010/main">
                 <a:solidFill>
                   <a:srgbClr val="FFFFFF"/>
@@ -6412,7 +6398,7 @@
           </a:prstGeom>
           <a:noFill/>
           <a:extLst>
-            <a:ext uri="{909E8E84-426E-40DD-AFC4-6F175D3DCCD1}">
+            <a:ext uri="{909E8E84-426E-40dd-AFC4-6F175D3DCCD1}">
               <a14:hiddenFill xmlns:a14="http://schemas.microsoft.com/office/drawing/2010/main">
                 <a:solidFill>
                   <a:srgbClr val="FFFFFF"/>
@@ -6453,7 +6439,7 @@
           </a:prstGeom>
           <a:noFill/>
           <a:extLst>
-            <a:ext uri="{909E8E84-426E-40DD-AFC4-6F175D3DCCD1}">
+            <a:ext uri="{909E8E84-426E-40dd-AFC4-6F175D3DCCD1}">
               <a14:hiddenFill xmlns:a14="http://schemas.microsoft.com/office/drawing/2010/main">
                 <a:solidFill>
                   <a:srgbClr val="FFFFFF"/>
@@ -6494,7 +6480,7 @@
           </a:prstGeom>
           <a:noFill/>
           <a:extLst>
-            <a:ext uri="{909E8E84-426E-40DD-AFC4-6F175D3DCCD1}">
+            <a:ext uri="{909E8E84-426E-40dd-AFC4-6F175D3DCCD1}">
               <a14:hiddenFill xmlns:a14="http://schemas.microsoft.com/office/drawing/2010/main">
                 <a:solidFill>
                   <a:srgbClr val="FFFFFF"/>
@@ -6535,7 +6521,7 @@
           </a:prstGeom>
           <a:noFill/>
           <a:extLst>
-            <a:ext uri="{909E8E84-426E-40DD-AFC4-6F175D3DCCD1}">
+            <a:ext uri="{909E8E84-426E-40dd-AFC4-6F175D3DCCD1}">
               <a14:hiddenFill xmlns:a14="http://schemas.microsoft.com/office/drawing/2010/main">
                 <a:solidFill>
                   <a:srgbClr val="FFFFFF"/>
@@ -6576,7 +6562,7 @@
           </a:prstGeom>
           <a:noFill/>
           <a:extLst>
-            <a:ext uri="{909E8E84-426E-40DD-AFC4-6F175D3DCCD1}">
+            <a:ext uri="{909E8E84-426E-40dd-AFC4-6F175D3DCCD1}">
               <a14:hiddenFill xmlns:a14="http://schemas.microsoft.com/office/drawing/2010/main">
                 <a:solidFill>
                   <a:srgbClr val="FFFFFF"/>
@@ -6617,7 +6603,7 @@
           </a:prstGeom>
           <a:noFill/>
           <a:extLst>
-            <a:ext uri="{909E8E84-426E-40DD-AFC4-6F175D3DCCD1}">
+            <a:ext uri="{909E8E84-426E-40dd-AFC4-6F175D3DCCD1}">
               <a14:hiddenFill xmlns:a14="http://schemas.microsoft.com/office/drawing/2010/main">
                 <a:solidFill>
                   <a:srgbClr val="FFFFFF"/>
@@ -6640,7 +6626,7 @@
   <p:timing>
     <p:tnLst>
       <p:par>
-        <p:cTn id="1" dur="indefinite" restart="never" nodeType="tmRoot"/>
+        <p:cTn xmlns:p14="http://schemas.microsoft.com/office/powerpoint/2010/main" id="1" dur="indefinite" restart="never" nodeType="tmRoot"/>
       </p:par>
     </p:tnLst>
   </p:timing>
@@ -6713,7 +6699,7 @@
   <p:timing>
     <p:tnLst>
       <p:par>
-        <p:cTn id="1" dur="indefinite" restart="never" nodeType="tmRoot"/>
+        <p:cTn xmlns:p14="http://schemas.microsoft.com/office/powerpoint/2010/main" id="1" dur="indefinite" restart="never" nodeType="tmRoot"/>
       </p:par>
     </p:tnLst>
   </p:timing>
@@ -7026,7 +7012,7 @@
   <p:timing>
     <p:tnLst>
       <p:par>
-        <p:cTn id="1" dur="indefinite" restart="never" nodeType="tmRoot"/>
+        <p:cTn xmlns:p14="http://schemas.microsoft.com/office/powerpoint/2010/main" id="1" dur="indefinite" restart="never" nodeType="tmRoot"/>
       </p:par>
     </p:tnLst>
   </p:timing>
@@ -7248,11 +7234,6 @@
               </a:rPr>
               <a:t>Official approval from Watsi release to play store</a:t>
             </a:r>
-            <a:endParaRPr lang="en-US" sz="1600" dirty="0">
-              <a:solidFill>
-                <a:schemeClr val="bg1"/>
-              </a:solidFill>
-            </a:endParaRPr>
           </a:p>
         </p:txBody>
       </p:sp>
@@ -7287,7 +7268,7 @@
           </a:prstGeom>
           <a:noFill/>
           <a:extLst>
-            <a:ext uri="{909E8E84-426E-40DD-AFC4-6F175D3DCCD1}">
+            <a:ext uri="{909E8E84-426E-40dd-AFC4-6F175D3DCCD1}">
               <a14:hiddenFill xmlns:a14="http://schemas.microsoft.com/office/drawing/2010/main">
                 <a:solidFill>
                   <a:srgbClr val="FFFFFF"/>
@@ -7328,7 +7309,7 @@
           </a:prstGeom>
           <a:noFill/>
           <a:extLst>
-            <a:ext uri="{909E8E84-426E-40DD-AFC4-6F175D3DCCD1}">
+            <a:ext uri="{909E8E84-426E-40dd-AFC4-6F175D3DCCD1}">
               <a14:hiddenFill xmlns:a14="http://schemas.microsoft.com/office/drawing/2010/main">
                 <a:solidFill>
                   <a:srgbClr val="FFFFFF"/>
@@ -7381,7 +7362,7 @@
   <p:timing>
     <p:tnLst>
       <p:par>
-        <p:cTn id="1" dur="indefinite" restart="never" nodeType="tmRoot"/>
+        <p:cTn xmlns:p14="http://schemas.microsoft.com/office/powerpoint/2010/main" id="1" dur="indefinite" restart="never" nodeType="tmRoot"/>
       </p:par>
     </p:tnLst>
   </p:timing>
@@ -7566,15 +7547,7 @@
                   <a:schemeClr val="bg1"/>
                 </a:solidFill>
               </a:rPr>
-              <a:t>Co-founder </a:t>
-            </a:r>
-            <a:r>
-              <a:rPr lang="en-US" b="1" dirty="0" smtClean="0">
-                <a:solidFill>
-                  <a:schemeClr val="bg1"/>
-                </a:solidFill>
-              </a:rPr>
-              <a:t>Watsi.org</a:t>
+              <a:t>Co-founder Watsi.org</a:t>
             </a:r>
             <a:endParaRPr lang="en-US" b="1" dirty="0">
               <a:solidFill>
@@ -7597,7 +7570,7 @@
   <p:timing>
     <p:tnLst>
       <p:par>
-        <p:cTn id="1" dur="indefinite" restart="never" nodeType="tmRoot"/>
+        <p:cTn xmlns:p14="http://schemas.microsoft.com/office/powerpoint/2010/main" id="1" dur="indefinite" restart="never" nodeType="tmRoot"/>
       </p:par>
     </p:tnLst>
   </p:timing>
@@ -7633,7 +7606,7 @@
         </p:nvSpPr>
         <p:spPr>
           <a:xfrm>
-            <a:off x="1752600" y="2286000"/>
+            <a:off x="1676400" y="3276600"/>
             <a:ext cx="6324600" cy="1752600"/>
           </a:xfrm>
         </p:spPr>
@@ -7659,6 +7632,36 @@
           </a:p>
         </p:txBody>
       </p:sp>
+      <p:pic>
+        <p:nvPicPr>
+          <p:cNvPr id="6" name="Picture 5" descr="q23.png"/>
+          <p:cNvPicPr>
+            <a:picLocks noChangeAspect="1"/>
+          </p:cNvPicPr>
+          <p:nvPr/>
+        </p:nvPicPr>
+        <p:blipFill>
+          <a:blip r:embed="rId3">
+            <a:extLst>
+              <a:ext uri="{28A0092B-C50C-407E-A947-70E740481C1C}">
+                <a14:useLocalDpi xmlns:a14="http://schemas.microsoft.com/office/drawing/2010/main" val="0"/>
+              </a:ext>
+            </a:extLst>
+          </a:blip>
+          <a:stretch>
+            <a:fillRect/>
+          </a:stretch>
+        </p:blipFill>
+        <p:spPr>
+          <a:xfrm>
+            <a:off x="3327400" y="1041400"/>
+            <a:ext cx="2387600" cy="2540000"/>
+          </a:xfrm>
+          <a:prstGeom prst="rect">
+            <a:avLst/>
+          </a:prstGeom>
+        </p:spPr>
+      </p:pic>
     </p:spTree>
     <p:extLst>
       <p:ext uri="{BB962C8B-B14F-4D97-AF65-F5344CB8AC3E}">
@@ -7672,7 +7675,7 @@
   <p:timing>
     <p:tnLst>
       <p:par>
-        <p:cTn id="1" dur="indefinite" restart="never" nodeType="tmRoot"/>
+        <p:cTn xmlns:p14="http://schemas.microsoft.com/office/powerpoint/2010/main" id="1" dur="indefinite" restart="never" nodeType="tmRoot"/>
       </p:par>
     </p:tnLst>
   </p:timing>

</xml_diff>